<commit_message>
feat: OpticPage 완전 구현 및 CellIdInputWindow 다크모드 지원
- OpticPage MVVM 구조로 완전 리팩토링
- 특성 데이터 테이블 Zone별 행 병합 구현 (Zone, Cell ID, Inner ID, Error Name, Tact, Judgment)
- OpticPage 다크모드/라이트모드 완전 지원 (IPVSPage와 UI 통일성 확보)
- Setting/Path 버튼 MVVM 패턴으로 구현
- CellIdInputWindow 다크모드 완전 지원 (동적 리소스 시스템)
- DLL 연동 및 데이터 업데이트 로직 구현
- Zone 버튼 기능 구현
- Graph/Total 탭 기능 구현
- 모던 UI 스타일 적용 및 색상 팔레트 통일화
</commit_message>
<xml_diff>
--- a/UI.pptx
+++ b/UI.pptx
@@ -10,6 +10,8 @@
     <p:sldId id="258" r:id="rId4"/>
     <p:sldId id="259" r:id="rId5"/>
     <p:sldId id="260" r:id="rId6"/>
+    <p:sldId id="261" r:id="rId7"/>
+    <p:sldId id="262" r:id="rId8"/>
   </p:sldIdLst>
   <p:sldSz cx="12192000" cy="6858000"/>
   <p:notesSz cx="6858000" cy="9144000"/>
@@ -263,7 +265,7 @@
           <a:p>
             <a:fld id="{3AFA5745-1944-4375-9A62-C9C7A2D27294}" type="datetimeFigureOut">
               <a:rPr lang="ko-KR" altLang="en-US" smtClean="0"/>
-              <a:t>2025-09-19</a:t>
+              <a:t>2025-09-21</a:t>
             </a:fld>
             <a:endParaRPr lang="ko-KR" altLang="en-US"/>
           </a:p>
@@ -461,7 +463,7 @@
           <a:p>
             <a:fld id="{3AFA5745-1944-4375-9A62-C9C7A2D27294}" type="datetimeFigureOut">
               <a:rPr lang="ko-KR" altLang="en-US" smtClean="0"/>
-              <a:t>2025-09-19</a:t>
+              <a:t>2025-09-21</a:t>
             </a:fld>
             <a:endParaRPr lang="ko-KR" altLang="en-US"/>
           </a:p>
@@ -669,7 +671,7 @@
           <a:p>
             <a:fld id="{3AFA5745-1944-4375-9A62-C9C7A2D27294}" type="datetimeFigureOut">
               <a:rPr lang="ko-KR" altLang="en-US" smtClean="0"/>
-              <a:t>2025-09-19</a:t>
+              <a:t>2025-09-21</a:t>
             </a:fld>
             <a:endParaRPr lang="ko-KR" altLang="en-US"/>
           </a:p>
@@ -867,7 +869,7 @@
           <a:p>
             <a:fld id="{3AFA5745-1944-4375-9A62-C9C7A2D27294}" type="datetimeFigureOut">
               <a:rPr lang="ko-KR" altLang="en-US" smtClean="0"/>
-              <a:t>2025-09-19</a:t>
+              <a:t>2025-09-21</a:t>
             </a:fld>
             <a:endParaRPr lang="ko-KR" altLang="en-US"/>
           </a:p>
@@ -1142,7 +1144,7 @@
           <a:p>
             <a:fld id="{3AFA5745-1944-4375-9A62-C9C7A2D27294}" type="datetimeFigureOut">
               <a:rPr lang="ko-KR" altLang="en-US" smtClean="0"/>
-              <a:t>2025-09-19</a:t>
+              <a:t>2025-09-21</a:t>
             </a:fld>
             <a:endParaRPr lang="ko-KR" altLang="en-US"/>
           </a:p>
@@ -1407,7 +1409,7 @@
           <a:p>
             <a:fld id="{3AFA5745-1944-4375-9A62-C9C7A2D27294}" type="datetimeFigureOut">
               <a:rPr lang="ko-KR" altLang="en-US" smtClean="0"/>
-              <a:t>2025-09-19</a:t>
+              <a:t>2025-09-21</a:t>
             </a:fld>
             <a:endParaRPr lang="ko-KR" altLang="en-US"/>
           </a:p>
@@ -1819,7 +1821,7 @@
           <a:p>
             <a:fld id="{3AFA5745-1944-4375-9A62-C9C7A2D27294}" type="datetimeFigureOut">
               <a:rPr lang="ko-KR" altLang="en-US" smtClean="0"/>
-              <a:t>2025-09-19</a:t>
+              <a:t>2025-09-21</a:t>
             </a:fld>
             <a:endParaRPr lang="ko-KR" altLang="en-US"/>
           </a:p>
@@ -1960,7 +1962,7 @@
           <a:p>
             <a:fld id="{3AFA5745-1944-4375-9A62-C9C7A2D27294}" type="datetimeFigureOut">
               <a:rPr lang="ko-KR" altLang="en-US" smtClean="0"/>
-              <a:t>2025-09-19</a:t>
+              <a:t>2025-09-21</a:t>
             </a:fld>
             <a:endParaRPr lang="ko-KR" altLang="en-US"/>
           </a:p>
@@ -2073,7 +2075,7 @@
           <a:p>
             <a:fld id="{3AFA5745-1944-4375-9A62-C9C7A2D27294}" type="datetimeFigureOut">
               <a:rPr lang="ko-KR" altLang="en-US" smtClean="0"/>
-              <a:t>2025-09-19</a:t>
+              <a:t>2025-09-21</a:t>
             </a:fld>
             <a:endParaRPr lang="ko-KR" altLang="en-US"/>
           </a:p>
@@ -2384,7 +2386,7 @@
           <a:p>
             <a:fld id="{3AFA5745-1944-4375-9A62-C9C7A2D27294}" type="datetimeFigureOut">
               <a:rPr lang="ko-KR" altLang="en-US" smtClean="0"/>
-              <a:t>2025-09-19</a:t>
+              <a:t>2025-09-21</a:t>
             </a:fld>
             <a:endParaRPr lang="ko-KR" altLang="en-US"/>
           </a:p>
@@ -2672,7 +2674,7 @@
           <a:p>
             <a:fld id="{3AFA5745-1944-4375-9A62-C9C7A2D27294}" type="datetimeFigureOut">
               <a:rPr lang="ko-KR" altLang="en-US" smtClean="0"/>
-              <a:t>2025-09-19</a:t>
+              <a:t>2025-09-21</a:t>
             </a:fld>
             <a:endParaRPr lang="ko-KR" altLang="en-US"/>
           </a:p>
@@ -2913,7 +2915,7 @@
           <a:p>
             <a:fld id="{3AFA5745-1944-4375-9A62-C9C7A2D27294}" type="datetimeFigureOut">
               <a:rPr lang="ko-KR" altLang="en-US" smtClean="0"/>
-              <a:t>2025-09-19</a:t>
+              <a:t>2025-09-21</a:t>
             </a:fld>
             <a:endParaRPr lang="ko-KR" altLang="en-US"/>
           </a:p>
@@ -6695,6 +6697,1771 @@
 </p:sld>
 </file>
 
+<file path=ppt/slides/slide6.xml><?xml version="1.0" encoding="utf-8"?>
+<p:sld xmlns:a="http://schemas.openxmlformats.org/drawingml/2006/main" xmlns:r="http://schemas.openxmlformats.org/officeDocument/2006/relationships" xmlns:p="http://schemas.openxmlformats.org/presentationml/2006/main">
+  <p:cSld>
+    <p:spTree>
+      <p:nvGrpSpPr>
+        <p:cNvPr id="1" name=""/>
+        <p:cNvGrpSpPr/>
+        <p:nvPr/>
+      </p:nvGrpSpPr>
+      <p:grpSpPr>
+        <a:xfrm>
+          <a:off x="0" y="0"/>
+          <a:ext cx="0" cy="0"/>
+          <a:chOff x="0" y="0"/>
+          <a:chExt cx="0" cy="0"/>
+        </a:xfrm>
+      </p:grpSpPr>
+      <p:sp>
+        <p:nvSpPr>
+          <p:cNvPr id="23" name="직사각형 22">
+            <a:extLst>
+              <a:ext uri="{FF2B5EF4-FFF2-40B4-BE49-F238E27FC236}">
+                <a16:creationId xmlns:a16="http://schemas.microsoft.com/office/drawing/2014/main" id="{E764D55F-D4E3-F0A1-DB1E-DD000D7A5B78}"/>
+              </a:ext>
+            </a:extLst>
+          </p:cNvPr>
+          <p:cNvSpPr/>
+          <p:nvPr/>
+        </p:nvSpPr>
+        <p:spPr>
+          <a:xfrm>
+            <a:off x="313704" y="389299"/>
+            <a:ext cx="5993394" cy="4977637"/>
+          </a:xfrm>
+          <a:prstGeom prst="rect">
+            <a:avLst/>
+          </a:prstGeom>
+          <a:noFill/>
+        </p:spPr>
+        <p:style>
+          <a:lnRef idx="2">
+            <a:schemeClr val="accent1">
+              <a:shade val="15000"/>
+            </a:schemeClr>
+          </a:lnRef>
+          <a:fillRef idx="1">
+            <a:schemeClr val="accent1"/>
+          </a:fillRef>
+          <a:effectRef idx="0">
+            <a:schemeClr val="accent1"/>
+          </a:effectRef>
+          <a:fontRef idx="minor">
+            <a:schemeClr val="lt1"/>
+          </a:fontRef>
+        </p:style>
+        <p:txBody>
+          <a:bodyPr rtlCol="0" anchor="ctr"/>
+          <a:lstStyle/>
+          <a:p>
+            <a:pPr algn="ctr"/>
+            <a:endParaRPr lang="ko-KR" altLang="en-US"/>
+          </a:p>
+        </p:txBody>
+      </p:sp>
+      <p:sp>
+        <p:nvSpPr>
+          <p:cNvPr id="4" name="직사각형 3">
+            <a:extLst>
+              <a:ext uri="{FF2B5EF4-FFF2-40B4-BE49-F238E27FC236}">
+                <a16:creationId xmlns:a16="http://schemas.microsoft.com/office/drawing/2014/main" id="{0FAA3A47-25AE-A13D-7811-7D73AABC56A6}"/>
+              </a:ext>
+            </a:extLst>
+          </p:cNvPr>
+          <p:cNvSpPr/>
+          <p:nvPr/>
+        </p:nvSpPr>
+        <p:spPr>
+          <a:xfrm>
+            <a:off x="820695" y="1364316"/>
+            <a:ext cx="959669" cy="364895"/>
+          </a:xfrm>
+          <a:prstGeom prst="rect">
+            <a:avLst/>
+          </a:prstGeom>
+        </p:spPr>
+        <p:style>
+          <a:lnRef idx="2">
+            <a:schemeClr val="accent1">
+              <a:shade val="15000"/>
+            </a:schemeClr>
+          </a:lnRef>
+          <a:fillRef idx="1">
+            <a:schemeClr val="accent1"/>
+          </a:fillRef>
+          <a:effectRef idx="0">
+            <a:schemeClr val="accent1"/>
+          </a:effectRef>
+          <a:fontRef idx="minor">
+            <a:schemeClr val="lt1"/>
+          </a:fontRef>
+        </p:style>
+        <p:txBody>
+          <a:bodyPr rtlCol="0" anchor="ctr"/>
+          <a:lstStyle/>
+          <a:p>
+            <a:pPr algn="ctr"/>
+            <a:r>
+              <a:rPr lang="en-US" altLang="ko-KR"/>
+              <a:t>EECP</a:t>
+            </a:r>
+            <a:endParaRPr lang="ko-KR" altLang="en-US"/>
+          </a:p>
+        </p:txBody>
+      </p:sp>
+      <p:sp>
+        <p:nvSpPr>
+          <p:cNvPr id="7" name="직사각형 6">
+            <a:extLst>
+              <a:ext uri="{FF2B5EF4-FFF2-40B4-BE49-F238E27FC236}">
+                <a16:creationId xmlns:a16="http://schemas.microsoft.com/office/drawing/2014/main" id="{C8E6B8F6-D3DE-0303-005A-A37A4E391812}"/>
+              </a:ext>
+            </a:extLst>
+          </p:cNvPr>
+          <p:cNvSpPr/>
+          <p:nvPr/>
+        </p:nvSpPr>
+        <p:spPr>
+          <a:xfrm>
+            <a:off x="2168152" y="1364315"/>
+            <a:ext cx="3695326" cy="364895"/>
+          </a:xfrm>
+          <a:prstGeom prst="rect">
+            <a:avLst/>
+          </a:prstGeom>
+          <a:noFill/>
+        </p:spPr>
+        <p:style>
+          <a:lnRef idx="2">
+            <a:schemeClr val="accent1">
+              <a:shade val="15000"/>
+            </a:schemeClr>
+          </a:lnRef>
+          <a:fillRef idx="1">
+            <a:schemeClr val="accent1"/>
+          </a:fillRef>
+          <a:effectRef idx="0">
+            <a:schemeClr val="accent1"/>
+          </a:effectRef>
+          <a:fontRef idx="minor">
+            <a:schemeClr val="lt1"/>
+          </a:fontRef>
+        </p:style>
+        <p:txBody>
+          <a:bodyPr rtlCol="0" anchor="ctr"/>
+          <a:lstStyle/>
+          <a:p>
+            <a:pPr algn="ctr"/>
+            <a:endParaRPr lang="ko-KR" altLang="en-US"/>
+          </a:p>
+        </p:txBody>
+      </p:sp>
+      <p:sp>
+        <p:nvSpPr>
+          <p:cNvPr id="8" name="직사각형 7">
+            <a:extLst>
+              <a:ext uri="{FF2B5EF4-FFF2-40B4-BE49-F238E27FC236}">
+                <a16:creationId xmlns:a16="http://schemas.microsoft.com/office/drawing/2014/main" id="{74E48E11-DD9E-BA9C-FE0C-74AD61FE0839}"/>
+              </a:ext>
+            </a:extLst>
+          </p:cNvPr>
+          <p:cNvSpPr/>
+          <p:nvPr/>
+        </p:nvSpPr>
+        <p:spPr>
+          <a:xfrm>
+            <a:off x="820695" y="1942229"/>
+            <a:ext cx="959669" cy="364895"/>
+          </a:xfrm>
+          <a:prstGeom prst="rect">
+            <a:avLst/>
+          </a:prstGeom>
+        </p:spPr>
+        <p:style>
+          <a:lnRef idx="2">
+            <a:schemeClr val="accent1">
+              <a:shade val="15000"/>
+            </a:schemeClr>
+          </a:lnRef>
+          <a:fillRef idx="1">
+            <a:schemeClr val="accent1"/>
+          </a:fillRef>
+          <a:effectRef idx="0">
+            <a:schemeClr val="accent1"/>
+          </a:effectRef>
+          <a:fontRef idx="minor">
+            <a:schemeClr val="lt1"/>
+          </a:fontRef>
+        </p:style>
+        <p:txBody>
+          <a:bodyPr rtlCol="0" anchor="ctr"/>
+          <a:lstStyle/>
+          <a:p>
+            <a:pPr algn="ctr"/>
+            <a:r>
+              <a:rPr lang="en-US" altLang="ko-KR"/>
+              <a:t>CIM</a:t>
+            </a:r>
+            <a:endParaRPr lang="ko-KR" altLang="en-US"/>
+          </a:p>
+        </p:txBody>
+      </p:sp>
+      <p:sp>
+        <p:nvSpPr>
+          <p:cNvPr id="9" name="직사각형 8">
+            <a:extLst>
+              <a:ext uri="{FF2B5EF4-FFF2-40B4-BE49-F238E27FC236}">
+                <a16:creationId xmlns:a16="http://schemas.microsoft.com/office/drawing/2014/main" id="{4BBF0E0F-52F7-E6D0-4425-70B8842E1B2B}"/>
+              </a:ext>
+            </a:extLst>
+          </p:cNvPr>
+          <p:cNvSpPr/>
+          <p:nvPr/>
+        </p:nvSpPr>
+        <p:spPr>
+          <a:xfrm>
+            <a:off x="2168152" y="1942228"/>
+            <a:ext cx="3695326" cy="364895"/>
+          </a:xfrm>
+          <a:prstGeom prst="rect">
+            <a:avLst/>
+          </a:prstGeom>
+          <a:noFill/>
+        </p:spPr>
+        <p:style>
+          <a:lnRef idx="2">
+            <a:schemeClr val="accent1">
+              <a:shade val="15000"/>
+            </a:schemeClr>
+          </a:lnRef>
+          <a:fillRef idx="1">
+            <a:schemeClr val="accent1"/>
+          </a:fillRef>
+          <a:effectRef idx="0">
+            <a:schemeClr val="accent1"/>
+          </a:effectRef>
+          <a:fontRef idx="minor">
+            <a:schemeClr val="lt1"/>
+          </a:fontRef>
+        </p:style>
+        <p:txBody>
+          <a:bodyPr rtlCol="0" anchor="ctr"/>
+          <a:lstStyle/>
+          <a:p>
+            <a:pPr algn="ctr"/>
+            <a:endParaRPr lang="ko-KR" altLang="en-US"/>
+          </a:p>
+        </p:txBody>
+      </p:sp>
+      <p:sp>
+        <p:nvSpPr>
+          <p:cNvPr id="10" name="직사각형 9">
+            <a:extLst>
+              <a:ext uri="{FF2B5EF4-FFF2-40B4-BE49-F238E27FC236}">
+                <a16:creationId xmlns:a16="http://schemas.microsoft.com/office/drawing/2014/main" id="{5785AB7D-E23C-E717-A1D8-F85323C8B1DD}"/>
+              </a:ext>
+            </a:extLst>
+          </p:cNvPr>
+          <p:cNvSpPr/>
+          <p:nvPr/>
+        </p:nvSpPr>
+        <p:spPr>
+          <a:xfrm>
+            <a:off x="820695" y="3045237"/>
+            <a:ext cx="959669" cy="364895"/>
+          </a:xfrm>
+          <a:prstGeom prst="rect">
+            <a:avLst/>
+          </a:prstGeom>
+        </p:spPr>
+        <p:style>
+          <a:lnRef idx="2">
+            <a:schemeClr val="accent1">
+              <a:shade val="15000"/>
+            </a:schemeClr>
+          </a:lnRef>
+          <a:fillRef idx="1">
+            <a:schemeClr val="accent1"/>
+          </a:fillRef>
+          <a:effectRef idx="0">
+            <a:schemeClr val="accent1"/>
+          </a:effectRef>
+          <a:fontRef idx="minor">
+            <a:schemeClr val="lt1"/>
+          </a:fontRef>
+        </p:style>
+        <p:txBody>
+          <a:bodyPr rtlCol="0" anchor="ctr"/>
+          <a:lstStyle/>
+          <a:p>
+            <a:pPr algn="ctr"/>
+            <a:r>
+              <a:rPr lang="en-US" altLang="ko-KR"/>
+              <a:t>Recipe</a:t>
+            </a:r>
+            <a:endParaRPr lang="ko-KR" altLang="en-US"/>
+          </a:p>
+        </p:txBody>
+      </p:sp>
+      <p:sp>
+        <p:nvSpPr>
+          <p:cNvPr id="11" name="직사각형 10">
+            <a:extLst>
+              <a:ext uri="{FF2B5EF4-FFF2-40B4-BE49-F238E27FC236}">
+                <a16:creationId xmlns:a16="http://schemas.microsoft.com/office/drawing/2014/main" id="{4B1047CA-2182-7BE1-5D1B-9D780F68BE7E}"/>
+              </a:ext>
+            </a:extLst>
+          </p:cNvPr>
+          <p:cNvSpPr/>
+          <p:nvPr/>
+        </p:nvSpPr>
+        <p:spPr>
+          <a:xfrm>
+            <a:off x="2168152" y="3045236"/>
+            <a:ext cx="3695326" cy="364895"/>
+          </a:xfrm>
+          <a:prstGeom prst="rect">
+            <a:avLst/>
+          </a:prstGeom>
+          <a:noFill/>
+        </p:spPr>
+        <p:style>
+          <a:lnRef idx="2">
+            <a:schemeClr val="accent1">
+              <a:shade val="15000"/>
+            </a:schemeClr>
+          </a:lnRef>
+          <a:fillRef idx="1">
+            <a:schemeClr val="accent1"/>
+          </a:fillRef>
+          <a:effectRef idx="0">
+            <a:schemeClr val="accent1"/>
+          </a:effectRef>
+          <a:fontRef idx="minor">
+            <a:schemeClr val="lt1"/>
+          </a:fontRef>
+        </p:style>
+        <p:txBody>
+          <a:bodyPr rtlCol="0" anchor="ctr"/>
+          <a:lstStyle/>
+          <a:p>
+            <a:pPr algn="ctr"/>
+            <a:endParaRPr lang="ko-KR" altLang="en-US"/>
+          </a:p>
+        </p:txBody>
+      </p:sp>
+      <p:sp>
+        <p:nvSpPr>
+          <p:cNvPr id="12" name="직사각형 11">
+            <a:extLst>
+              <a:ext uri="{FF2B5EF4-FFF2-40B4-BE49-F238E27FC236}">
+                <a16:creationId xmlns:a16="http://schemas.microsoft.com/office/drawing/2014/main" id="{47AB4998-DC4A-87BE-630D-DA71E46DE9CA}"/>
+              </a:ext>
+            </a:extLst>
+          </p:cNvPr>
+          <p:cNvSpPr/>
+          <p:nvPr/>
+        </p:nvSpPr>
+        <p:spPr>
+          <a:xfrm>
+            <a:off x="820695" y="3623150"/>
+            <a:ext cx="959669" cy="364895"/>
+          </a:xfrm>
+          <a:prstGeom prst="rect">
+            <a:avLst/>
+          </a:prstGeom>
+        </p:spPr>
+        <p:style>
+          <a:lnRef idx="2">
+            <a:schemeClr val="accent1">
+              <a:shade val="15000"/>
+            </a:schemeClr>
+          </a:lnRef>
+          <a:fillRef idx="1">
+            <a:schemeClr val="accent1"/>
+          </a:fillRef>
+          <a:effectRef idx="0">
+            <a:schemeClr val="accent1"/>
+          </a:effectRef>
+          <a:fontRef idx="minor">
+            <a:schemeClr val="lt1"/>
+          </a:fontRef>
+        </p:style>
+        <p:txBody>
+          <a:bodyPr rtlCol="0" anchor="ctr"/>
+          <a:lstStyle/>
+          <a:p>
+            <a:pPr algn="ctr"/>
+            <a:r>
+              <a:rPr lang="en-US" altLang="ko-KR"/>
+              <a:t>DLL</a:t>
+            </a:r>
+            <a:endParaRPr lang="ko-KR" altLang="en-US"/>
+          </a:p>
+        </p:txBody>
+      </p:sp>
+      <p:sp>
+        <p:nvSpPr>
+          <p:cNvPr id="13" name="직사각형 12">
+            <a:extLst>
+              <a:ext uri="{FF2B5EF4-FFF2-40B4-BE49-F238E27FC236}">
+                <a16:creationId xmlns:a16="http://schemas.microsoft.com/office/drawing/2014/main" id="{89D6141E-7895-B44F-9B80-9074E524A0F9}"/>
+              </a:ext>
+            </a:extLst>
+          </p:cNvPr>
+          <p:cNvSpPr/>
+          <p:nvPr/>
+        </p:nvSpPr>
+        <p:spPr>
+          <a:xfrm>
+            <a:off x="2168152" y="3623149"/>
+            <a:ext cx="3695326" cy="364895"/>
+          </a:xfrm>
+          <a:prstGeom prst="rect">
+            <a:avLst/>
+          </a:prstGeom>
+          <a:noFill/>
+        </p:spPr>
+        <p:style>
+          <a:lnRef idx="2">
+            <a:schemeClr val="accent1">
+              <a:shade val="15000"/>
+            </a:schemeClr>
+          </a:lnRef>
+          <a:fillRef idx="1">
+            <a:schemeClr val="accent1"/>
+          </a:fillRef>
+          <a:effectRef idx="0">
+            <a:schemeClr val="accent1"/>
+          </a:effectRef>
+          <a:fontRef idx="minor">
+            <a:schemeClr val="lt1"/>
+          </a:fontRef>
+        </p:style>
+        <p:txBody>
+          <a:bodyPr rtlCol="0" anchor="ctr"/>
+          <a:lstStyle/>
+          <a:p>
+            <a:pPr algn="ctr"/>
+            <a:endParaRPr lang="ko-KR" altLang="en-US"/>
+          </a:p>
+        </p:txBody>
+      </p:sp>
+      <p:sp>
+        <p:nvSpPr>
+          <p:cNvPr id="14" name="TextBox 13">
+            <a:extLst>
+              <a:ext uri="{FF2B5EF4-FFF2-40B4-BE49-F238E27FC236}">
+                <a16:creationId xmlns:a16="http://schemas.microsoft.com/office/drawing/2014/main" id="{16663C93-4626-F1BA-8156-D7D054DFEDE0}"/>
+              </a:ext>
+            </a:extLst>
+          </p:cNvPr>
+          <p:cNvSpPr txBox="1"/>
+          <p:nvPr/>
+        </p:nvSpPr>
+        <p:spPr>
+          <a:xfrm>
+            <a:off x="739216" y="781966"/>
+            <a:ext cx="854336" cy="369332"/>
+          </a:xfrm>
+          <a:prstGeom prst="rect">
+            <a:avLst/>
+          </a:prstGeom>
+          <a:noFill/>
+        </p:spPr>
+        <p:txBody>
+          <a:bodyPr wrap="none" rtlCol="0">
+            <a:spAutoFit/>
+          </a:bodyPr>
+          <a:lstStyle/>
+          <a:p>
+            <a:r>
+              <a:rPr lang="en-US" altLang="ko-KR"/>
+              <a:t>Create</a:t>
+            </a:r>
+            <a:endParaRPr lang="ko-KR" altLang="en-US"/>
+          </a:p>
+        </p:txBody>
+      </p:sp>
+      <p:cxnSp>
+        <p:nvCxnSpPr>
+          <p:cNvPr id="16" name="직선 연결선 15">
+            <a:extLst>
+              <a:ext uri="{FF2B5EF4-FFF2-40B4-BE49-F238E27FC236}">
+                <a16:creationId xmlns:a16="http://schemas.microsoft.com/office/drawing/2014/main" id="{918B89A4-4ECC-1E3B-22AF-84FA26E8B7CA}"/>
+              </a:ext>
+            </a:extLst>
+          </p:cNvPr>
+          <p:cNvCxnSpPr>
+            <a:cxnSpLocks/>
+            <a:stCxn id="14" idx="3"/>
+          </p:cNvCxnSpPr>
+          <p:nvPr/>
+        </p:nvCxnSpPr>
+        <p:spPr>
+          <a:xfrm>
+            <a:off x="1593552" y="966632"/>
+            <a:ext cx="4269926" cy="9472"/>
+          </a:xfrm>
+          <a:prstGeom prst="line">
+            <a:avLst/>
+          </a:prstGeom>
+        </p:spPr>
+        <p:style>
+          <a:lnRef idx="2">
+            <a:schemeClr val="accent1"/>
+          </a:lnRef>
+          <a:fillRef idx="0">
+            <a:schemeClr val="accent1"/>
+          </a:fillRef>
+          <a:effectRef idx="1">
+            <a:schemeClr val="accent1"/>
+          </a:effectRef>
+          <a:fontRef idx="minor">
+            <a:schemeClr val="tx1"/>
+          </a:fontRef>
+        </p:style>
+      </p:cxnSp>
+      <p:sp>
+        <p:nvSpPr>
+          <p:cNvPr id="19" name="TextBox 18">
+            <a:extLst>
+              <a:ext uri="{FF2B5EF4-FFF2-40B4-BE49-F238E27FC236}">
+                <a16:creationId xmlns:a16="http://schemas.microsoft.com/office/drawing/2014/main" id="{3AA31086-6C7F-1C00-B4E9-A7495D6FA9AD}"/>
+              </a:ext>
+            </a:extLst>
+          </p:cNvPr>
+          <p:cNvSpPr txBox="1"/>
+          <p:nvPr/>
+        </p:nvSpPr>
+        <p:spPr>
+          <a:xfrm>
+            <a:off x="739216" y="2538287"/>
+            <a:ext cx="689548" cy="369332"/>
+          </a:xfrm>
+          <a:prstGeom prst="rect">
+            <a:avLst/>
+          </a:prstGeom>
+          <a:noFill/>
+        </p:spPr>
+        <p:txBody>
+          <a:bodyPr wrap="none" rtlCol="0">
+            <a:spAutoFit/>
+          </a:bodyPr>
+          <a:lstStyle/>
+          <a:p>
+            <a:r>
+              <a:rPr lang="en-US" altLang="ko-KR"/>
+              <a:t>Load</a:t>
+            </a:r>
+            <a:endParaRPr lang="ko-KR" altLang="en-US"/>
+          </a:p>
+        </p:txBody>
+      </p:sp>
+      <p:cxnSp>
+        <p:nvCxnSpPr>
+          <p:cNvPr id="20" name="직선 연결선 19">
+            <a:extLst>
+              <a:ext uri="{FF2B5EF4-FFF2-40B4-BE49-F238E27FC236}">
+                <a16:creationId xmlns:a16="http://schemas.microsoft.com/office/drawing/2014/main" id="{63013A0B-14B3-B689-CC74-9F34B018521B}"/>
+              </a:ext>
+            </a:extLst>
+          </p:cNvPr>
+          <p:cNvCxnSpPr>
+            <a:cxnSpLocks/>
+          </p:cNvCxnSpPr>
+          <p:nvPr/>
+        </p:nvCxnSpPr>
+        <p:spPr>
+          <a:xfrm>
+            <a:off x="1593552" y="2725763"/>
+            <a:ext cx="4269926" cy="6662"/>
+          </a:xfrm>
+          <a:prstGeom prst="line">
+            <a:avLst/>
+          </a:prstGeom>
+        </p:spPr>
+        <p:style>
+          <a:lnRef idx="2">
+            <a:schemeClr val="accent1"/>
+          </a:lnRef>
+          <a:fillRef idx="0">
+            <a:schemeClr val="accent1"/>
+          </a:fillRef>
+          <a:effectRef idx="1">
+            <a:schemeClr val="accent1"/>
+          </a:effectRef>
+          <a:fontRef idx="minor">
+            <a:schemeClr val="tx1"/>
+          </a:fontRef>
+        </p:style>
+      </p:cxnSp>
+      <p:sp>
+        <p:nvSpPr>
+          <p:cNvPr id="22" name="사각형: 둥근 모서리 21">
+            <a:extLst>
+              <a:ext uri="{FF2B5EF4-FFF2-40B4-BE49-F238E27FC236}">
+                <a16:creationId xmlns:a16="http://schemas.microsoft.com/office/drawing/2014/main" id="{FCEDF359-8B00-C884-EBD2-BBA83FD72F09}"/>
+              </a:ext>
+            </a:extLst>
+          </p:cNvPr>
+          <p:cNvSpPr/>
+          <p:nvPr/>
+        </p:nvSpPr>
+        <p:spPr>
+          <a:xfrm>
+            <a:off x="2242092" y="4482084"/>
+            <a:ext cx="1964602" cy="525613"/>
+          </a:xfrm>
+          <a:prstGeom prst="roundRect">
+            <a:avLst/>
+          </a:prstGeom>
+        </p:spPr>
+        <p:style>
+          <a:lnRef idx="2">
+            <a:schemeClr val="accent1">
+              <a:shade val="15000"/>
+            </a:schemeClr>
+          </a:lnRef>
+          <a:fillRef idx="1">
+            <a:schemeClr val="accent1"/>
+          </a:fillRef>
+          <a:effectRef idx="0">
+            <a:schemeClr val="accent1"/>
+          </a:effectRef>
+          <a:fontRef idx="minor">
+            <a:schemeClr val="lt1"/>
+          </a:fontRef>
+        </p:style>
+        <p:txBody>
+          <a:bodyPr rtlCol="0" anchor="ctr"/>
+          <a:lstStyle/>
+          <a:p>
+            <a:pPr algn="ctr"/>
+            <a:r>
+              <a:rPr lang="en-US" altLang="ko-KR"/>
+              <a:t>SAVE</a:t>
+            </a:r>
+            <a:endParaRPr lang="ko-KR" altLang="en-US"/>
+          </a:p>
+        </p:txBody>
+      </p:sp>
+      <p:sp>
+        <p:nvSpPr>
+          <p:cNvPr id="24" name="직사각형 23">
+            <a:extLst>
+              <a:ext uri="{FF2B5EF4-FFF2-40B4-BE49-F238E27FC236}">
+                <a16:creationId xmlns:a16="http://schemas.microsoft.com/office/drawing/2014/main" id="{AC5F11E8-6411-7C0F-B5B4-5C45E1120EC2}"/>
+              </a:ext>
+            </a:extLst>
+          </p:cNvPr>
+          <p:cNvSpPr/>
+          <p:nvPr/>
+        </p:nvSpPr>
+        <p:spPr>
+          <a:xfrm>
+            <a:off x="6732610" y="363901"/>
+            <a:ext cx="5145686" cy="4977637"/>
+          </a:xfrm>
+          <a:prstGeom prst="rect">
+            <a:avLst/>
+          </a:prstGeom>
+          <a:noFill/>
+        </p:spPr>
+        <p:style>
+          <a:lnRef idx="2">
+            <a:schemeClr val="accent1">
+              <a:shade val="15000"/>
+            </a:schemeClr>
+          </a:lnRef>
+          <a:fillRef idx="1">
+            <a:schemeClr val="accent1"/>
+          </a:fillRef>
+          <a:effectRef idx="0">
+            <a:schemeClr val="accent1"/>
+          </a:effectRef>
+          <a:fontRef idx="minor">
+            <a:schemeClr val="lt1"/>
+          </a:fontRef>
+        </p:style>
+        <p:txBody>
+          <a:bodyPr rtlCol="0" anchor="ctr"/>
+          <a:lstStyle/>
+          <a:p>
+            <a:pPr algn="ctr"/>
+            <a:endParaRPr lang="ko-KR" altLang="en-US"/>
+          </a:p>
+        </p:txBody>
+      </p:sp>
+      <p:sp>
+        <p:nvSpPr>
+          <p:cNvPr id="25" name="직사각형 24">
+            <a:extLst>
+              <a:ext uri="{FF2B5EF4-FFF2-40B4-BE49-F238E27FC236}">
+                <a16:creationId xmlns:a16="http://schemas.microsoft.com/office/drawing/2014/main" id="{6AF6A5D9-6417-3D39-CCFF-1B58300AFC63}"/>
+              </a:ext>
+            </a:extLst>
+          </p:cNvPr>
+          <p:cNvSpPr/>
+          <p:nvPr/>
+        </p:nvSpPr>
+        <p:spPr>
+          <a:xfrm>
+            <a:off x="6843570" y="1334015"/>
+            <a:ext cx="1114424" cy="364895"/>
+          </a:xfrm>
+          <a:prstGeom prst="rect">
+            <a:avLst/>
+          </a:prstGeom>
+        </p:spPr>
+        <p:style>
+          <a:lnRef idx="2">
+            <a:schemeClr val="accent1">
+              <a:shade val="15000"/>
+            </a:schemeClr>
+          </a:lnRef>
+          <a:fillRef idx="1">
+            <a:schemeClr val="accent1"/>
+          </a:fillRef>
+          <a:effectRef idx="0">
+            <a:schemeClr val="accent1"/>
+          </a:effectRef>
+          <a:fontRef idx="minor">
+            <a:schemeClr val="lt1"/>
+          </a:fontRef>
+        </p:style>
+        <p:txBody>
+          <a:bodyPr rtlCol="0" anchor="ctr"/>
+          <a:lstStyle/>
+          <a:p>
+            <a:pPr algn="ctr"/>
+            <a:r>
+              <a:rPr lang="en-US" altLang="ko-KR"/>
+              <a:t>Cell ID</a:t>
+            </a:r>
+            <a:endParaRPr lang="ko-KR" altLang="en-US"/>
+          </a:p>
+        </p:txBody>
+      </p:sp>
+      <p:sp>
+        <p:nvSpPr>
+          <p:cNvPr id="26" name="직사각형 25">
+            <a:extLst>
+              <a:ext uri="{FF2B5EF4-FFF2-40B4-BE49-F238E27FC236}">
+                <a16:creationId xmlns:a16="http://schemas.microsoft.com/office/drawing/2014/main" id="{517C3F22-A82D-1CA7-3E3A-82D8E42ED903}"/>
+              </a:ext>
+            </a:extLst>
+          </p:cNvPr>
+          <p:cNvSpPr/>
+          <p:nvPr/>
+        </p:nvSpPr>
+        <p:spPr>
+          <a:xfrm>
+            <a:off x="8176185" y="1334014"/>
+            <a:ext cx="3638587" cy="364895"/>
+          </a:xfrm>
+          <a:prstGeom prst="rect">
+            <a:avLst/>
+          </a:prstGeom>
+          <a:noFill/>
+        </p:spPr>
+        <p:style>
+          <a:lnRef idx="2">
+            <a:schemeClr val="accent1">
+              <a:shade val="15000"/>
+            </a:schemeClr>
+          </a:lnRef>
+          <a:fillRef idx="1">
+            <a:schemeClr val="accent1"/>
+          </a:fillRef>
+          <a:effectRef idx="0">
+            <a:schemeClr val="accent1"/>
+          </a:effectRef>
+          <a:fontRef idx="minor">
+            <a:schemeClr val="lt1"/>
+          </a:fontRef>
+        </p:style>
+        <p:txBody>
+          <a:bodyPr rtlCol="0" anchor="ctr"/>
+          <a:lstStyle/>
+          <a:p>
+            <a:pPr algn="ctr"/>
+            <a:endParaRPr lang="ko-KR" altLang="en-US"/>
+          </a:p>
+        </p:txBody>
+      </p:sp>
+      <p:sp>
+        <p:nvSpPr>
+          <p:cNvPr id="27" name="직사각형 26">
+            <a:extLst>
+              <a:ext uri="{FF2B5EF4-FFF2-40B4-BE49-F238E27FC236}">
+                <a16:creationId xmlns:a16="http://schemas.microsoft.com/office/drawing/2014/main" id="{08554018-8C6C-5770-3D88-9062D5520EB6}"/>
+              </a:ext>
+            </a:extLst>
+          </p:cNvPr>
+          <p:cNvSpPr/>
+          <p:nvPr/>
+        </p:nvSpPr>
+        <p:spPr>
+          <a:xfrm>
+            <a:off x="6843570" y="1911928"/>
+            <a:ext cx="1114424" cy="364895"/>
+          </a:xfrm>
+          <a:prstGeom prst="rect">
+            <a:avLst/>
+          </a:prstGeom>
+        </p:spPr>
+        <p:style>
+          <a:lnRef idx="2">
+            <a:schemeClr val="accent1">
+              <a:shade val="15000"/>
+            </a:schemeClr>
+          </a:lnRef>
+          <a:fillRef idx="1">
+            <a:schemeClr val="accent1"/>
+          </a:fillRef>
+          <a:effectRef idx="0">
+            <a:schemeClr val="accent1"/>
+          </a:effectRef>
+          <a:fontRef idx="minor">
+            <a:schemeClr val="lt1"/>
+          </a:fontRef>
+        </p:style>
+        <p:txBody>
+          <a:bodyPr rtlCol="0" anchor="ctr"/>
+          <a:lstStyle/>
+          <a:p>
+            <a:pPr algn="ctr"/>
+            <a:r>
+              <a:rPr lang="en-US" altLang="ko-KR"/>
+              <a:t>Inner ID</a:t>
+            </a:r>
+            <a:endParaRPr lang="ko-KR" altLang="en-US"/>
+          </a:p>
+        </p:txBody>
+      </p:sp>
+      <p:sp>
+        <p:nvSpPr>
+          <p:cNvPr id="28" name="직사각형 27">
+            <a:extLst>
+              <a:ext uri="{FF2B5EF4-FFF2-40B4-BE49-F238E27FC236}">
+                <a16:creationId xmlns:a16="http://schemas.microsoft.com/office/drawing/2014/main" id="{25A99553-4543-5491-5281-44D709CF4A84}"/>
+              </a:ext>
+            </a:extLst>
+          </p:cNvPr>
+          <p:cNvSpPr/>
+          <p:nvPr/>
+        </p:nvSpPr>
+        <p:spPr>
+          <a:xfrm>
+            <a:off x="8176185" y="1911927"/>
+            <a:ext cx="3638587" cy="364895"/>
+          </a:xfrm>
+          <a:prstGeom prst="rect">
+            <a:avLst/>
+          </a:prstGeom>
+          <a:noFill/>
+        </p:spPr>
+        <p:style>
+          <a:lnRef idx="2">
+            <a:schemeClr val="accent1">
+              <a:shade val="15000"/>
+            </a:schemeClr>
+          </a:lnRef>
+          <a:fillRef idx="1">
+            <a:schemeClr val="accent1"/>
+          </a:fillRef>
+          <a:effectRef idx="0">
+            <a:schemeClr val="accent1"/>
+          </a:effectRef>
+          <a:fontRef idx="minor">
+            <a:schemeClr val="lt1"/>
+          </a:fontRef>
+        </p:style>
+        <p:txBody>
+          <a:bodyPr rtlCol="0" anchor="ctr"/>
+          <a:lstStyle/>
+          <a:p>
+            <a:pPr algn="ctr"/>
+            <a:endParaRPr lang="ko-KR" altLang="en-US"/>
+          </a:p>
+        </p:txBody>
+      </p:sp>
+      <p:sp>
+        <p:nvSpPr>
+          <p:cNvPr id="29" name="사각형: 둥근 모서리 28">
+            <a:extLst>
+              <a:ext uri="{FF2B5EF4-FFF2-40B4-BE49-F238E27FC236}">
+                <a16:creationId xmlns:a16="http://schemas.microsoft.com/office/drawing/2014/main" id="{0846DDF9-819C-991B-D729-8D88DDCF020F}"/>
+              </a:ext>
+            </a:extLst>
+          </p:cNvPr>
+          <p:cNvSpPr/>
+          <p:nvPr/>
+        </p:nvSpPr>
+        <p:spPr>
+          <a:xfrm>
+            <a:off x="8235486" y="4318372"/>
+            <a:ext cx="1964602" cy="525613"/>
+          </a:xfrm>
+          <a:prstGeom prst="roundRect">
+            <a:avLst/>
+          </a:prstGeom>
+        </p:spPr>
+        <p:style>
+          <a:lnRef idx="2">
+            <a:schemeClr val="accent1">
+              <a:shade val="15000"/>
+            </a:schemeClr>
+          </a:lnRef>
+          <a:fillRef idx="1">
+            <a:schemeClr val="accent1"/>
+          </a:fillRef>
+          <a:effectRef idx="0">
+            <a:schemeClr val="accent1"/>
+          </a:effectRef>
+          <a:fontRef idx="minor">
+            <a:schemeClr val="lt1"/>
+          </a:fontRef>
+        </p:style>
+        <p:txBody>
+          <a:bodyPr rtlCol="0" anchor="ctr"/>
+          <a:lstStyle/>
+          <a:p>
+            <a:pPr algn="ctr"/>
+            <a:r>
+              <a:rPr lang="en-US" altLang="ko-KR"/>
+              <a:t>SAVE</a:t>
+            </a:r>
+            <a:endParaRPr lang="ko-KR" altLang="en-US"/>
+          </a:p>
+        </p:txBody>
+      </p:sp>
+    </p:spTree>
+    <p:extLst>
+      <p:ext uri="{BB962C8B-B14F-4D97-AF65-F5344CB8AC3E}">
+        <p14:creationId xmlns:p14="http://schemas.microsoft.com/office/powerpoint/2010/main" val="190144487"/>
+      </p:ext>
+    </p:extLst>
+  </p:cSld>
+  <p:clrMapOvr>
+    <a:masterClrMapping/>
+  </p:clrMapOvr>
+</p:sld>
+</file>
+
+<file path=ppt/slides/slide7.xml><?xml version="1.0" encoding="utf-8"?>
+<p:sld xmlns:a="http://schemas.openxmlformats.org/drawingml/2006/main" xmlns:r="http://schemas.openxmlformats.org/officeDocument/2006/relationships" xmlns:p="http://schemas.openxmlformats.org/presentationml/2006/main">
+  <p:cSld>
+    <p:spTree>
+      <p:nvGrpSpPr>
+        <p:cNvPr id="1" name=""/>
+        <p:cNvGrpSpPr/>
+        <p:nvPr/>
+      </p:nvGrpSpPr>
+      <p:grpSpPr>
+        <a:xfrm>
+          <a:off x="0" y="0"/>
+          <a:ext cx="0" cy="0"/>
+          <a:chOff x="0" y="0"/>
+          <a:chExt cx="0" cy="0"/>
+        </a:xfrm>
+      </p:grpSpPr>
+      <p:pic>
+        <p:nvPicPr>
+          <p:cNvPr id="5" name="그림 4">
+            <a:extLst>
+              <a:ext uri="{FF2B5EF4-FFF2-40B4-BE49-F238E27FC236}">
+                <a16:creationId xmlns:a16="http://schemas.microsoft.com/office/drawing/2014/main" id="{C8C3F91E-8E52-0E59-7EE0-4022F0CB8B06}"/>
+              </a:ext>
+            </a:extLst>
+          </p:cNvPr>
+          <p:cNvPicPr>
+            <a:picLocks noChangeAspect="1"/>
+          </p:cNvPicPr>
+          <p:nvPr/>
+        </p:nvPicPr>
+        <p:blipFill>
+          <a:blip r:embed="rId2"/>
+          <a:stretch>
+            <a:fillRect/>
+          </a:stretch>
+        </p:blipFill>
+        <p:spPr>
+          <a:xfrm>
+            <a:off x="861282" y="1728550"/>
+            <a:ext cx="10469436" cy="3400900"/>
+          </a:xfrm>
+          <a:prstGeom prst="rect">
+            <a:avLst/>
+          </a:prstGeom>
+        </p:spPr>
+      </p:pic>
+      <p:grpSp>
+        <p:nvGrpSpPr>
+          <p:cNvPr id="6" name="그룹 5">
+            <a:extLst>
+              <a:ext uri="{FF2B5EF4-FFF2-40B4-BE49-F238E27FC236}">
+                <a16:creationId xmlns:a16="http://schemas.microsoft.com/office/drawing/2014/main" id="{E2019078-3643-2DA0-E724-15DDF4CF1CB0}"/>
+              </a:ext>
+            </a:extLst>
+          </p:cNvPr>
+          <p:cNvGrpSpPr/>
+          <p:nvPr/>
+        </p:nvGrpSpPr>
+        <p:grpSpPr>
+          <a:xfrm>
+            <a:off x="1694600" y="2335793"/>
+            <a:ext cx="832920" cy="3141553"/>
+            <a:chOff x="716826" y="1530036"/>
+            <a:chExt cx="832920" cy="1817483"/>
+          </a:xfrm>
+        </p:grpSpPr>
+        <p:sp>
+          <p:nvSpPr>
+            <p:cNvPr id="7" name="직사각형 6">
+              <a:extLst>
+                <a:ext uri="{FF2B5EF4-FFF2-40B4-BE49-F238E27FC236}">
+                  <a16:creationId xmlns:a16="http://schemas.microsoft.com/office/drawing/2014/main" id="{505FB0BE-C58A-5494-69AE-E620AB44626B}"/>
+                </a:ext>
+              </a:extLst>
+            </p:cNvPr>
+            <p:cNvSpPr/>
+            <p:nvPr/>
+          </p:nvSpPr>
+          <p:spPr>
+            <a:xfrm>
+              <a:off x="716827" y="1530036"/>
+              <a:ext cx="832919" cy="905347"/>
+            </a:xfrm>
+            <a:prstGeom prst="rect">
+              <a:avLst/>
+            </a:prstGeom>
+            <a:noFill/>
+            <a:ln w="76200">
+              <a:solidFill>
+                <a:srgbClr val="FF0000"/>
+              </a:solidFill>
+            </a:ln>
+          </p:spPr>
+          <p:style>
+            <a:lnRef idx="2">
+              <a:schemeClr val="accent1">
+                <a:shade val="15000"/>
+              </a:schemeClr>
+            </a:lnRef>
+            <a:fillRef idx="1">
+              <a:schemeClr val="accent1"/>
+            </a:fillRef>
+            <a:effectRef idx="0">
+              <a:schemeClr val="accent1"/>
+            </a:effectRef>
+            <a:fontRef idx="minor">
+              <a:schemeClr val="lt1"/>
+            </a:fontRef>
+          </p:style>
+          <p:txBody>
+            <a:bodyPr rtlCol="0" anchor="ctr"/>
+            <a:lstStyle/>
+            <a:p>
+              <a:pPr algn="ctr"/>
+              <a:endParaRPr lang="ko-KR" altLang="en-US"/>
+            </a:p>
+          </p:txBody>
+        </p:sp>
+        <p:sp>
+          <p:nvSpPr>
+            <p:cNvPr id="8" name="직사각형 7">
+              <a:extLst>
+                <a:ext uri="{FF2B5EF4-FFF2-40B4-BE49-F238E27FC236}">
+                  <a16:creationId xmlns:a16="http://schemas.microsoft.com/office/drawing/2014/main" id="{5339BE87-96E9-F5A5-5236-C6FA1941F92C}"/>
+                </a:ext>
+              </a:extLst>
+            </p:cNvPr>
+            <p:cNvSpPr/>
+            <p:nvPr/>
+          </p:nvSpPr>
+          <p:spPr>
+            <a:xfrm>
+              <a:off x="716826" y="2442172"/>
+              <a:ext cx="832919" cy="905347"/>
+            </a:xfrm>
+            <a:prstGeom prst="rect">
+              <a:avLst/>
+            </a:prstGeom>
+            <a:noFill/>
+            <a:ln w="76200">
+              <a:solidFill>
+                <a:srgbClr val="FF0000"/>
+              </a:solidFill>
+            </a:ln>
+          </p:spPr>
+          <p:style>
+            <a:lnRef idx="2">
+              <a:schemeClr val="accent1">
+                <a:shade val="15000"/>
+              </a:schemeClr>
+            </a:lnRef>
+            <a:fillRef idx="1">
+              <a:schemeClr val="accent1"/>
+            </a:fillRef>
+            <a:effectRef idx="0">
+              <a:schemeClr val="accent1"/>
+            </a:effectRef>
+            <a:fontRef idx="minor">
+              <a:schemeClr val="lt1"/>
+            </a:fontRef>
+          </p:style>
+          <p:txBody>
+            <a:bodyPr rtlCol="0" anchor="ctr"/>
+            <a:lstStyle/>
+            <a:p>
+              <a:pPr algn="ctr"/>
+              <a:endParaRPr lang="ko-KR" altLang="en-US"/>
+            </a:p>
+          </p:txBody>
+        </p:sp>
+      </p:grpSp>
+      <p:grpSp>
+        <p:nvGrpSpPr>
+          <p:cNvPr id="9" name="그룹 8">
+            <a:extLst>
+              <a:ext uri="{FF2B5EF4-FFF2-40B4-BE49-F238E27FC236}">
+                <a16:creationId xmlns:a16="http://schemas.microsoft.com/office/drawing/2014/main" id="{FFD89C14-F237-5EF0-51EF-AEBB7629024B}"/>
+              </a:ext>
+            </a:extLst>
+          </p:cNvPr>
+          <p:cNvGrpSpPr/>
+          <p:nvPr/>
+        </p:nvGrpSpPr>
+        <p:grpSpPr>
+          <a:xfrm>
+            <a:off x="861282" y="2341660"/>
+            <a:ext cx="832920" cy="3141553"/>
+            <a:chOff x="716826" y="1530036"/>
+            <a:chExt cx="832920" cy="1817483"/>
+          </a:xfrm>
+        </p:grpSpPr>
+        <p:sp>
+          <p:nvSpPr>
+            <p:cNvPr id="10" name="직사각형 9">
+              <a:extLst>
+                <a:ext uri="{FF2B5EF4-FFF2-40B4-BE49-F238E27FC236}">
+                  <a16:creationId xmlns:a16="http://schemas.microsoft.com/office/drawing/2014/main" id="{A6F4FE6B-DFC0-A8BB-8CF4-7E962965DB37}"/>
+                </a:ext>
+              </a:extLst>
+            </p:cNvPr>
+            <p:cNvSpPr/>
+            <p:nvPr/>
+          </p:nvSpPr>
+          <p:spPr>
+            <a:xfrm>
+              <a:off x="716827" y="1530036"/>
+              <a:ext cx="832919" cy="905347"/>
+            </a:xfrm>
+            <a:prstGeom prst="rect">
+              <a:avLst/>
+            </a:prstGeom>
+            <a:noFill/>
+            <a:ln w="76200">
+              <a:solidFill>
+                <a:srgbClr val="FF0000"/>
+              </a:solidFill>
+            </a:ln>
+          </p:spPr>
+          <p:style>
+            <a:lnRef idx="2">
+              <a:schemeClr val="accent1">
+                <a:shade val="15000"/>
+              </a:schemeClr>
+            </a:lnRef>
+            <a:fillRef idx="1">
+              <a:schemeClr val="accent1"/>
+            </a:fillRef>
+            <a:effectRef idx="0">
+              <a:schemeClr val="accent1"/>
+            </a:effectRef>
+            <a:fontRef idx="minor">
+              <a:schemeClr val="lt1"/>
+            </a:fontRef>
+          </p:style>
+          <p:txBody>
+            <a:bodyPr rtlCol="0" anchor="ctr"/>
+            <a:lstStyle/>
+            <a:p>
+              <a:pPr algn="ctr"/>
+              <a:endParaRPr lang="ko-KR" altLang="en-US"/>
+            </a:p>
+          </p:txBody>
+        </p:sp>
+        <p:sp>
+          <p:nvSpPr>
+            <p:cNvPr id="11" name="직사각형 10">
+              <a:extLst>
+                <a:ext uri="{FF2B5EF4-FFF2-40B4-BE49-F238E27FC236}">
+                  <a16:creationId xmlns:a16="http://schemas.microsoft.com/office/drawing/2014/main" id="{BE4E3654-5DD3-AA73-F73B-0F292ADBD600}"/>
+                </a:ext>
+              </a:extLst>
+            </p:cNvPr>
+            <p:cNvSpPr/>
+            <p:nvPr/>
+          </p:nvSpPr>
+          <p:spPr>
+            <a:xfrm>
+              <a:off x="716826" y="2442172"/>
+              <a:ext cx="832919" cy="905347"/>
+            </a:xfrm>
+            <a:prstGeom prst="rect">
+              <a:avLst/>
+            </a:prstGeom>
+            <a:noFill/>
+            <a:ln w="76200">
+              <a:solidFill>
+                <a:srgbClr val="FF0000"/>
+              </a:solidFill>
+            </a:ln>
+          </p:spPr>
+          <p:style>
+            <a:lnRef idx="2">
+              <a:schemeClr val="accent1">
+                <a:shade val="15000"/>
+              </a:schemeClr>
+            </a:lnRef>
+            <a:fillRef idx="1">
+              <a:schemeClr val="accent1"/>
+            </a:fillRef>
+            <a:effectRef idx="0">
+              <a:schemeClr val="accent1"/>
+            </a:effectRef>
+            <a:fontRef idx="minor">
+              <a:schemeClr val="lt1"/>
+            </a:fontRef>
+          </p:style>
+          <p:txBody>
+            <a:bodyPr rtlCol="0" anchor="ctr"/>
+            <a:lstStyle/>
+            <a:p>
+              <a:pPr algn="ctr"/>
+              <a:endParaRPr lang="ko-KR" altLang="en-US"/>
+            </a:p>
+          </p:txBody>
+        </p:sp>
+      </p:grpSp>
+      <p:grpSp>
+        <p:nvGrpSpPr>
+          <p:cNvPr id="12" name="그룹 11">
+            <a:extLst>
+              <a:ext uri="{FF2B5EF4-FFF2-40B4-BE49-F238E27FC236}">
+                <a16:creationId xmlns:a16="http://schemas.microsoft.com/office/drawing/2014/main" id="{6702FFA9-D5A8-9665-8453-6685A291B120}"/>
+              </a:ext>
+            </a:extLst>
+          </p:cNvPr>
+          <p:cNvGrpSpPr/>
+          <p:nvPr/>
+        </p:nvGrpSpPr>
+        <p:grpSpPr>
+          <a:xfrm>
+            <a:off x="2527519" y="2341660"/>
+            <a:ext cx="832920" cy="3141553"/>
+            <a:chOff x="716826" y="1530036"/>
+            <a:chExt cx="832920" cy="1817483"/>
+          </a:xfrm>
+        </p:grpSpPr>
+        <p:sp>
+          <p:nvSpPr>
+            <p:cNvPr id="13" name="직사각형 12">
+              <a:extLst>
+                <a:ext uri="{FF2B5EF4-FFF2-40B4-BE49-F238E27FC236}">
+                  <a16:creationId xmlns:a16="http://schemas.microsoft.com/office/drawing/2014/main" id="{C8D3C428-38C7-2E74-C6A8-5C66591DB3C9}"/>
+                </a:ext>
+              </a:extLst>
+            </p:cNvPr>
+            <p:cNvSpPr/>
+            <p:nvPr/>
+          </p:nvSpPr>
+          <p:spPr>
+            <a:xfrm>
+              <a:off x="716827" y="1530036"/>
+              <a:ext cx="832919" cy="905347"/>
+            </a:xfrm>
+            <a:prstGeom prst="rect">
+              <a:avLst/>
+            </a:prstGeom>
+            <a:noFill/>
+            <a:ln w="76200">
+              <a:solidFill>
+                <a:srgbClr val="FF0000"/>
+              </a:solidFill>
+            </a:ln>
+          </p:spPr>
+          <p:style>
+            <a:lnRef idx="2">
+              <a:schemeClr val="accent1">
+                <a:shade val="15000"/>
+              </a:schemeClr>
+            </a:lnRef>
+            <a:fillRef idx="1">
+              <a:schemeClr val="accent1"/>
+            </a:fillRef>
+            <a:effectRef idx="0">
+              <a:schemeClr val="accent1"/>
+            </a:effectRef>
+            <a:fontRef idx="minor">
+              <a:schemeClr val="lt1"/>
+            </a:fontRef>
+          </p:style>
+          <p:txBody>
+            <a:bodyPr rtlCol="0" anchor="ctr"/>
+            <a:lstStyle/>
+            <a:p>
+              <a:pPr algn="ctr"/>
+              <a:endParaRPr lang="ko-KR" altLang="en-US"/>
+            </a:p>
+          </p:txBody>
+        </p:sp>
+        <p:sp>
+          <p:nvSpPr>
+            <p:cNvPr id="14" name="직사각형 13">
+              <a:extLst>
+                <a:ext uri="{FF2B5EF4-FFF2-40B4-BE49-F238E27FC236}">
+                  <a16:creationId xmlns:a16="http://schemas.microsoft.com/office/drawing/2014/main" id="{FEDBCE0D-C186-E6BE-E017-8F563395B57E}"/>
+                </a:ext>
+              </a:extLst>
+            </p:cNvPr>
+            <p:cNvSpPr/>
+            <p:nvPr/>
+          </p:nvSpPr>
+          <p:spPr>
+            <a:xfrm>
+              <a:off x="716826" y="2442172"/>
+              <a:ext cx="832919" cy="905347"/>
+            </a:xfrm>
+            <a:prstGeom prst="rect">
+              <a:avLst/>
+            </a:prstGeom>
+            <a:noFill/>
+            <a:ln w="76200">
+              <a:solidFill>
+                <a:srgbClr val="FF0000"/>
+              </a:solidFill>
+            </a:ln>
+          </p:spPr>
+          <p:style>
+            <a:lnRef idx="2">
+              <a:schemeClr val="accent1">
+                <a:shade val="15000"/>
+              </a:schemeClr>
+            </a:lnRef>
+            <a:fillRef idx="1">
+              <a:schemeClr val="accent1"/>
+            </a:fillRef>
+            <a:effectRef idx="0">
+              <a:schemeClr val="accent1"/>
+            </a:effectRef>
+            <a:fontRef idx="minor">
+              <a:schemeClr val="lt1"/>
+            </a:fontRef>
+          </p:style>
+          <p:txBody>
+            <a:bodyPr rtlCol="0" anchor="ctr"/>
+            <a:lstStyle/>
+            <a:p>
+              <a:pPr algn="ctr"/>
+              <a:endParaRPr lang="ko-KR" altLang="en-US"/>
+            </a:p>
+          </p:txBody>
+        </p:sp>
+      </p:grpSp>
+      <p:grpSp>
+        <p:nvGrpSpPr>
+          <p:cNvPr id="15" name="그룹 14">
+            <a:extLst>
+              <a:ext uri="{FF2B5EF4-FFF2-40B4-BE49-F238E27FC236}">
+                <a16:creationId xmlns:a16="http://schemas.microsoft.com/office/drawing/2014/main" id="{BACAB57E-38FA-E142-9D7C-EC575A81254C}"/>
+              </a:ext>
+            </a:extLst>
+          </p:cNvPr>
+          <p:cNvGrpSpPr/>
+          <p:nvPr/>
+        </p:nvGrpSpPr>
+        <p:grpSpPr>
+          <a:xfrm>
+            <a:off x="8338334" y="2329925"/>
+            <a:ext cx="1249285" cy="3141553"/>
+            <a:chOff x="716826" y="1530036"/>
+            <a:chExt cx="832920" cy="1817483"/>
+          </a:xfrm>
+        </p:grpSpPr>
+        <p:sp>
+          <p:nvSpPr>
+            <p:cNvPr id="16" name="직사각형 15">
+              <a:extLst>
+                <a:ext uri="{FF2B5EF4-FFF2-40B4-BE49-F238E27FC236}">
+                  <a16:creationId xmlns:a16="http://schemas.microsoft.com/office/drawing/2014/main" id="{DD6C5CB0-3F46-8198-B2D4-8872EDD887F0}"/>
+                </a:ext>
+              </a:extLst>
+            </p:cNvPr>
+            <p:cNvSpPr/>
+            <p:nvPr/>
+          </p:nvSpPr>
+          <p:spPr>
+            <a:xfrm>
+              <a:off x="716827" y="1530036"/>
+              <a:ext cx="832919" cy="905347"/>
+            </a:xfrm>
+            <a:prstGeom prst="rect">
+              <a:avLst/>
+            </a:prstGeom>
+            <a:noFill/>
+            <a:ln w="76200">
+              <a:solidFill>
+                <a:srgbClr val="FF0000"/>
+              </a:solidFill>
+            </a:ln>
+          </p:spPr>
+          <p:style>
+            <a:lnRef idx="2">
+              <a:schemeClr val="accent1">
+                <a:shade val="15000"/>
+              </a:schemeClr>
+            </a:lnRef>
+            <a:fillRef idx="1">
+              <a:schemeClr val="accent1"/>
+            </a:fillRef>
+            <a:effectRef idx="0">
+              <a:schemeClr val="accent1"/>
+            </a:effectRef>
+            <a:fontRef idx="minor">
+              <a:schemeClr val="lt1"/>
+            </a:fontRef>
+          </p:style>
+          <p:txBody>
+            <a:bodyPr rtlCol="0" anchor="ctr"/>
+            <a:lstStyle/>
+            <a:p>
+              <a:pPr algn="ctr"/>
+              <a:endParaRPr lang="ko-KR" altLang="en-US"/>
+            </a:p>
+          </p:txBody>
+        </p:sp>
+        <p:sp>
+          <p:nvSpPr>
+            <p:cNvPr id="17" name="직사각형 16">
+              <a:extLst>
+                <a:ext uri="{FF2B5EF4-FFF2-40B4-BE49-F238E27FC236}">
+                  <a16:creationId xmlns:a16="http://schemas.microsoft.com/office/drawing/2014/main" id="{0E6C6AA5-C2A2-75F6-4522-0D3935536037}"/>
+                </a:ext>
+              </a:extLst>
+            </p:cNvPr>
+            <p:cNvSpPr/>
+            <p:nvPr/>
+          </p:nvSpPr>
+          <p:spPr>
+            <a:xfrm>
+              <a:off x="716826" y="2442172"/>
+              <a:ext cx="832919" cy="905347"/>
+            </a:xfrm>
+            <a:prstGeom prst="rect">
+              <a:avLst/>
+            </a:prstGeom>
+            <a:noFill/>
+            <a:ln w="76200">
+              <a:solidFill>
+                <a:srgbClr val="FF0000"/>
+              </a:solidFill>
+            </a:ln>
+          </p:spPr>
+          <p:style>
+            <a:lnRef idx="2">
+              <a:schemeClr val="accent1">
+                <a:shade val="15000"/>
+              </a:schemeClr>
+            </a:lnRef>
+            <a:fillRef idx="1">
+              <a:schemeClr val="accent1"/>
+            </a:fillRef>
+            <a:effectRef idx="0">
+              <a:schemeClr val="accent1"/>
+            </a:effectRef>
+            <a:fontRef idx="minor">
+              <a:schemeClr val="lt1"/>
+            </a:fontRef>
+          </p:style>
+          <p:txBody>
+            <a:bodyPr rtlCol="0" anchor="ctr"/>
+            <a:lstStyle/>
+            <a:p>
+              <a:pPr algn="ctr"/>
+              <a:endParaRPr lang="ko-KR" altLang="en-US"/>
+            </a:p>
+          </p:txBody>
+        </p:sp>
+      </p:grpSp>
+      <p:grpSp>
+        <p:nvGrpSpPr>
+          <p:cNvPr id="18" name="그룹 17">
+            <a:extLst>
+              <a:ext uri="{FF2B5EF4-FFF2-40B4-BE49-F238E27FC236}">
+                <a16:creationId xmlns:a16="http://schemas.microsoft.com/office/drawing/2014/main" id="{42381C79-89EA-780F-11DD-4C86B80167AC}"/>
+              </a:ext>
+            </a:extLst>
+          </p:cNvPr>
+          <p:cNvGrpSpPr/>
+          <p:nvPr/>
+        </p:nvGrpSpPr>
+        <p:grpSpPr>
+          <a:xfrm>
+            <a:off x="9588206" y="2324057"/>
+            <a:ext cx="832920" cy="3141553"/>
+            <a:chOff x="716826" y="1530036"/>
+            <a:chExt cx="832920" cy="1817483"/>
+          </a:xfrm>
+        </p:grpSpPr>
+        <p:sp>
+          <p:nvSpPr>
+            <p:cNvPr id="19" name="직사각형 18">
+              <a:extLst>
+                <a:ext uri="{FF2B5EF4-FFF2-40B4-BE49-F238E27FC236}">
+                  <a16:creationId xmlns:a16="http://schemas.microsoft.com/office/drawing/2014/main" id="{7182781B-7238-E0E1-4918-E0A5BB95591E}"/>
+                </a:ext>
+              </a:extLst>
+            </p:cNvPr>
+            <p:cNvSpPr/>
+            <p:nvPr/>
+          </p:nvSpPr>
+          <p:spPr>
+            <a:xfrm>
+              <a:off x="716827" y="1530036"/>
+              <a:ext cx="832919" cy="905347"/>
+            </a:xfrm>
+            <a:prstGeom prst="rect">
+              <a:avLst/>
+            </a:prstGeom>
+            <a:noFill/>
+            <a:ln w="76200">
+              <a:solidFill>
+                <a:srgbClr val="FF0000"/>
+              </a:solidFill>
+            </a:ln>
+          </p:spPr>
+          <p:style>
+            <a:lnRef idx="2">
+              <a:schemeClr val="accent1">
+                <a:shade val="15000"/>
+              </a:schemeClr>
+            </a:lnRef>
+            <a:fillRef idx="1">
+              <a:schemeClr val="accent1"/>
+            </a:fillRef>
+            <a:effectRef idx="0">
+              <a:schemeClr val="accent1"/>
+            </a:effectRef>
+            <a:fontRef idx="minor">
+              <a:schemeClr val="lt1"/>
+            </a:fontRef>
+          </p:style>
+          <p:txBody>
+            <a:bodyPr rtlCol="0" anchor="ctr"/>
+            <a:lstStyle/>
+            <a:p>
+              <a:pPr algn="ctr"/>
+              <a:endParaRPr lang="ko-KR" altLang="en-US"/>
+            </a:p>
+          </p:txBody>
+        </p:sp>
+        <p:sp>
+          <p:nvSpPr>
+            <p:cNvPr id="20" name="직사각형 19">
+              <a:extLst>
+                <a:ext uri="{FF2B5EF4-FFF2-40B4-BE49-F238E27FC236}">
+                  <a16:creationId xmlns:a16="http://schemas.microsoft.com/office/drawing/2014/main" id="{E3EDB9CA-D67D-0AD2-F5DE-9B6A7C17A97D}"/>
+                </a:ext>
+              </a:extLst>
+            </p:cNvPr>
+            <p:cNvSpPr/>
+            <p:nvPr/>
+          </p:nvSpPr>
+          <p:spPr>
+            <a:xfrm>
+              <a:off x="716826" y="2442172"/>
+              <a:ext cx="832919" cy="905347"/>
+            </a:xfrm>
+            <a:prstGeom prst="rect">
+              <a:avLst/>
+            </a:prstGeom>
+            <a:noFill/>
+            <a:ln w="76200">
+              <a:solidFill>
+                <a:srgbClr val="FF0000"/>
+              </a:solidFill>
+            </a:ln>
+          </p:spPr>
+          <p:style>
+            <a:lnRef idx="2">
+              <a:schemeClr val="accent1">
+                <a:shade val="15000"/>
+              </a:schemeClr>
+            </a:lnRef>
+            <a:fillRef idx="1">
+              <a:schemeClr val="accent1"/>
+            </a:fillRef>
+            <a:effectRef idx="0">
+              <a:schemeClr val="accent1"/>
+            </a:effectRef>
+            <a:fontRef idx="minor">
+              <a:schemeClr val="lt1"/>
+            </a:fontRef>
+          </p:style>
+          <p:txBody>
+            <a:bodyPr rtlCol="0" anchor="ctr"/>
+            <a:lstStyle/>
+            <a:p>
+              <a:pPr algn="ctr"/>
+              <a:endParaRPr lang="ko-KR" altLang="en-US"/>
+            </a:p>
+          </p:txBody>
+        </p:sp>
+      </p:grpSp>
+      <p:grpSp>
+        <p:nvGrpSpPr>
+          <p:cNvPr id="21" name="그룹 20">
+            <a:extLst>
+              <a:ext uri="{FF2B5EF4-FFF2-40B4-BE49-F238E27FC236}">
+                <a16:creationId xmlns:a16="http://schemas.microsoft.com/office/drawing/2014/main" id="{BABB6474-4988-7498-E6B9-21932A58578F}"/>
+              </a:ext>
+            </a:extLst>
+          </p:cNvPr>
+          <p:cNvGrpSpPr/>
+          <p:nvPr/>
+        </p:nvGrpSpPr>
+        <p:grpSpPr>
+          <a:xfrm>
+            <a:off x="10421030" y="2318189"/>
+            <a:ext cx="832920" cy="3141553"/>
+            <a:chOff x="716826" y="1530036"/>
+            <a:chExt cx="832920" cy="1817483"/>
+          </a:xfrm>
+        </p:grpSpPr>
+        <p:sp>
+          <p:nvSpPr>
+            <p:cNvPr id="22" name="직사각형 21">
+              <a:extLst>
+                <a:ext uri="{FF2B5EF4-FFF2-40B4-BE49-F238E27FC236}">
+                  <a16:creationId xmlns:a16="http://schemas.microsoft.com/office/drawing/2014/main" id="{6E03629A-24EC-B9FF-CC02-9052990071E1}"/>
+                </a:ext>
+              </a:extLst>
+            </p:cNvPr>
+            <p:cNvSpPr/>
+            <p:nvPr/>
+          </p:nvSpPr>
+          <p:spPr>
+            <a:xfrm>
+              <a:off x="716827" y="1530036"/>
+              <a:ext cx="832919" cy="905347"/>
+            </a:xfrm>
+            <a:prstGeom prst="rect">
+              <a:avLst/>
+            </a:prstGeom>
+            <a:noFill/>
+            <a:ln w="76200">
+              <a:solidFill>
+                <a:srgbClr val="FF0000"/>
+              </a:solidFill>
+            </a:ln>
+          </p:spPr>
+          <p:style>
+            <a:lnRef idx="2">
+              <a:schemeClr val="accent1">
+                <a:shade val="15000"/>
+              </a:schemeClr>
+            </a:lnRef>
+            <a:fillRef idx="1">
+              <a:schemeClr val="accent1"/>
+            </a:fillRef>
+            <a:effectRef idx="0">
+              <a:schemeClr val="accent1"/>
+            </a:effectRef>
+            <a:fontRef idx="minor">
+              <a:schemeClr val="lt1"/>
+            </a:fontRef>
+          </p:style>
+          <p:txBody>
+            <a:bodyPr rtlCol="0" anchor="ctr"/>
+            <a:lstStyle/>
+            <a:p>
+              <a:pPr algn="ctr"/>
+              <a:endParaRPr lang="ko-KR" altLang="en-US"/>
+            </a:p>
+          </p:txBody>
+        </p:sp>
+        <p:sp>
+          <p:nvSpPr>
+            <p:cNvPr id="23" name="직사각형 22">
+              <a:extLst>
+                <a:ext uri="{FF2B5EF4-FFF2-40B4-BE49-F238E27FC236}">
+                  <a16:creationId xmlns:a16="http://schemas.microsoft.com/office/drawing/2014/main" id="{065D440A-24E3-240A-4F08-25739D53C762}"/>
+                </a:ext>
+              </a:extLst>
+            </p:cNvPr>
+            <p:cNvSpPr/>
+            <p:nvPr/>
+          </p:nvSpPr>
+          <p:spPr>
+            <a:xfrm>
+              <a:off x="716826" y="2442172"/>
+              <a:ext cx="832919" cy="905347"/>
+            </a:xfrm>
+            <a:prstGeom prst="rect">
+              <a:avLst/>
+            </a:prstGeom>
+            <a:noFill/>
+            <a:ln w="76200">
+              <a:solidFill>
+                <a:srgbClr val="FF0000"/>
+              </a:solidFill>
+            </a:ln>
+          </p:spPr>
+          <p:style>
+            <a:lnRef idx="2">
+              <a:schemeClr val="accent1">
+                <a:shade val="15000"/>
+              </a:schemeClr>
+            </a:lnRef>
+            <a:fillRef idx="1">
+              <a:schemeClr val="accent1"/>
+            </a:fillRef>
+            <a:effectRef idx="0">
+              <a:schemeClr val="accent1"/>
+            </a:effectRef>
+            <a:fontRef idx="minor">
+              <a:schemeClr val="lt1"/>
+            </a:fontRef>
+          </p:style>
+          <p:txBody>
+            <a:bodyPr rtlCol="0" anchor="ctr"/>
+            <a:lstStyle/>
+            <a:p>
+              <a:pPr algn="ctr"/>
+              <a:endParaRPr lang="ko-KR" altLang="en-US"/>
+            </a:p>
+          </p:txBody>
+        </p:sp>
+      </p:grpSp>
+    </p:spTree>
+    <p:extLst>
+      <p:ext uri="{BB962C8B-B14F-4D97-AF65-F5344CB8AC3E}">
+        <p14:creationId xmlns:p14="http://schemas.microsoft.com/office/powerpoint/2010/main" val="4023138304"/>
+      </p:ext>
+    </p:extLst>
+  </p:cSld>
+  <p:clrMapOvr>
+    <a:masterClrMapping/>
+  </p:clrMapOvr>
+</p:sld>
+</file>
+
 <file path=ppt/theme/theme1.xml><?xml version="1.0" encoding="utf-8"?>
 <a:theme xmlns:a="http://schemas.openxmlformats.org/drawingml/2006/main" name="Office 테마">
   <a:themeElements>

</xml_diff>

<commit_message>
feat: TCP/IP communication system and multilingual support completed
</commit_message>
<xml_diff>
--- a/UI.pptx
+++ b/UI.pptx
@@ -13,6 +13,8 @@
     <p:sldId id="261" r:id="rId7"/>
     <p:sldId id="263" r:id="rId8"/>
     <p:sldId id="262" r:id="rId9"/>
+    <p:sldId id="264" r:id="rId10"/>
+    <p:sldId id="265" r:id="rId11"/>
   </p:sldIdLst>
   <p:sldSz cx="12192000" cy="10799763"/>
   <p:notesSz cx="6858000" cy="9144000"/>
@@ -250,7 +252,7 @@
           <a:p>
             <a:fld id="{3AFA5745-1944-4375-9A62-C9C7A2D27294}" type="datetimeFigureOut">
               <a:rPr lang="ko-KR" altLang="en-US" smtClean="0"/>
-              <a:t>2025-09-22</a:t>
+              <a:t>2025-10-03</a:t>
             </a:fld>
             <a:endParaRPr lang="ko-KR" altLang="en-US"/>
           </a:p>
@@ -420,7 +422,7 @@
           <a:p>
             <a:fld id="{3AFA5745-1944-4375-9A62-C9C7A2D27294}" type="datetimeFigureOut">
               <a:rPr lang="ko-KR" altLang="en-US" smtClean="0"/>
-              <a:t>2025-09-22</a:t>
+              <a:t>2025-10-03</a:t>
             </a:fld>
             <a:endParaRPr lang="ko-KR" altLang="en-US"/>
           </a:p>
@@ -600,7 +602,7 @@
           <a:p>
             <a:fld id="{3AFA5745-1944-4375-9A62-C9C7A2D27294}" type="datetimeFigureOut">
               <a:rPr lang="ko-KR" altLang="en-US" smtClean="0"/>
-              <a:t>2025-09-22</a:t>
+              <a:t>2025-10-03</a:t>
             </a:fld>
             <a:endParaRPr lang="ko-KR" altLang="en-US"/>
           </a:p>
@@ -770,7 +772,7 @@
           <a:p>
             <a:fld id="{3AFA5745-1944-4375-9A62-C9C7A2D27294}" type="datetimeFigureOut">
               <a:rPr lang="ko-KR" altLang="en-US" smtClean="0"/>
-              <a:t>2025-09-22</a:t>
+              <a:t>2025-10-03</a:t>
             </a:fld>
             <a:endParaRPr lang="ko-KR" altLang="en-US"/>
           </a:p>
@@ -1016,7 +1018,7 @@
           <a:p>
             <a:fld id="{3AFA5745-1944-4375-9A62-C9C7A2D27294}" type="datetimeFigureOut">
               <a:rPr lang="ko-KR" altLang="en-US" smtClean="0"/>
-              <a:t>2025-09-22</a:t>
+              <a:t>2025-10-03</a:t>
             </a:fld>
             <a:endParaRPr lang="ko-KR" altLang="en-US"/>
           </a:p>
@@ -1248,7 +1250,7 @@
           <a:p>
             <a:fld id="{3AFA5745-1944-4375-9A62-C9C7A2D27294}" type="datetimeFigureOut">
               <a:rPr lang="ko-KR" altLang="en-US" smtClean="0"/>
-              <a:t>2025-09-22</a:t>
+              <a:t>2025-10-03</a:t>
             </a:fld>
             <a:endParaRPr lang="ko-KR" altLang="en-US"/>
           </a:p>
@@ -1615,7 +1617,7 @@
           <a:p>
             <a:fld id="{3AFA5745-1944-4375-9A62-C9C7A2D27294}" type="datetimeFigureOut">
               <a:rPr lang="ko-KR" altLang="en-US" smtClean="0"/>
-              <a:t>2025-09-22</a:t>
+              <a:t>2025-10-03</a:t>
             </a:fld>
             <a:endParaRPr lang="ko-KR" altLang="en-US"/>
           </a:p>
@@ -1733,7 +1735,7 @@
           <a:p>
             <a:fld id="{3AFA5745-1944-4375-9A62-C9C7A2D27294}" type="datetimeFigureOut">
               <a:rPr lang="ko-KR" altLang="en-US" smtClean="0"/>
-              <a:t>2025-09-22</a:t>
+              <a:t>2025-10-03</a:t>
             </a:fld>
             <a:endParaRPr lang="ko-KR" altLang="en-US"/>
           </a:p>
@@ -1828,7 +1830,7 @@
           <a:p>
             <a:fld id="{3AFA5745-1944-4375-9A62-C9C7A2D27294}" type="datetimeFigureOut">
               <a:rPr lang="ko-KR" altLang="en-US" smtClean="0"/>
-              <a:t>2025-09-22</a:t>
+              <a:t>2025-10-03</a:t>
             </a:fld>
             <a:endParaRPr lang="ko-KR" altLang="en-US"/>
           </a:p>
@@ -2105,7 +2107,7 @@
           <a:p>
             <a:fld id="{3AFA5745-1944-4375-9A62-C9C7A2D27294}" type="datetimeFigureOut">
               <a:rPr lang="ko-KR" altLang="en-US" smtClean="0"/>
-              <a:t>2025-09-22</a:t>
+              <a:t>2025-10-03</a:t>
             </a:fld>
             <a:endParaRPr lang="ko-KR" altLang="en-US"/>
           </a:p>
@@ -2362,7 +2364,7 @@
           <a:p>
             <a:fld id="{3AFA5745-1944-4375-9A62-C9C7A2D27294}" type="datetimeFigureOut">
               <a:rPr lang="ko-KR" altLang="en-US" smtClean="0"/>
-              <a:t>2025-09-22</a:t>
+              <a:t>2025-10-03</a:t>
             </a:fld>
             <a:endParaRPr lang="ko-KR" altLang="en-US"/>
           </a:p>
@@ -2575,7 +2577,7 @@
           <a:p>
             <a:fld id="{3AFA5745-1944-4375-9A62-C9C7A2D27294}" type="datetimeFigureOut">
               <a:rPr lang="ko-KR" altLang="en-US" smtClean="0"/>
-              <a:t>2025-09-22</a:t>
+              <a:t>2025-10-03</a:t>
             </a:fld>
             <a:endParaRPr lang="ko-KR" altLang="en-US"/>
           </a:p>
@@ -3397,6 +3399,96 @@
     <p:extLst>
       <p:ext uri="{BB962C8B-B14F-4D97-AF65-F5344CB8AC3E}">
         <p14:creationId xmlns:p14="http://schemas.microsoft.com/office/powerpoint/2010/main" val="171691100"/>
+      </p:ext>
+    </p:extLst>
+  </p:cSld>
+  <p:clrMapOvr>
+    <a:masterClrMapping/>
+  </p:clrMapOvr>
+</p:sld>
+</file>
+
+<file path=ppt/slides/slide10.xml><?xml version="1.0" encoding="utf-8"?>
+<p:sld xmlns:a="http://schemas.openxmlformats.org/drawingml/2006/main" xmlns:r="http://schemas.openxmlformats.org/officeDocument/2006/relationships" xmlns:p="http://schemas.openxmlformats.org/presentationml/2006/main">
+  <p:cSld>
+    <p:spTree>
+      <p:nvGrpSpPr>
+        <p:cNvPr id="1" name=""/>
+        <p:cNvGrpSpPr/>
+        <p:nvPr/>
+      </p:nvGrpSpPr>
+      <p:grpSpPr>
+        <a:xfrm>
+          <a:off x="0" y="0"/>
+          <a:ext cx="0" cy="0"/>
+          <a:chOff x="0" y="0"/>
+          <a:chExt cx="0" cy="0"/>
+        </a:xfrm>
+      </p:grpSpPr>
+      <p:pic>
+        <p:nvPicPr>
+          <p:cNvPr id="5" name="그림 4">
+            <a:extLst>
+              <a:ext uri="{FF2B5EF4-FFF2-40B4-BE49-F238E27FC236}">
+                <a16:creationId xmlns:a16="http://schemas.microsoft.com/office/drawing/2014/main" id="{A717D48C-11FA-62A0-5C39-50697A765A14}"/>
+              </a:ext>
+            </a:extLst>
+          </p:cNvPr>
+          <p:cNvPicPr>
+            <a:picLocks noChangeAspect="1"/>
+          </p:cNvPicPr>
+          <p:nvPr/>
+        </p:nvPicPr>
+        <p:blipFill>
+          <a:blip r:embed="rId2"/>
+          <a:stretch>
+            <a:fillRect/>
+          </a:stretch>
+        </p:blipFill>
+        <p:spPr>
+          <a:xfrm>
+            <a:off x="2144710" y="595192"/>
+            <a:ext cx="7210047" cy="4804689"/>
+          </a:xfrm>
+          <a:prstGeom prst="rect">
+            <a:avLst/>
+          </a:prstGeom>
+        </p:spPr>
+      </p:pic>
+      <p:pic>
+        <p:nvPicPr>
+          <p:cNvPr id="7" name="그림 6">
+            <a:extLst>
+              <a:ext uri="{FF2B5EF4-FFF2-40B4-BE49-F238E27FC236}">
+                <a16:creationId xmlns:a16="http://schemas.microsoft.com/office/drawing/2014/main" id="{FAD186FC-6706-3E69-6E66-AC263D4E7AF7}"/>
+              </a:ext>
+            </a:extLst>
+          </p:cNvPr>
+          <p:cNvPicPr>
+            <a:picLocks noChangeAspect="1"/>
+          </p:cNvPicPr>
+          <p:nvPr/>
+        </p:nvPicPr>
+        <p:blipFill>
+          <a:blip r:embed="rId3"/>
+          <a:stretch>
+            <a:fillRect/>
+          </a:stretch>
+        </p:blipFill>
+        <p:spPr>
+          <a:xfrm>
+            <a:off x="2144710" y="5799270"/>
+            <a:ext cx="7228455" cy="4804689"/>
+          </a:xfrm>
+          <a:prstGeom prst="rect">
+            <a:avLst/>
+          </a:prstGeom>
+        </p:spPr>
+      </p:pic>
+    </p:spTree>
+    <p:extLst>
+      <p:ext uri="{BB962C8B-B14F-4D97-AF65-F5344CB8AC3E}">
+        <p14:creationId xmlns:p14="http://schemas.microsoft.com/office/powerpoint/2010/main" val="1822883450"/>
       </p:ext>
     </p:extLst>
   </p:cSld>
@@ -9512,6 +9604,741 @@
 </p:sld>
 </file>
 
+<file path=ppt/slides/slide9.xml><?xml version="1.0" encoding="utf-8"?>
+<p:sld xmlns:a="http://schemas.openxmlformats.org/drawingml/2006/main" xmlns:r="http://schemas.openxmlformats.org/officeDocument/2006/relationships" xmlns:p="http://schemas.openxmlformats.org/presentationml/2006/main">
+  <p:cSld>
+    <p:spTree>
+      <p:nvGrpSpPr>
+        <p:cNvPr id="1" name=""/>
+        <p:cNvGrpSpPr/>
+        <p:nvPr/>
+      </p:nvGrpSpPr>
+      <p:grpSpPr>
+        <a:xfrm>
+          <a:off x="0" y="0"/>
+          <a:ext cx="0" cy="0"/>
+          <a:chOff x="0" y="0"/>
+          <a:chExt cx="0" cy="0"/>
+        </a:xfrm>
+      </p:grpSpPr>
+      <p:sp>
+        <p:nvSpPr>
+          <p:cNvPr id="4" name="직사각형 3">
+            <a:extLst>
+              <a:ext uri="{FF2B5EF4-FFF2-40B4-BE49-F238E27FC236}">
+                <a16:creationId xmlns:a16="http://schemas.microsoft.com/office/drawing/2014/main" id="{96B126DD-2C9D-8A54-D7FE-3487BC5D11D6}"/>
+              </a:ext>
+            </a:extLst>
+          </p:cNvPr>
+          <p:cNvSpPr/>
+          <p:nvPr/>
+        </p:nvSpPr>
+        <p:spPr>
+          <a:xfrm>
+            <a:off x="641573" y="0"/>
+            <a:ext cx="5145686" cy="3887456"/>
+          </a:xfrm>
+          <a:prstGeom prst="rect">
+            <a:avLst/>
+          </a:prstGeom>
+          <a:noFill/>
+        </p:spPr>
+        <p:style>
+          <a:lnRef idx="2">
+            <a:schemeClr val="accent1">
+              <a:shade val="15000"/>
+            </a:schemeClr>
+          </a:lnRef>
+          <a:fillRef idx="1">
+            <a:schemeClr val="accent1"/>
+          </a:fillRef>
+          <a:effectRef idx="0">
+            <a:schemeClr val="accent1"/>
+          </a:effectRef>
+          <a:fontRef idx="minor">
+            <a:schemeClr val="lt1"/>
+          </a:fontRef>
+        </p:style>
+        <p:txBody>
+          <a:bodyPr rtlCol="0" anchor="ctr"/>
+          <a:lstStyle/>
+          <a:p>
+            <a:pPr algn="ctr"/>
+            <a:endParaRPr lang="ko-KR" altLang="en-US"/>
+          </a:p>
+        </p:txBody>
+      </p:sp>
+      <p:sp>
+        <p:nvSpPr>
+          <p:cNvPr id="9" name="사각형: 둥근 모서리 8">
+            <a:extLst>
+              <a:ext uri="{FF2B5EF4-FFF2-40B4-BE49-F238E27FC236}">
+                <a16:creationId xmlns:a16="http://schemas.microsoft.com/office/drawing/2014/main" id="{F35F2C24-D171-C717-8872-FE200FDAF17B}"/>
+              </a:ext>
+            </a:extLst>
+          </p:cNvPr>
+          <p:cNvSpPr/>
+          <p:nvPr/>
+        </p:nvSpPr>
+        <p:spPr>
+          <a:xfrm>
+            <a:off x="2232115" y="2866204"/>
+            <a:ext cx="1964602" cy="525613"/>
+          </a:xfrm>
+          <a:prstGeom prst="roundRect">
+            <a:avLst/>
+          </a:prstGeom>
+        </p:spPr>
+        <p:style>
+          <a:lnRef idx="2">
+            <a:schemeClr val="accent1">
+              <a:shade val="15000"/>
+            </a:schemeClr>
+          </a:lnRef>
+          <a:fillRef idx="1">
+            <a:schemeClr val="accent1"/>
+          </a:fillRef>
+          <a:effectRef idx="0">
+            <a:schemeClr val="accent1"/>
+          </a:effectRef>
+          <a:fontRef idx="minor">
+            <a:schemeClr val="lt1"/>
+          </a:fontRef>
+        </p:style>
+        <p:txBody>
+          <a:bodyPr rtlCol="0" anchor="ctr"/>
+          <a:lstStyle/>
+          <a:p>
+            <a:pPr algn="ctr"/>
+            <a:r>
+              <a:rPr lang="en-US" altLang="ko-KR"/>
+              <a:t>SAVE</a:t>
+            </a:r>
+            <a:endParaRPr lang="ko-KR" altLang="en-US"/>
+          </a:p>
+        </p:txBody>
+      </p:sp>
+      <p:sp>
+        <p:nvSpPr>
+          <p:cNvPr id="10" name="TextBox 9">
+            <a:extLst>
+              <a:ext uri="{FF2B5EF4-FFF2-40B4-BE49-F238E27FC236}">
+                <a16:creationId xmlns:a16="http://schemas.microsoft.com/office/drawing/2014/main" id="{512487F8-A820-D7CC-6CBB-7A79022F9BF5}"/>
+              </a:ext>
+            </a:extLst>
+          </p:cNvPr>
+          <p:cNvSpPr txBox="1"/>
+          <p:nvPr/>
+        </p:nvSpPr>
+        <p:spPr>
+          <a:xfrm>
+            <a:off x="706412" y="145723"/>
+            <a:ext cx="1149225" cy="369332"/>
+          </a:xfrm>
+          <a:prstGeom prst="rect">
+            <a:avLst/>
+          </a:prstGeom>
+          <a:noFill/>
+        </p:spPr>
+        <p:txBody>
+          <a:bodyPr wrap="none" rtlCol="0">
+            <a:spAutoFit/>
+          </a:bodyPr>
+          <a:lstStyle/>
+          <a:p>
+            <a:r>
+              <a:rPr lang="en-US" altLang="ko-KR"/>
+              <a:t>Language</a:t>
+            </a:r>
+            <a:endParaRPr lang="ko-KR" altLang="en-US"/>
+          </a:p>
+        </p:txBody>
+      </p:sp>
+      <p:cxnSp>
+        <p:nvCxnSpPr>
+          <p:cNvPr id="11" name="직선 연결선 10">
+            <a:extLst>
+              <a:ext uri="{FF2B5EF4-FFF2-40B4-BE49-F238E27FC236}">
+                <a16:creationId xmlns:a16="http://schemas.microsoft.com/office/drawing/2014/main" id="{A453F689-4841-9780-8D75-44EAD7583625}"/>
+              </a:ext>
+            </a:extLst>
+          </p:cNvPr>
+          <p:cNvCxnSpPr>
+            <a:cxnSpLocks/>
+            <a:stCxn id="10" idx="3"/>
+          </p:cNvCxnSpPr>
+          <p:nvPr/>
+        </p:nvCxnSpPr>
+        <p:spPr>
+          <a:xfrm>
+            <a:off x="1855637" y="330389"/>
+            <a:ext cx="3723249" cy="2"/>
+          </a:xfrm>
+          <a:prstGeom prst="line">
+            <a:avLst/>
+          </a:prstGeom>
+        </p:spPr>
+        <p:style>
+          <a:lnRef idx="2">
+            <a:schemeClr val="accent1"/>
+          </a:lnRef>
+          <a:fillRef idx="0">
+            <a:schemeClr val="accent1"/>
+          </a:fillRef>
+          <a:effectRef idx="1">
+            <a:schemeClr val="accent1"/>
+          </a:effectRef>
+          <a:fontRef idx="minor">
+            <a:schemeClr val="tx1"/>
+          </a:fontRef>
+        </p:style>
+      </p:cxnSp>
+      <p:sp>
+        <p:nvSpPr>
+          <p:cNvPr id="18" name="TextBox 17">
+            <a:extLst>
+              <a:ext uri="{FF2B5EF4-FFF2-40B4-BE49-F238E27FC236}">
+                <a16:creationId xmlns:a16="http://schemas.microsoft.com/office/drawing/2014/main" id="{EE3BA5A1-7D93-3C29-326B-45B54A60118E}"/>
+              </a:ext>
+            </a:extLst>
+          </p:cNvPr>
+          <p:cNvSpPr txBox="1"/>
+          <p:nvPr/>
+        </p:nvSpPr>
+        <p:spPr>
+          <a:xfrm>
+            <a:off x="746930" y="1379839"/>
+            <a:ext cx="1157305" cy="369332"/>
+          </a:xfrm>
+          <a:prstGeom prst="rect">
+            <a:avLst/>
+          </a:prstGeom>
+          <a:noFill/>
+        </p:spPr>
+        <p:txBody>
+          <a:bodyPr wrap="none" rtlCol="0">
+            <a:spAutoFit/>
+          </a:bodyPr>
+          <a:lstStyle/>
+          <a:p>
+            <a:r>
+              <a:rPr lang="en-US" altLang="ko-KR"/>
+              <a:t>Port </a:t>
+            </a:r>
+            <a:r>
+              <a:rPr lang="ko-KR" altLang="en-US"/>
+              <a:t>연결</a:t>
+            </a:r>
+          </a:p>
+        </p:txBody>
+      </p:sp>
+      <p:cxnSp>
+        <p:nvCxnSpPr>
+          <p:cNvPr id="19" name="직선 연결선 18">
+            <a:extLst>
+              <a:ext uri="{FF2B5EF4-FFF2-40B4-BE49-F238E27FC236}">
+                <a16:creationId xmlns:a16="http://schemas.microsoft.com/office/drawing/2014/main" id="{27394D57-A180-7008-2972-5BC44C3941E4}"/>
+              </a:ext>
+            </a:extLst>
+          </p:cNvPr>
+          <p:cNvCxnSpPr>
+            <a:cxnSpLocks/>
+            <a:stCxn id="18" idx="3"/>
+          </p:cNvCxnSpPr>
+          <p:nvPr/>
+        </p:nvCxnSpPr>
+        <p:spPr>
+          <a:xfrm>
+            <a:off x="1904235" y="1564505"/>
+            <a:ext cx="3715169" cy="0"/>
+          </a:xfrm>
+          <a:prstGeom prst="line">
+            <a:avLst/>
+          </a:prstGeom>
+        </p:spPr>
+        <p:style>
+          <a:lnRef idx="2">
+            <a:schemeClr val="accent1"/>
+          </a:lnRef>
+          <a:fillRef idx="0">
+            <a:schemeClr val="accent1"/>
+          </a:fillRef>
+          <a:effectRef idx="1">
+            <a:schemeClr val="accent1"/>
+          </a:effectRef>
+          <a:fontRef idx="minor">
+            <a:schemeClr val="tx1"/>
+          </a:fontRef>
+        </p:style>
+      </p:cxnSp>
+      <p:sp>
+        <p:nvSpPr>
+          <p:cNvPr id="20" name="직사각형 19">
+            <a:extLst>
+              <a:ext uri="{FF2B5EF4-FFF2-40B4-BE49-F238E27FC236}">
+                <a16:creationId xmlns:a16="http://schemas.microsoft.com/office/drawing/2014/main" id="{14CC3BCF-9C06-6157-FD90-F967CC9130F3}"/>
+              </a:ext>
+            </a:extLst>
+          </p:cNvPr>
+          <p:cNvSpPr/>
+          <p:nvPr/>
+        </p:nvSpPr>
+        <p:spPr>
+          <a:xfrm>
+            <a:off x="722270" y="1945085"/>
+            <a:ext cx="936462" cy="364895"/>
+          </a:xfrm>
+          <a:prstGeom prst="rect">
+            <a:avLst/>
+          </a:prstGeom>
+        </p:spPr>
+        <p:style>
+          <a:lnRef idx="2">
+            <a:schemeClr val="accent1">
+              <a:shade val="15000"/>
+            </a:schemeClr>
+          </a:lnRef>
+          <a:fillRef idx="1">
+            <a:schemeClr val="accent1"/>
+          </a:fillRef>
+          <a:effectRef idx="0">
+            <a:schemeClr val="accent1"/>
+          </a:effectRef>
+          <a:fontRef idx="minor">
+            <a:schemeClr val="lt1"/>
+          </a:fontRef>
+        </p:style>
+        <p:txBody>
+          <a:bodyPr rtlCol="0" anchor="ctr"/>
+          <a:lstStyle/>
+          <a:p>
+            <a:pPr algn="ctr"/>
+            <a:r>
+              <a:rPr lang="en-US" altLang="ko-KR"/>
+              <a:t>TCP/IP</a:t>
+            </a:r>
+            <a:endParaRPr lang="ko-KR" altLang="en-US"/>
+          </a:p>
+        </p:txBody>
+      </p:sp>
+      <p:sp>
+        <p:nvSpPr>
+          <p:cNvPr id="21" name="직사각형 20">
+            <a:extLst>
+              <a:ext uri="{FF2B5EF4-FFF2-40B4-BE49-F238E27FC236}">
+                <a16:creationId xmlns:a16="http://schemas.microsoft.com/office/drawing/2014/main" id="{AC13C8F8-AA95-8CD6-707F-0F3D96F5D7FB}"/>
+              </a:ext>
+            </a:extLst>
+          </p:cNvPr>
+          <p:cNvSpPr/>
+          <p:nvPr/>
+        </p:nvSpPr>
+        <p:spPr>
+          <a:xfrm>
+            <a:off x="1829801" y="1931016"/>
+            <a:ext cx="1307293" cy="364895"/>
+          </a:xfrm>
+          <a:prstGeom prst="rect">
+            <a:avLst/>
+          </a:prstGeom>
+          <a:noFill/>
+        </p:spPr>
+        <p:style>
+          <a:lnRef idx="2">
+            <a:schemeClr val="accent1">
+              <a:shade val="15000"/>
+            </a:schemeClr>
+          </a:lnRef>
+          <a:fillRef idx="1">
+            <a:schemeClr val="accent1"/>
+          </a:fillRef>
+          <a:effectRef idx="0">
+            <a:schemeClr val="accent1"/>
+          </a:effectRef>
+          <a:fontRef idx="minor">
+            <a:schemeClr val="lt1"/>
+          </a:fontRef>
+        </p:style>
+        <p:txBody>
+          <a:bodyPr rtlCol="0" anchor="ctr"/>
+          <a:lstStyle/>
+          <a:p>
+            <a:pPr algn="ctr"/>
+            <a:endParaRPr lang="ko-KR" altLang="en-US"/>
+          </a:p>
+        </p:txBody>
+      </p:sp>
+      <p:sp>
+        <p:nvSpPr>
+          <p:cNvPr id="24" name="직사각형 23">
+            <a:extLst>
+              <a:ext uri="{FF2B5EF4-FFF2-40B4-BE49-F238E27FC236}">
+                <a16:creationId xmlns:a16="http://schemas.microsoft.com/office/drawing/2014/main" id="{F7F711A7-2519-26CF-F469-1FEEA85E8BE1}"/>
+              </a:ext>
+            </a:extLst>
+          </p:cNvPr>
+          <p:cNvSpPr/>
+          <p:nvPr/>
+        </p:nvSpPr>
+        <p:spPr>
+          <a:xfrm>
+            <a:off x="4448395" y="1915035"/>
+            <a:ext cx="936462" cy="364895"/>
+          </a:xfrm>
+          <a:prstGeom prst="rect">
+            <a:avLst/>
+          </a:prstGeom>
+        </p:spPr>
+        <p:style>
+          <a:lnRef idx="2">
+            <a:schemeClr val="accent1">
+              <a:shade val="15000"/>
+            </a:schemeClr>
+          </a:lnRef>
+          <a:fillRef idx="1">
+            <a:schemeClr val="accent1"/>
+          </a:fillRef>
+          <a:effectRef idx="0">
+            <a:schemeClr val="accent1"/>
+          </a:effectRef>
+          <a:fontRef idx="minor">
+            <a:schemeClr val="lt1"/>
+          </a:fontRef>
+        </p:style>
+        <p:txBody>
+          <a:bodyPr rtlCol="0" anchor="ctr"/>
+          <a:lstStyle/>
+          <a:p>
+            <a:pPr algn="ctr"/>
+            <a:r>
+              <a:rPr lang="en-US" altLang="ko-KR" sz="1400"/>
+              <a:t>Connect</a:t>
+            </a:r>
+            <a:endParaRPr lang="ko-KR" altLang="en-US" sz="1400"/>
+          </a:p>
+        </p:txBody>
+      </p:sp>
+      <p:sp>
+        <p:nvSpPr>
+          <p:cNvPr id="34" name="직사각형 33">
+            <a:extLst>
+              <a:ext uri="{FF2B5EF4-FFF2-40B4-BE49-F238E27FC236}">
+                <a16:creationId xmlns:a16="http://schemas.microsoft.com/office/drawing/2014/main" id="{1917DDDA-636A-0AAB-B46B-1E10F1B81FCF}"/>
+              </a:ext>
+            </a:extLst>
+          </p:cNvPr>
+          <p:cNvSpPr/>
+          <p:nvPr/>
+        </p:nvSpPr>
+        <p:spPr>
+          <a:xfrm>
+            <a:off x="1019837" y="685039"/>
+            <a:ext cx="245052" cy="222855"/>
+          </a:xfrm>
+          <a:prstGeom prst="rect">
+            <a:avLst/>
+          </a:prstGeom>
+          <a:noFill/>
+        </p:spPr>
+        <p:style>
+          <a:lnRef idx="2">
+            <a:schemeClr val="accent1">
+              <a:shade val="15000"/>
+            </a:schemeClr>
+          </a:lnRef>
+          <a:fillRef idx="1">
+            <a:schemeClr val="accent1"/>
+          </a:fillRef>
+          <a:effectRef idx="0">
+            <a:schemeClr val="accent1"/>
+          </a:effectRef>
+          <a:fontRef idx="minor">
+            <a:schemeClr val="lt1"/>
+          </a:fontRef>
+        </p:style>
+        <p:txBody>
+          <a:bodyPr rtlCol="0" anchor="ctr"/>
+          <a:lstStyle/>
+          <a:p>
+            <a:pPr algn="ctr"/>
+            <a:endParaRPr lang="ko-KR" altLang="en-US"/>
+          </a:p>
+        </p:txBody>
+      </p:sp>
+      <p:sp>
+        <p:nvSpPr>
+          <p:cNvPr id="35" name="TextBox 34">
+            <a:extLst>
+              <a:ext uri="{FF2B5EF4-FFF2-40B4-BE49-F238E27FC236}">
+                <a16:creationId xmlns:a16="http://schemas.microsoft.com/office/drawing/2014/main" id="{9B37D7E8-F3B4-9D3B-0E52-96B1330A4DC7}"/>
+              </a:ext>
+            </a:extLst>
+          </p:cNvPr>
+          <p:cNvSpPr txBox="1"/>
+          <p:nvPr/>
+        </p:nvSpPr>
+        <p:spPr>
+          <a:xfrm>
+            <a:off x="1332360" y="574772"/>
+            <a:ext cx="954107" cy="400110"/>
+          </a:xfrm>
+          <a:prstGeom prst="rect">
+            <a:avLst/>
+          </a:prstGeom>
+          <a:noFill/>
+        </p:spPr>
+        <p:txBody>
+          <a:bodyPr wrap="none" rtlCol="0">
+            <a:spAutoFit/>
+          </a:bodyPr>
+          <a:lstStyle/>
+          <a:p>
+            <a:r>
+              <a:rPr lang="ko-KR" altLang="en-US" sz="2000"/>
+              <a:t>한국어</a:t>
+            </a:r>
+          </a:p>
+        </p:txBody>
+      </p:sp>
+      <p:sp>
+        <p:nvSpPr>
+          <p:cNvPr id="36" name="직사각형 35">
+            <a:extLst>
+              <a:ext uri="{FF2B5EF4-FFF2-40B4-BE49-F238E27FC236}">
+                <a16:creationId xmlns:a16="http://schemas.microsoft.com/office/drawing/2014/main" id="{C58BC14E-7185-4736-5BF1-30C9365E30A0}"/>
+              </a:ext>
+            </a:extLst>
+          </p:cNvPr>
+          <p:cNvSpPr/>
+          <p:nvPr/>
+        </p:nvSpPr>
+        <p:spPr>
+          <a:xfrm>
+            <a:off x="2378946" y="685039"/>
+            <a:ext cx="245052" cy="222855"/>
+          </a:xfrm>
+          <a:prstGeom prst="rect">
+            <a:avLst/>
+          </a:prstGeom>
+          <a:noFill/>
+        </p:spPr>
+        <p:style>
+          <a:lnRef idx="2">
+            <a:schemeClr val="accent1">
+              <a:shade val="15000"/>
+            </a:schemeClr>
+          </a:lnRef>
+          <a:fillRef idx="1">
+            <a:schemeClr val="accent1"/>
+          </a:fillRef>
+          <a:effectRef idx="0">
+            <a:schemeClr val="accent1"/>
+          </a:effectRef>
+          <a:fontRef idx="minor">
+            <a:schemeClr val="lt1"/>
+          </a:fontRef>
+        </p:style>
+        <p:txBody>
+          <a:bodyPr rtlCol="0" anchor="ctr"/>
+          <a:lstStyle/>
+          <a:p>
+            <a:pPr algn="ctr"/>
+            <a:endParaRPr lang="ko-KR" altLang="en-US"/>
+          </a:p>
+        </p:txBody>
+      </p:sp>
+      <p:sp>
+        <p:nvSpPr>
+          <p:cNvPr id="37" name="TextBox 36">
+            <a:extLst>
+              <a:ext uri="{FF2B5EF4-FFF2-40B4-BE49-F238E27FC236}">
+                <a16:creationId xmlns:a16="http://schemas.microsoft.com/office/drawing/2014/main" id="{CEA68785-AEC6-2CAF-003A-6302A23F5661}"/>
+              </a:ext>
+            </a:extLst>
+          </p:cNvPr>
+          <p:cNvSpPr txBox="1"/>
+          <p:nvPr/>
+        </p:nvSpPr>
+        <p:spPr>
+          <a:xfrm>
+            <a:off x="2691467" y="574772"/>
+            <a:ext cx="987771" cy="400110"/>
+          </a:xfrm>
+          <a:prstGeom prst="rect">
+            <a:avLst/>
+          </a:prstGeom>
+          <a:noFill/>
+        </p:spPr>
+        <p:txBody>
+          <a:bodyPr wrap="none" rtlCol="0">
+            <a:spAutoFit/>
+          </a:bodyPr>
+          <a:lstStyle/>
+          <a:p>
+            <a:r>
+              <a:rPr lang="en-US" altLang="ko-KR" sz="2000"/>
+              <a:t>English</a:t>
+            </a:r>
+            <a:endParaRPr lang="ko-KR" altLang="en-US" sz="2000"/>
+          </a:p>
+        </p:txBody>
+      </p:sp>
+      <p:sp>
+        <p:nvSpPr>
+          <p:cNvPr id="38" name="직사각형 37">
+            <a:extLst>
+              <a:ext uri="{FF2B5EF4-FFF2-40B4-BE49-F238E27FC236}">
+                <a16:creationId xmlns:a16="http://schemas.microsoft.com/office/drawing/2014/main" id="{E5A210B1-D161-4970-6CFA-2F59B44DB1E4}"/>
+              </a:ext>
+            </a:extLst>
+          </p:cNvPr>
+          <p:cNvSpPr/>
+          <p:nvPr/>
+        </p:nvSpPr>
+        <p:spPr>
+          <a:xfrm>
+            <a:off x="3904715" y="680738"/>
+            <a:ext cx="245052" cy="222855"/>
+          </a:xfrm>
+          <a:prstGeom prst="rect">
+            <a:avLst/>
+          </a:prstGeom>
+          <a:noFill/>
+        </p:spPr>
+        <p:style>
+          <a:lnRef idx="2">
+            <a:schemeClr val="accent1">
+              <a:shade val="15000"/>
+            </a:schemeClr>
+          </a:lnRef>
+          <a:fillRef idx="1">
+            <a:schemeClr val="accent1"/>
+          </a:fillRef>
+          <a:effectRef idx="0">
+            <a:schemeClr val="accent1"/>
+          </a:effectRef>
+          <a:fontRef idx="minor">
+            <a:schemeClr val="lt1"/>
+          </a:fontRef>
+        </p:style>
+        <p:txBody>
+          <a:bodyPr rtlCol="0" anchor="ctr"/>
+          <a:lstStyle/>
+          <a:p>
+            <a:pPr algn="ctr"/>
+            <a:endParaRPr lang="ko-KR" altLang="en-US"/>
+          </a:p>
+        </p:txBody>
+      </p:sp>
+      <p:sp>
+        <p:nvSpPr>
+          <p:cNvPr id="39" name="TextBox 38">
+            <a:extLst>
+              <a:ext uri="{FF2B5EF4-FFF2-40B4-BE49-F238E27FC236}">
+                <a16:creationId xmlns:a16="http://schemas.microsoft.com/office/drawing/2014/main" id="{97F5C205-0EF6-99E3-1CCC-2FD38B6848B5}"/>
+              </a:ext>
+            </a:extLst>
+          </p:cNvPr>
+          <p:cNvSpPr txBox="1"/>
+          <p:nvPr/>
+        </p:nvSpPr>
+        <p:spPr>
+          <a:xfrm>
+            <a:off x="4217236" y="612675"/>
+            <a:ext cx="1398781" cy="369332"/>
+          </a:xfrm>
+          <a:prstGeom prst="rect">
+            <a:avLst/>
+          </a:prstGeom>
+          <a:noFill/>
+        </p:spPr>
+        <p:txBody>
+          <a:bodyPr wrap="none" rtlCol="0">
+            <a:spAutoFit/>
+          </a:bodyPr>
+          <a:lstStyle/>
+          <a:p>
+            <a:r>
+              <a:rPr lang="en-US" altLang="ko-KR"/>
+              <a:t>Vietnamese</a:t>
+            </a:r>
+            <a:endParaRPr lang="ko-KR" altLang="en-US" sz="2000"/>
+          </a:p>
+        </p:txBody>
+      </p:sp>
+      <p:pic>
+        <p:nvPicPr>
+          <p:cNvPr id="41" name="그림 40">
+            <a:extLst>
+              <a:ext uri="{FF2B5EF4-FFF2-40B4-BE49-F238E27FC236}">
+                <a16:creationId xmlns:a16="http://schemas.microsoft.com/office/drawing/2014/main" id="{3524F9D5-242C-E3D4-2B32-D633BCA85B96}"/>
+              </a:ext>
+            </a:extLst>
+          </p:cNvPr>
+          <p:cNvPicPr>
+            <a:picLocks noChangeAspect="1"/>
+          </p:cNvPicPr>
+          <p:nvPr/>
+        </p:nvPicPr>
+        <p:blipFill>
+          <a:blip r:embed="rId2"/>
+          <a:stretch>
+            <a:fillRect/>
+          </a:stretch>
+        </p:blipFill>
+        <p:spPr>
+          <a:xfrm>
+            <a:off x="6513278" y="4984741"/>
+            <a:ext cx="4572638" cy="5210902"/>
+          </a:xfrm>
+          <a:prstGeom prst="rect">
+            <a:avLst/>
+          </a:prstGeom>
+        </p:spPr>
+      </p:pic>
+      <p:pic>
+        <p:nvPicPr>
+          <p:cNvPr id="43" name="그림 42">
+            <a:extLst>
+              <a:ext uri="{FF2B5EF4-FFF2-40B4-BE49-F238E27FC236}">
+                <a16:creationId xmlns:a16="http://schemas.microsoft.com/office/drawing/2014/main" id="{8008A676-698E-867C-3A98-1105B2247AEA}"/>
+              </a:ext>
+            </a:extLst>
+          </p:cNvPr>
+          <p:cNvPicPr>
+            <a:picLocks noChangeAspect="1"/>
+          </p:cNvPicPr>
+          <p:nvPr/>
+        </p:nvPicPr>
+        <p:blipFill>
+          <a:blip r:embed="rId3"/>
+          <a:stretch>
+            <a:fillRect/>
+          </a:stretch>
+        </p:blipFill>
+        <p:spPr>
+          <a:xfrm>
+            <a:off x="1543567" y="5048484"/>
+            <a:ext cx="4347387" cy="5083416"/>
+          </a:xfrm>
+          <a:prstGeom prst="rect">
+            <a:avLst/>
+          </a:prstGeom>
+        </p:spPr>
+      </p:pic>
+    </p:spTree>
+    <p:extLst>
+      <p:ext uri="{BB962C8B-B14F-4D97-AF65-F5344CB8AC3E}">
+        <p14:creationId xmlns:p14="http://schemas.microsoft.com/office/powerpoint/2010/main" val="2781498974"/>
+      </p:ext>
+    </p:extLst>
+  </p:cSld>
+  <p:clrMapOvr>
+    <a:masterClrMapping/>
+  </p:clrMapOvr>
+</p:sld>
+</file>
+
 <file path=ppt/theme/theme1.xml><?xml version="1.0" encoding="utf-8"?>
 <a:theme xmlns:a="http://schemas.openxmlformats.org/drawingml/2006/main" name="Office 테마">
   <a:themeElements>

</xml_diff>

<commit_message>
Complete LUT page development with multilingual support and responsive UI
- Added LUT page with RGB data visualization
- Implemented responsive graphs for Red/Green/Blue channels
- Added Total LUT Parameters and Control Panel
- Fixed Manual page CIE coordinate diagrams to be responsive
- Enhanced multilingual support (Korean/English/Vietnamese)
- Fixed X-axis coordinate mapping precision for CIE1931
- Added dynamic theme support for all pages
- Completed UI development for all 6 major features
</commit_message>
<xml_diff>
--- a/UI.pptx
+++ b/UI.pptx
@@ -15,6 +15,10 @@
     <p:sldId id="262" r:id="rId9"/>
     <p:sldId id="264" r:id="rId10"/>
     <p:sldId id="265" r:id="rId11"/>
+    <p:sldId id="268" r:id="rId12"/>
+    <p:sldId id="266" r:id="rId13"/>
+    <p:sldId id="267" r:id="rId14"/>
+    <p:sldId id="269" r:id="rId15"/>
   </p:sldIdLst>
   <p:sldSz cx="12192000" cy="10799763"/>
   <p:notesSz cx="6858000" cy="9144000"/>
@@ -252,7 +256,7 @@
           <a:p>
             <a:fld id="{3AFA5745-1944-4375-9A62-C9C7A2D27294}" type="datetimeFigureOut">
               <a:rPr lang="ko-KR" altLang="en-US" smtClean="0"/>
-              <a:t>2025-10-03</a:t>
+              <a:t>2025-10-05</a:t>
             </a:fld>
             <a:endParaRPr lang="ko-KR" altLang="en-US"/>
           </a:p>
@@ -422,7 +426,7 @@
           <a:p>
             <a:fld id="{3AFA5745-1944-4375-9A62-C9C7A2D27294}" type="datetimeFigureOut">
               <a:rPr lang="ko-KR" altLang="en-US" smtClean="0"/>
-              <a:t>2025-10-03</a:t>
+              <a:t>2025-10-05</a:t>
             </a:fld>
             <a:endParaRPr lang="ko-KR" altLang="en-US"/>
           </a:p>
@@ -602,7 +606,7 @@
           <a:p>
             <a:fld id="{3AFA5745-1944-4375-9A62-C9C7A2D27294}" type="datetimeFigureOut">
               <a:rPr lang="ko-KR" altLang="en-US" smtClean="0"/>
-              <a:t>2025-10-03</a:t>
+              <a:t>2025-10-05</a:t>
             </a:fld>
             <a:endParaRPr lang="ko-KR" altLang="en-US"/>
           </a:p>
@@ -772,7 +776,7 @@
           <a:p>
             <a:fld id="{3AFA5745-1944-4375-9A62-C9C7A2D27294}" type="datetimeFigureOut">
               <a:rPr lang="ko-KR" altLang="en-US" smtClean="0"/>
-              <a:t>2025-10-03</a:t>
+              <a:t>2025-10-05</a:t>
             </a:fld>
             <a:endParaRPr lang="ko-KR" altLang="en-US"/>
           </a:p>
@@ -1018,7 +1022,7 @@
           <a:p>
             <a:fld id="{3AFA5745-1944-4375-9A62-C9C7A2D27294}" type="datetimeFigureOut">
               <a:rPr lang="ko-KR" altLang="en-US" smtClean="0"/>
-              <a:t>2025-10-03</a:t>
+              <a:t>2025-10-05</a:t>
             </a:fld>
             <a:endParaRPr lang="ko-KR" altLang="en-US"/>
           </a:p>
@@ -1250,7 +1254,7 @@
           <a:p>
             <a:fld id="{3AFA5745-1944-4375-9A62-C9C7A2D27294}" type="datetimeFigureOut">
               <a:rPr lang="ko-KR" altLang="en-US" smtClean="0"/>
-              <a:t>2025-10-03</a:t>
+              <a:t>2025-10-05</a:t>
             </a:fld>
             <a:endParaRPr lang="ko-KR" altLang="en-US"/>
           </a:p>
@@ -1617,7 +1621,7 @@
           <a:p>
             <a:fld id="{3AFA5745-1944-4375-9A62-C9C7A2D27294}" type="datetimeFigureOut">
               <a:rPr lang="ko-KR" altLang="en-US" smtClean="0"/>
-              <a:t>2025-10-03</a:t>
+              <a:t>2025-10-05</a:t>
             </a:fld>
             <a:endParaRPr lang="ko-KR" altLang="en-US"/>
           </a:p>
@@ -1735,7 +1739,7 @@
           <a:p>
             <a:fld id="{3AFA5745-1944-4375-9A62-C9C7A2D27294}" type="datetimeFigureOut">
               <a:rPr lang="ko-KR" altLang="en-US" smtClean="0"/>
-              <a:t>2025-10-03</a:t>
+              <a:t>2025-10-05</a:t>
             </a:fld>
             <a:endParaRPr lang="ko-KR" altLang="en-US"/>
           </a:p>
@@ -1830,7 +1834,7 @@
           <a:p>
             <a:fld id="{3AFA5745-1944-4375-9A62-C9C7A2D27294}" type="datetimeFigureOut">
               <a:rPr lang="ko-KR" altLang="en-US" smtClean="0"/>
-              <a:t>2025-10-03</a:t>
+              <a:t>2025-10-05</a:t>
             </a:fld>
             <a:endParaRPr lang="ko-KR" altLang="en-US"/>
           </a:p>
@@ -2107,7 +2111,7 @@
           <a:p>
             <a:fld id="{3AFA5745-1944-4375-9A62-C9C7A2D27294}" type="datetimeFigureOut">
               <a:rPr lang="ko-KR" altLang="en-US" smtClean="0"/>
-              <a:t>2025-10-03</a:t>
+              <a:t>2025-10-05</a:t>
             </a:fld>
             <a:endParaRPr lang="ko-KR" altLang="en-US"/>
           </a:p>
@@ -2364,7 +2368,7 @@
           <a:p>
             <a:fld id="{3AFA5745-1944-4375-9A62-C9C7A2D27294}" type="datetimeFigureOut">
               <a:rPr lang="ko-KR" altLang="en-US" smtClean="0"/>
-              <a:t>2025-10-03</a:t>
+              <a:t>2025-10-05</a:t>
             </a:fld>
             <a:endParaRPr lang="ko-KR" altLang="en-US"/>
           </a:p>
@@ -2577,7 +2581,7 @@
           <a:p>
             <a:fld id="{3AFA5745-1944-4375-9A62-C9C7A2D27294}" type="datetimeFigureOut">
               <a:rPr lang="ko-KR" altLang="en-US" smtClean="0"/>
-              <a:t>2025-10-03</a:t>
+              <a:t>2025-10-05</a:t>
             </a:fld>
             <a:endParaRPr lang="ko-KR" altLang="en-US"/>
           </a:p>
@@ -3498,6 +3502,3305 @@
 </p:sld>
 </file>
 
+<file path=ppt/slides/slide11.xml><?xml version="1.0" encoding="utf-8"?>
+<p:sld xmlns:a="http://schemas.openxmlformats.org/drawingml/2006/main" xmlns:r="http://schemas.openxmlformats.org/officeDocument/2006/relationships" xmlns:p="http://schemas.openxmlformats.org/presentationml/2006/main">
+  <p:cSld>
+    <p:spTree>
+      <p:nvGrpSpPr>
+        <p:cNvPr id="1" name=""/>
+        <p:cNvGrpSpPr/>
+        <p:nvPr/>
+      </p:nvGrpSpPr>
+      <p:grpSpPr>
+        <a:xfrm>
+          <a:off x="0" y="0"/>
+          <a:ext cx="0" cy="0"/>
+          <a:chOff x="0" y="0"/>
+          <a:chExt cx="0" cy="0"/>
+        </a:xfrm>
+      </p:grpSpPr>
+      <p:pic>
+        <p:nvPicPr>
+          <p:cNvPr id="14" name="그림 13">
+            <a:extLst>
+              <a:ext uri="{FF2B5EF4-FFF2-40B4-BE49-F238E27FC236}">
+                <a16:creationId xmlns:a16="http://schemas.microsoft.com/office/drawing/2014/main" id="{4788AD8E-A093-F667-F92F-AF151E13D307}"/>
+              </a:ext>
+            </a:extLst>
+          </p:cNvPr>
+          <p:cNvPicPr>
+            <a:picLocks noChangeAspect="1"/>
+          </p:cNvPicPr>
+          <p:nvPr/>
+        </p:nvPicPr>
+        <p:blipFill>
+          <a:blip r:embed="rId2"/>
+          <a:stretch>
+            <a:fillRect/>
+          </a:stretch>
+        </p:blipFill>
+        <p:spPr>
+          <a:xfrm>
+            <a:off x="646939" y="1937060"/>
+            <a:ext cx="10898121" cy="6925642"/>
+          </a:xfrm>
+          <a:prstGeom prst="rect">
+            <a:avLst/>
+          </a:prstGeom>
+        </p:spPr>
+      </p:pic>
+      <p:sp>
+        <p:nvSpPr>
+          <p:cNvPr id="6" name="직사각형 5">
+            <a:extLst>
+              <a:ext uri="{FF2B5EF4-FFF2-40B4-BE49-F238E27FC236}">
+                <a16:creationId xmlns:a16="http://schemas.microsoft.com/office/drawing/2014/main" id="{A39518CA-4CCE-83B6-7FA8-B705F672E0E3}"/>
+              </a:ext>
+            </a:extLst>
+          </p:cNvPr>
+          <p:cNvSpPr/>
+          <p:nvPr/>
+        </p:nvSpPr>
+        <p:spPr>
+          <a:xfrm>
+            <a:off x="7876977" y="6196870"/>
+            <a:ext cx="3668083" cy="429068"/>
+          </a:xfrm>
+          <a:prstGeom prst="rect">
+            <a:avLst/>
+          </a:prstGeom>
+          <a:noFill/>
+          <a:ln w="76200">
+            <a:solidFill>
+              <a:srgbClr val="FF0000"/>
+            </a:solidFill>
+          </a:ln>
+        </p:spPr>
+        <p:style>
+          <a:lnRef idx="2">
+            <a:schemeClr val="accent1">
+              <a:shade val="15000"/>
+            </a:schemeClr>
+          </a:lnRef>
+          <a:fillRef idx="1">
+            <a:schemeClr val="accent1"/>
+          </a:fillRef>
+          <a:effectRef idx="0">
+            <a:schemeClr val="accent1"/>
+          </a:effectRef>
+          <a:fontRef idx="minor">
+            <a:schemeClr val="lt1"/>
+          </a:fontRef>
+        </p:style>
+        <p:txBody>
+          <a:bodyPr rtlCol="0" anchor="ctr"/>
+          <a:lstStyle/>
+          <a:p>
+            <a:pPr algn="ctr"/>
+            <a:endParaRPr lang="ko-KR" altLang="en-US"/>
+          </a:p>
+        </p:txBody>
+      </p:sp>
+    </p:spTree>
+    <p:extLst>
+      <p:ext uri="{BB962C8B-B14F-4D97-AF65-F5344CB8AC3E}">
+        <p14:creationId xmlns:p14="http://schemas.microsoft.com/office/powerpoint/2010/main" val="2325814103"/>
+      </p:ext>
+    </p:extLst>
+  </p:cSld>
+  <p:clrMapOvr>
+    <a:masterClrMapping/>
+  </p:clrMapOvr>
+</p:sld>
+</file>
+
+<file path=ppt/slides/slide12.xml><?xml version="1.0" encoding="utf-8"?>
+<p:sld xmlns:a="http://schemas.openxmlformats.org/drawingml/2006/main" xmlns:r="http://schemas.openxmlformats.org/officeDocument/2006/relationships" xmlns:p="http://schemas.openxmlformats.org/presentationml/2006/main">
+  <p:cSld>
+    <p:spTree>
+      <p:nvGrpSpPr>
+        <p:cNvPr id="1" name=""/>
+        <p:cNvGrpSpPr/>
+        <p:nvPr/>
+      </p:nvGrpSpPr>
+      <p:grpSpPr>
+        <a:xfrm>
+          <a:off x="0" y="0"/>
+          <a:ext cx="0" cy="0"/>
+          <a:chOff x="0" y="0"/>
+          <a:chExt cx="0" cy="0"/>
+        </a:xfrm>
+      </p:grpSpPr>
+      <p:sp>
+        <p:nvSpPr>
+          <p:cNvPr id="4" name="직사각형 3">
+            <a:extLst>
+              <a:ext uri="{FF2B5EF4-FFF2-40B4-BE49-F238E27FC236}">
+                <a16:creationId xmlns:a16="http://schemas.microsoft.com/office/drawing/2014/main" id="{25688584-C34F-BF83-EAEE-D5C0BF0E852A}"/>
+              </a:ext>
+            </a:extLst>
+          </p:cNvPr>
+          <p:cNvSpPr/>
+          <p:nvPr/>
+        </p:nvSpPr>
+        <p:spPr>
+          <a:xfrm>
+            <a:off x="379828" y="1842868"/>
+            <a:ext cx="6879101" cy="7680960"/>
+          </a:xfrm>
+          <a:prstGeom prst="rect">
+            <a:avLst/>
+          </a:prstGeom>
+        </p:spPr>
+        <p:style>
+          <a:lnRef idx="2">
+            <a:schemeClr val="accent1">
+              <a:shade val="15000"/>
+            </a:schemeClr>
+          </a:lnRef>
+          <a:fillRef idx="1">
+            <a:schemeClr val="accent1"/>
+          </a:fillRef>
+          <a:effectRef idx="0">
+            <a:schemeClr val="accent1"/>
+          </a:effectRef>
+          <a:fontRef idx="minor">
+            <a:schemeClr val="lt1"/>
+          </a:fontRef>
+        </p:style>
+        <p:txBody>
+          <a:bodyPr rtlCol="0" anchor="ctr"/>
+          <a:lstStyle/>
+          <a:p>
+            <a:pPr algn="ctr"/>
+            <a:r>
+              <a:rPr lang="ko-KR" altLang="en-US"/>
+              <a:t>데이터 테이블</a:t>
+            </a:r>
+          </a:p>
+        </p:txBody>
+      </p:sp>
+      <p:sp>
+        <p:nvSpPr>
+          <p:cNvPr id="5" name="직사각형 4">
+            <a:extLst>
+              <a:ext uri="{FF2B5EF4-FFF2-40B4-BE49-F238E27FC236}">
+                <a16:creationId xmlns:a16="http://schemas.microsoft.com/office/drawing/2014/main" id="{4F88FA1C-A535-026F-B125-3FA20EF4AAC8}"/>
+              </a:ext>
+            </a:extLst>
+          </p:cNvPr>
+          <p:cNvSpPr/>
+          <p:nvPr/>
+        </p:nvSpPr>
+        <p:spPr>
+          <a:xfrm>
+            <a:off x="7258929" y="1842867"/>
+            <a:ext cx="4712677" cy="3868615"/>
+          </a:xfrm>
+          <a:prstGeom prst="rect">
+            <a:avLst/>
+          </a:prstGeom>
+          <a:solidFill>
+            <a:schemeClr val="accent2"/>
+          </a:solidFill>
+        </p:spPr>
+        <p:style>
+          <a:lnRef idx="2">
+            <a:schemeClr val="accent1">
+              <a:shade val="15000"/>
+            </a:schemeClr>
+          </a:lnRef>
+          <a:fillRef idx="1">
+            <a:schemeClr val="accent1"/>
+          </a:fillRef>
+          <a:effectRef idx="0">
+            <a:schemeClr val="accent1"/>
+          </a:effectRef>
+          <a:fontRef idx="minor">
+            <a:schemeClr val="lt1"/>
+          </a:fontRef>
+        </p:style>
+        <p:txBody>
+          <a:bodyPr rtlCol="0" anchor="ctr"/>
+          <a:lstStyle/>
+          <a:p>
+            <a:pPr algn="ctr"/>
+            <a:r>
+              <a:rPr lang="ko-KR" altLang="en-US"/>
+              <a:t>색좌표</a:t>
+            </a:r>
+          </a:p>
+        </p:txBody>
+      </p:sp>
+      <p:sp>
+        <p:nvSpPr>
+          <p:cNvPr id="6" name="직사각형 5">
+            <a:extLst>
+              <a:ext uri="{FF2B5EF4-FFF2-40B4-BE49-F238E27FC236}">
+                <a16:creationId xmlns:a16="http://schemas.microsoft.com/office/drawing/2014/main" id="{17F8A825-9A89-EAA1-A0DB-18B0F84813CF}"/>
+              </a:ext>
+            </a:extLst>
+          </p:cNvPr>
+          <p:cNvSpPr/>
+          <p:nvPr/>
+        </p:nvSpPr>
+        <p:spPr>
+          <a:xfrm>
+            <a:off x="7258929" y="5711482"/>
+            <a:ext cx="4712677" cy="3812346"/>
+          </a:xfrm>
+          <a:prstGeom prst="rect">
+            <a:avLst/>
+          </a:prstGeom>
+          <a:solidFill>
+            <a:schemeClr val="accent5">
+              <a:lumMod val="40000"/>
+              <a:lumOff val="60000"/>
+            </a:schemeClr>
+          </a:solidFill>
+        </p:spPr>
+        <p:style>
+          <a:lnRef idx="2">
+            <a:schemeClr val="accent1">
+              <a:shade val="15000"/>
+            </a:schemeClr>
+          </a:lnRef>
+          <a:fillRef idx="1">
+            <a:schemeClr val="accent1"/>
+          </a:fillRef>
+          <a:effectRef idx="0">
+            <a:schemeClr val="accent1"/>
+          </a:effectRef>
+          <a:fontRef idx="minor">
+            <a:schemeClr val="lt1"/>
+          </a:fontRef>
+        </p:style>
+        <p:txBody>
+          <a:bodyPr rtlCol="0" anchor="ctr"/>
+          <a:lstStyle/>
+          <a:p>
+            <a:pPr algn="ctr"/>
+            <a:r>
+              <a:rPr lang="ko-KR" altLang="en-US"/>
+              <a:t>컨트롤 패널</a:t>
+            </a:r>
+          </a:p>
+        </p:txBody>
+      </p:sp>
+    </p:spTree>
+    <p:extLst>
+      <p:ext uri="{BB962C8B-B14F-4D97-AF65-F5344CB8AC3E}">
+        <p14:creationId xmlns:p14="http://schemas.microsoft.com/office/powerpoint/2010/main" val="604088949"/>
+      </p:ext>
+    </p:extLst>
+  </p:cSld>
+  <p:clrMapOvr>
+    <a:masterClrMapping/>
+  </p:clrMapOvr>
+</p:sld>
+</file>
+
+<file path=ppt/slides/slide13.xml><?xml version="1.0" encoding="utf-8"?>
+<p:sld xmlns:a="http://schemas.openxmlformats.org/drawingml/2006/main" xmlns:r="http://schemas.openxmlformats.org/officeDocument/2006/relationships" xmlns:p="http://schemas.openxmlformats.org/presentationml/2006/main">
+  <p:cSld>
+    <p:spTree>
+      <p:nvGrpSpPr>
+        <p:cNvPr id="1" name=""/>
+        <p:cNvGrpSpPr/>
+        <p:nvPr/>
+      </p:nvGrpSpPr>
+      <p:grpSpPr>
+        <a:xfrm>
+          <a:off x="0" y="0"/>
+          <a:ext cx="0" cy="0"/>
+          <a:chOff x="0" y="0"/>
+          <a:chExt cx="0" cy="0"/>
+        </a:xfrm>
+      </p:grpSpPr>
+      <p:sp>
+        <p:nvSpPr>
+          <p:cNvPr id="8" name="TextBox 7">
+            <a:extLst>
+              <a:ext uri="{FF2B5EF4-FFF2-40B4-BE49-F238E27FC236}">
+                <a16:creationId xmlns:a16="http://schemas.microsoft.com/office/drawing/2014/main" id="{2B831314-1447-3C90-92B3-B3EBF22B0171}"/>
+              </a:ext>
+            </a:extLst>
+          </p:cNvPr>
+          <p:cNvSpPr txBox="1"/>
+          <p:nvPr/>
+        </p:nvSpPr>
+        <p:spPr>
+          <a:xfrm>
+            <a:off x="3393341" y="2208901"/>
+            <a:ext cx="1452192" cy="369332"/>
+          </a:xfrm>
+          <a:prstGeom prst="rect">
+            <a:avLst/>
+          </a:prstGeom>
+          <a:noFill/>
+        </p:spPr>
+        <p:txBody>
+          <a:bodyPr wrap="none" rtlCol="0">
+            <a:spAutoFit/>
+          </a:bodyPr>
+          <a:lstStyle/>
+          <a:p>
+            <a:r>
+              <a:rPr lang="en-US" altLang="ko-KR"/>
+              <a:t>Start Voltage</a:t>
+            </a:r>
+            <a:endParaRPr lang="ko-KR" altLang="en-US"/>
+          </a:p>
+        </p:txBody>
+      </p:sp>
+      <p:cxnSp>
+        <p:nvCxnSpPr>
+          <p:cNvPr id="9" name="직선 연결선 8">
+            <a:extLst>
+              <a:ext uri="{FF2B5EF4-FFF2-40B4-BE49-F238E27FC236}">
+                <a16:creationId xmlns:a16="http://schemas.microsoft.com/office/drawing/2014/main" id="{3071B646-B24F-BDF3-175C-438CE9F2441B}"/>
+              </a:ext>
+            </a:extLst>
+          </p:cNvPr>
+          <p:cNvCxnSpPr>
+            <a:cxnSpLocks/>
+            <a:stCxn id="8" idx="3"/>
+          </p:cNvCxnSpPr>
+          <p:nvPr/>
+        </p:nvCxnSpPr>
+        <p:spPr>
+          <a:xfrm>
+            <a:off x="4845533" y="2393567"/>
+            <a:ext cx="3420282" cy="2"/>
+          </a:xfrm>
+          <a:prstGeom prst="line">
+            <a:avLst/>
+          </a:prstGeom>
+        </p:spPr>
+        <p:style>
+          <a:lnRef idx="2">
+            <a:schemeClr val="accent1"/>
+          </a:lnRef>
+          <a:fillRef idx="0">
+            <a:schemeClr val="accent1"/>
+          </a:fillRef>
+          <a:effectRef idx="1">
+            <a:schemeClr val="accent1"/>
+          </a:effectRef>
+          <a:fontRef idx="minor">
+            <a:schemeClr val="tx1"/>
+          </a:fontRef>
+        </p:style>
+      </p:cxnSp>
+      <p:sp>
+        <p:nvSpPr>
+          <p:cNvPr id="38" name="직사각형 37">
+            <a:extLst>
+              <a:ext uri="{FF2B5EF4-FFF2-40B4-BE49-F238E27FC236}">
+                <a16:creationId xmlns:a16="http://schemas.microsoft.com/office/drawing/2014/main" id="{2FC9F9B7-A8D1-6016-8FBF-A04C42B0109E}"/>
+              </a:ext>
+            </a:extLst>
+          </p:cNvPr>
+          <p:cNvSpPr/>
+          <p:nvPr/>
+        </p:nvSpPr>
+        <p:spPr>
+          <a:xfrm>
+            <a:off x="3378672" y="4140097"/>
+            <a:ext cx="1038793" cy="364895"/>
+          </a:xfrm>
+          <a:prstGeom prst="rect">
+            <a:avLst/>
+          </a:prstGeom>
+        </p:spPr>
+        <p:style>
+          <a:lnRef idx="2">
+            <a:schemeClr val="accent1">
+              <a:shade val="15000"/>
+            </a:schemeClr>
+          </a:lnRef>
+          <a:fillRef idx="1">
+            <a:schemeClr val="accent1"/>
+          </a:fillRef>
+          <a:effectRef idx="0">
+            <a:schemeClr val="accent1"/>
+          </a:effectRef>
+          <a:fontRef idx="minor">
+            <a:schemeClr val="lt1"/>
+          </a:fontRef>
+        </p:style>
+        <p:txBody>
+          <a:bodyPr rtlCol="0" anchor="ctr"/>
+          <a:lstStyle/>
+          <a:p>
+            <a:pPr algn="ctr"/>
+            <a:r>
+              <a:rPr lang="en-US" altLang="ko-KR"/>
+              <a:t>Interval</a:t>
+            </a:r>
+            <a:endParaRPr lang="ko-KR" altLang="en-US"/>
+          </a:p>
+        </p:txBody>
+      </p:sp>
+      <p:sp>
+        <p:nvSpPr>
+          <p:cNvPr id="39" name="직사각형 38">
+            <a:extLst>
+              <a:ext uri="{FF2B5EF4-FFF2-40B4-BE49-F238E27FC236}">
+                <a16:creationId xmlns:a16="http://schemas.microsoft.com/office/drawing/2014/main" id="{00D82896-24BC-DCBB-7A01-C5E375C4AF11}"/>
+              </a:ext>
+            </a:extLst>
+          </p:cNvPr>
+          <p:cNvSpPr/>
+          <p:nvPr/>
+        </p:nvSpPr>
+        <p:spPr>
+          <a:xfrm>
+            <a:off x="4645234" y="4140094"/>
+            <a:ext cx="1366569" cy="364895"/>
+          </a:xfrm>
+          <a:prstGeom prst="rect">
+            <a:avLst/>
+          </a:prstGeom>
+          <a:noFill/>
+        </p:spPr>
+        <p:style>
+          <a:lnRef idx="2">
+            <a:schemeClr val="accent1">
+              <a:shade val="15000"/>
+            </a:schemeClr>
+          </a:lnRef>
+          <a:fillRef idx="1">
+            <a:schemeClr val="accent1"/>
+          </a:fillRef>
+          <a:effectRef idx="0">
+            <a:schemeClr val="accent1"/>
+          </a:effectRef>
+          <a:fontRef idx="minor">
+            <a:schemeClr val="lt1"/>
+          </a:fontRef>
+        </p:style>
+        <p:txBody>
+          <a:bodyPr rtlCol="0" anchor="ctr"/>
+          <a:lstStyle/>
+          <a:p>
+            <a:pPr algn="ctr"/>
+            <a:endParaRPr lang="ko-KR" altLang="en-US"/>
+          </a:p>
+        </p:txBody>
+      </p:sp>
+      <p:sp>
+        <p:nvSpPr>
+          <p:cNvPr id="40" name="TextBox 39">
+            <a:extLst>
+              <a:ext uri="{FF2B5EF4-FFF2-40B4-BE49-F238E27FC236}">
+                <a16:creationId xmlns:a16="http://schemas.microsoft.com/office/drawing/2014/main" id="{92994356-AF13-5698-2F69-951827F95871}"/>
+              </a:ext>
+            </a:extLst>
+          </p:cNvPr>
+          <p:cNvSpPr txBox="1"/>
+          <p:nvPr/>
+        </p:nvSpPr>
+        <p:spPr>
+          <a:xfrm>
+            <a:off x="3378672" y="3497949"/>
+            <a:ext cx="1973617" cy="369332"/>
+          </a:xfrm>
+          <a:prstGeom prst="rect">
+            <a:avLst/>
+          </a:prstGeom>
+          <a:noFill/>
+        </p:spPr>
+        <p:txBody>
+          <a:bodyPr wrap="none" rtlCol="0">
+            <a:spAutoFit/>
+          </a:bodyPr>
+          <a:lstStyle/>
+          <a:p>
+            <a:r>
+              <a:rPr lang="en-US" altLang="ko-KR"/>
+              <a:t>Common Settings</a:t>
+            </a:r>
+            <a:endParaRPr lang="ko-KR" altLang="en-US"/>
+          </a:p>
+        </p:txBody>
+      </p:sp>
+      <p:cxnSp>
+        <p:nvCxnSpPr>
+          <p:cNvPr id="41" name="직선 연결선 40">
+            <a:extLst>
+              <a:ext uri="{FF2B5EF4-FFF2-40B4-BE49-F238E27FC236}">
+                <a16:creationId xmlns:a16="http://schemas.microsoft.com/office/drawing/2014/main" id="{2A97BC53-C6F1-5989-8513-09318DBE4E4E}"/>
+              </a:ext>
+            </a:extLst>
+          </p:cNvPr>
+          <p:cNvCxnSpPr>
+            <a:cxnSpLocks/>
+            <a:stCxn id="40" idx="3"/>
+          </p:cNvCxnSpPr>
+          <p:nvPr/>
+        </p:nvCxnSpPr>
+        <p:spPr>
+          <a:xfrm>
+            <a:off x="5352289" y="3682615"/>
+            <a:ext cx="2898857" cy="2"/>
+          </a:xfrm>
+          <a:prstGeom prst="line">
+            <a:avLst/>
+          </a:prstGeom>
+        </p:spPr>
+        <p:style>
+          <a:lnRef idx="2">
+            <a:schemeClr val="accent1"/>
+          </a:lnRef>
+          <a:fillRef idx="0">
+            <a:schemeClr val="accent1"/>
+          </a:fillRef>
+          <a:effectRef idx="1">
+            <a:schemeClr val="accent1"/>
+          </a:effectRef>
+          <a:fontRef idx="minor">
+            <a:schemeClr val="tx1"/>
+          </a:fontRef>
+        </p:style>
+      </p:cxnSp>
+      <p:sp>
+        <p:nvSpPr>
+          <p:cNvPr id="43" name="직사각형 42">
+            <a:extLst>
+              <a:ext uri="{FF2B5EF4-FFF2-40B4-BE49-F238E27FC236}">
+                <a16:creationId xmlns:a16="http://schemas.microsoft.com/office/drawing/2014/main" id="{8FFD6C68-078E-AE08-1A1D-F433957CA811}"/>
+              </a:ext>
+            </a:extLst>
+          </p:cNvPr>
+          <p:cNvSpPr/>
+          <p:nvPr/>
+        </p:nvSpPr>
+        <p:spPr>
+          <a:xfrm>
+            <a:off x="4945159" y="4928816"/>
+            <a:ext cx="2086178" cy="605918"/>
+          </a:xfrm>
+          <a:prstGeom prst="rect">
+            <a:avLst/>
+          </a:prstGeom>
+        </p:spPr>
+        <p:style>
+          <a:lnRef idx="2">
+            <a:schemeClr val="accent1">
+              <a:shade val="15000"/>
+            </a:schemeClr>
+          </a:lnRef>
+          <a:fillRef idx="1">
+            <a:schemeClr val="accent1"/>
+          </a:fillRef>
+          <a:effectRef idx="0">
+            <a:schemeClr val="accent1"/>
+          </a:effectRef>
+          <a:fontRef idx="minor">
+            <a:schemeClr val="lt1"/>
+          </a:fontRef>
+        </p:style>
+        <p:txBody>
+          <a:bodyPr rtlCol="0" anchor="ctr"/>
+          <a:lstStyle/>
+          <a:p>
+            <a:pPr algn="ctr"/>
+            <a:r>
+              <a:rPr lang="en-US" altLang="ko-KR"/>
+              <a:t>Test Start</a:t>
+            </a:r>
+            <a:endParaRPr lang="ko-KR" altLang="en-US"/>
+          </a:p>
+        </p:txBody>
+      </p:sp>
+      <p:sp>
+        <p:nvSpPr>
+          <p:cNvPr id="2" name="직사각형 1">
+            <a:extLst>
+              <a:ext uri="{FF2B5EF4-FFF2-40B4-BE49-F238E27FC236}">
+                <a16:creationId xmlns:a16="http://schemas.microsoft.com/office/drawing/2014/main" id="{2CE15C6D-2022-1FA8-617B-0E005637ACAB}"/>
+              </a:ext>
+            </a:extLst>
+          </p:cNvPr>
+          <p:cNvSpPr/>
+          <p:nvPr/>
+        </p:nvSpPr>
+        <p:spPr>
+          <a:xfrm>
+            <a:off x="3480214" y="2687001"/>
+            <a:ext cx="708806" cy="364895"/>
+          </a:xfrm>
+          <a:prstGeom prst="rect">
+            <a:avLst/>
+          </a:prstGeom>
+        </p:spPr>
+        <p:style>
+          <a:lnRef idx="2">
+            <a:schemeClr val="accent1">
+              <a:shade val="15000"/>
+            </a:schemeClr>
+          </a:lnRef>
+          <a:fillRef idx="1">
+            <a:schemeClr val="accent1"/>
+          </a:fillRef>
+          <a:effectRef idx="0">
+            <a:schemeClr val="accent1"/>
+          </a:effectRef>
+          <a:fontRef idx="minor">
+            <a:schemeClr val="lt1"/>
+          </a:fontRef>
+        </p:style>
+        <p:txBody>
+          <a:bodyPr rtlCol="0" anchor="ctr"/>
+          <a:lstStyle/>
+          <a:p>
+            <a:pPr algn="ctr"/>
+            <a:r>
+              <a:rPr lang="en-US" altLang="ko-KR"/>
+              <a:t>R_V</a:t>
+            </a:r>
+            <a:endParaRPr lang="ko-KR" altLang="en-US"/>
+          </a:p>
+        </p:txBody>
+      </p:sp>
+      <p:sp>
+        <p:nvSpPr>
+          <p:cNvPr id="3" name="직사각형 2">
+            <a:extLst>
+              <a:ext uri="{FF2B5EF4-FFF2-40B4-BE49-F238E27FC236}">
+                <a16:creationId xmlns:a16="http://schemas.microsoft.com/office/drawing/2014/main" id="{39199632-5973-C142-0949-C1C1A252CC69}"/>
+              </a:ext>
+            </a:extLst>
+          </p:cNvPr>
+          <p:cNvSpPr/>
+          <p:nvPr/>
+        </p:nvSpPr>
+        <p:spPr>
+          <a:xfrm>
+            <a:off x="5223159" y="2687000"/>
+            <a:ext cx="708806" cy="364895"/>
+          </a:xfrm>
+          <a:prstGeom prst="rect">
+            <a:avLst/>
+          </a:prstGeom>
+        </p:spPr>
+        <p:style>
+          <a:lnRef idx="2">
+            <a:schemeClr val="accent1">
+              <a:shade val="15000"/>
+            </a:schemeClr>
+          </a:lnRef>
+          <a:fillRef idx="1">
+            <a:schemeClr val="accent1"/>
+          </a:fillRef>
+          <a:effectRef idx="0">
+            <a:schemeClr val="accent1"/>
+          </a:effectRef>
+          <a:fontRef idx="minor">
+            <a:schemeClr val="lt1"/>
+          </a:fontRef>
+        </p:style>
+        <p:txBody>
+          <a:bodyPr rtlCol="0" anchor="ctr"/>
+          <a:lstStyle/>
+          <a:p>
+            <a:pPr algn="ctr"/>
+            <a:r>
+              <a:rPr lang="en-US" altLang="ko-KR"/>
+              <a:t>G_V</a:t>
+            </a:r>
+            <a:endParaRPr lang="ko-KR" altLang="en-US"/>
+          </a:p>
+        </p:txBody>
+      </p:sp>
+      <p:sp>
+        <p:nvSpPr>
+          <p:cNvPr id="10" name="직사각형 9">
+            <a:extLst>
+              <a:ext uri="{FF2B5EF4-FFF2-40B4-BE49-F238E27FC236}">
+                <a16:creationId xmlns:a16="http://schemas.microsoft.com/office/drawing/2014/main" id="{EA254881-8B2F-5B6D-B5EB-AC62810B25EC}"/>
+              </a:ext>
+            </a:extLst>
+          </p:cNvPr>
+          <p:cNvSpPr/>
+          <p:nvPr/>
+        </p:nvSpPr>
+        <p:spPr>
+          <a:xfrm>
+            <a:off x="6861517" y="2704812"/>
+            <a:ext cx="708806" cy="364895"/>
+          </a:xfrm>
+          <a:prstGeom prst="rect">
+            <a:avLst/>
+          </a:prstGeom>
+        </p:spPr>
+        <p:style>
+          <a:lnRef idx="2">
+            <a:schemeClr val="accent1">
+              <a:shade val="15000"/>
+            </a:schemeClr>
+          </a:lnRef>
+          <a:fillRef idx="1">
+            <a:schemeClr val="accent1"/>
+          </a:fillRef>
+          <a:effectRef idx="0">
+            <a:schemeClr val="accent1"/>
+          </a:effectRef>
+          <a:fontRef idx="minor">
+            <a:schemeClr val="lt1"/>
+          </a:fontRef>
+        </p:style>
+        <p:txBody>
+          <a:bodyPr rtlCol="0" anchor="ctr"/>
+          <a:lstStyle/>
+          <a:p>
+            <a:pPr algn="ctr"/>
+            <a:r>
+              <a:rPr lang="en-US" altLang="ko-KR"/>
+              <a:t>B_V</a:t>
+            </a:r>
+            <a:endParaRPr lang="ko-KR" altLang="en-US"/>
+          </a:p>
+        </p:txBody>
+      </p:sp>
+      <p:sp>
+        <p:nvSpPr>
+          <p:cNvPr id="11" name="직사각형 10">
+            <a:extLst>
+              <a:ext uri="{FF2B5EF4-FFF2-40B4-BE49-F238E27FC236}">
+                <a16:creationId xmlns:a16="http://schemas.microsoft.com/office/drawing/2014/main" id="{5AD01464-4E6B-2E86-D919-E5E9B56A8FD2}"/>
+              </a:ext>
+            </a:extLst>
+          </p:cNvPr>
+          <p:cNvSpPr/>
+          <p:nvPr/>
+        </p:nvSpPr>
+        <p:spPr>
+          <a:xfrm>
+            <a:off x="4351417" y="2687000"/>
+            <a:ext cx="603120" cy="364895"/>
+          </a:xfrm>
+          <a:prstGeom prst="rect">
+            <a:avLst/>
+          </a:prstGeom>
+          <a:noFill/>
+        </p:spPr>
+        <p:style>
+          <a:lnRef idx="2">
+            <a:schemeClr val="accent1">
+              <a:shade val="15000"/>
+            </a:schemeClr>
+          </a:lnRef>
+          <a:fillRef idx="1">
+            <a:schemeClr val="accent1"/>
+          </a:fillRef>
+          <a:effectRef idx="0">
+            <a:schemeClr val="accent1"/>
+          </a:effectRef>
+          <a:fontRef idx="minor">
+            <a:schemeClr val="lt1"/>
+          </a:fontRef>
+        </p:style>
+        <p:txBody>
+          <a:bodyPr rtlCol="0" anchor="ctr"/>
+          <a:lstStyle/>
+          <a:p>
+            <a:pPr algn="ctr"/>
+            <a:endParaRPr lang="ko-KR" altLang="en-US"/>
+          </a:p>
+        </p:txBody>
+      </p:sp>
+      <p:sp>
+        <p:nvSpPr>
+          <p:cNvPr id="12" name="직사각형 11">
+            <a:extLst>
+              <a:ext uri="{FF2B5EF4-FFF2-40B4-BE49-F238E27FC236}">
+                <a16:creationId xmlns:a16="http://schemas.microsoft.com/office/drawing/2014/main" id="{18BD50B7-CB6B-DF2A-CA52-938DFD369D25}"/>
+              </a:ext>
+            </a:extLst>
+          </p:cNvPr>
+          <p:cNvSpPr/>
+          <p:nvPr/>
+        </p:nvSpPr>
+        <p:spPr>
+          <a:xfrm>
+            <a:off x="6096000" y="2711448"/>
+            <a:ext cx="603120" cy="364895"/>
+          </a:xfrm>
+          <a:prstGeom prst="rect">
+            <a:avLst/>
+          </a:prstGeom>
+          <a:noFill/>
+        </p:spPr>
+        <p:style>
+          <a:lnRef idx="2">
+            <a:schemeClr val="accent1">
+              <a:shade val="15000"/>
+            </a:schemeClr>
+          </a:lnRef>
+          <a:fillRef idx="1">
+            <a:schemeClr val="accent1"/>
+          </a:fillRef>
+          <a:effectRef idx="0">
+            <a:schemeClr val="accent1"/>
+          </a:effectRef>
+          <a:fontRef idx="minor">
+            <a:schemeClr val="lt1"/>
+          </a:fontRef>
+        </p:style>
+        <p:txBody>
+          <a:bodyPr rtlCol="0" anchor="ctr"/>
+          <a:lstStyle/>
+          <a:p>
+            <a:pPr algn="ctr"/>
+            <a:endParaRPr lang="ko-KR" altLang="en-US"/>
+          </a:p>
+        </p:txBody>
+      </p:sp>
+      <p:sp>
+        <p:nvSpPr>
+          <p:cNvPr id="13" name="직사각형 12">
+            <a:extLst>
+              <a:ext uri="{FF2B5EF4-FFF2-40B4-BE49-F238E27FC236}">
+                <a16:creationId xmlns:a16="http://schemas.microsoft.com/office/drawing/2014/main" id="{7ACFE593-03C6-251B-317B-BD0D88DEF303}"/>
+              </a:ext>
+            </a:extLst>
+          </p:cNvPr>
+          <p:cNvSpPr/>
+          <p:nvPr/>
+        </p:nvSpPr>
+        <p:spPr>
+          <a:xfrm>
+            <a:off x="7748426" y="2748070"/>
+            <a:ext cx="603120" cy="364895"/>
+          </a:xfrm>
+          <a:prstGeom prst="rect">
+            <a:avLst/>
+          </a:prstGeom>
+          <a:noFill/>
+        </p:spPr>
+        <p:style>
+          <a:lnRef idx="2">
+            <a:schemeClr val="accent1">
+              <a:shade val="15000"/>
+            </a:schemeClr>
+          </a:lnRef>
+          <a:fillRef idx="1">
+            <a:schemeClr val="accent1"/>
+          </a:fillRef>
+          <a:effectRef idx="0">
+            <a:schemeClr val="accent1"/>
+          </a:effectRef>
+          <a:fontRef idx="minor">
+            <a:schemeClr val="lt1"/>
+          </a:fontRef>
+        </p:style>
+        <p:txBody>
+          <a:bodyPr rtlCol="0" anchor="ctr"/>
+          <a:lstStyle/>
+          <a:p>
+            <a:pPr algn="ctr"/>
+            <a:endParaRPr lang="ko-KR" altLang="en-US"/>
+          </a:p>
+        </p:txBody>
+      </p:sp>
+      <p:sp>
+        <p:nvSpPr>
+          <p:cNvPr id="14" name="직사각형 13">
+            <a:extLst>
+              <a:ext uri="{FF2B5EF4-FFF2-40B4-BE49-F238E27FC236}">
+                <a16:creationId xmlns:a16="http://schemas.microsoft.com/office/drawing/2014/main" id="{7A4EC145-267D-AC25-7E66-5B81899B907F}"/>
+              </a:ext>
+            </a:extLst>
+          </p:cNvPr>
+          <p:cNvSpPr/>
+          <p:nvPr/>
+        </p:nvSpPr>
+        <p:spPr>
+          <a:xfrm>
+            <a:off x="6096000" y="4106444"/>
+            <a:ext cx="1038793" cy="364895"/>
+          </a:xfrm>
+          <a:prstGeom prst="rect">
+            <a:avLst/>
+          </a:prstGeom>
+        </p:spPr>
+        <p:style>
+          <a:lnRef idx="2">
+            <a:schemeClr val="accent1">
+              <a:shade val="15000"/>
+            </a:schemeClr>
+          </a:lnRef>
+          <a:fillRef idx="1">
+            <a:schemeClr val="accent1"/>
+          </a:fillRef>
+          <a:effectRef idx="0">
+            <a:schemeClr val="accent1"/>
+          </a:effectRef>
+          <a:fontRef idx="minor">
+            <a:schemeClr val="lt1"/>
+          </a:fontRef>
+        </p:style>
+        <p:txBody>
+          <a:bodyPr rtlCol="0" anchor="ctr"/>
+          <a:lstStyle/>
+          <a:p>
+            <a:pPr algn="ctr"/>
+            <a:r>
+              <a:rPr lang="en-US" altLang="ko-KR"/>
+              <a:t>Count</a:t>
+            </a:r>
+            <a:endParaRPr lang="ko-KR" altLang="en-US"/>
+          </a:p>
+        </p:txBody>
+      </p:sp>
+      <p:sp>
+        <p:nvSpPr>
+          <p:cNvPr id="15" name="직사각형 14">
+            <a:extLst>
+              <a:ext uri="{FF2B5EF4-FFF2-40B4-BE49-F238E27FC236}">
+                <a16:creationId xmlns:a16="http://schemas.microsoft.com/office/drawing/2014/main" id="{3AC53267-BE9C-A902-6AFC-5801573ED5BF}"/>
+              </a:ext>
+            </a:extLst>
+          </p:cNvPr>
+          <p:cNvSpPr/>
+          <p:nvPr/>
+        </p:nvSpPr>
+        <p:spPr>
+          <a:xfrm>
+            <a:off x="7362562" y="4106441"/>
+            <a:ext cx="1366569" cy="364895"/>
+          </a:xfrm>
+          <a:prstGeom prst="rect">
+            <a:avLst/>
+          </a:prstGeom>
+          <a:noFill/>
+        </p:spPr>
+        <p:style>
+          <a:lnRef idx="2">
+            <a:schemeClr val="accent1">
+              <a:shade val="15000"/>
+            </a:schemeClr>
+          </a:lnRef>
+          <a:fillRef idx="1">
+            <a:schemeClr val="accent1"/>
+          </a:fillRef>
+          <a:effectRef idx="0">
+            <a:schemeClr val="accent1"/>
+          </a:effectRef>
+          <a:fontRef idx="minor">
+            <a:schemeClr val="lt1"/>
+          </a:fontRef>
+        </p:style>
+        <p:txBody>
+          <a:bodyPr rtlCol="0" anchor="ctr"/>
+          <a:lstStyle/>
+          <a:p>
+            <a:pPr algn="ctr"/>
+            <a:endParaRPr lang="ko-KR" altLang="en-US"/>
+          </a:p>
+        </p:txBody>
+      </p:sp>
+      <p:pic>
+        <p:nvPicPr>
+          <p:cNvPr id="17" name="그림 16">
+            <a:extLst>
+              <a:ext uri="{FF2B5EF4-FFF2-40B4-BE49-F238E27FC236}">
+                <a16:creationId xmlns:a16="http://schemas.microsoft.com/office/drawing/2014/main" id="{25F58438-EBB8-0D2D-7C21-F58FB1F8924A}"/>
+              </a:ext>
+            </a:extLst>
+          </p:cNvPr>
+          <p:cNvPicPr>
+            <a:picLocks noChangeAspect="1"/>
+          </p:cNvPicPr>
+          <p:nvPr/>
+        </p:nvPicPr>
+        <p:blipFill>
+          <a:blip r:embed="rId2"/>
+          <a:stretch>
+            <a:fillRect/>
+          </a:stretch>
+        </p:blipFill>
+        <p:spPr>
+          <a:xfrm>
+            <a:off x="972697" y="5231775"/>
+            <a:ext cx="4379592" cy="4440986"/>
+          </a:xfrm>
+          <a:prstGeom prst="rect">
+            <a:avLst/>
+          </a:prstGeom>
+        </p:spPr>
+      </p:pic>
+      <p:sp>
+        <p:nvSpPr>
+          <p:cNvPr id="18" name="TextBox 17">
+            <a:extLst>
+              <a:ext uri="{FF2B5EF4-FFF2-40B4-BE49-F238E27FC236}">
+                <a16:creationId xmlns:a16="http://schemas.microsoft.com/office/drawing/2014/main" id="{57BDD5D6-EF0B-EC71-02DA-FFEBC79657C5}"/>
+              </a:ext>
+            </a:extLst>
+          </p:cNvPr>
+          <p:cNvSpPr txBox="1"/>
+          <p:nvPr/>
+        </p:nvSpPr>
+        <p:spPr>
+          <a:xfrm>
+            <a:off x="9931791" y="9355015"/>
+            <a:ext cx="1359411" cy="369332"/>
+          </a:xfrm>
+          <a:prstGeom prst="rect">
+            <a:avLst/>
+          </a:prstGeom>
+          <a:noFill/>
+        </p:spPr>
+        <p:txBody>
+          <a:bodyPr wrap="none" rtlCol="0">
+            <a:spAutoFit/>
+          </a:bodyPr>
+          <a:lstStyle/>
+          <a:p>
+            <a:r>
+              <a:rPr lang="en-US" altLang="ko-KR"/>
+              <a:t>Max_Index=</a:t>
+            </a:r>
+            <a:endParaRPr lang="ko-KR" altLang="en-US"/>
+          </a:p>
+        </p:txBody>
+      </p:sp>
+      <p:sp>
+        <p:nvSpPr>
+          <p:cNvPr id="19" name="TextBox 18">
+            <a:extLst>
+              <a:ext uri="{FF2B5EF4-FFF2-40B4-BE49-F238E27FC236}">
+                <a16:creationId xmlns:a16="http://schemas.microsoft.com/office/drawing/2014/main" id="{D0D31B5E-CA65-771C-B446-D416D8F029F1}"/>
+              </a:ext>
+            </a:extLst>
+          </p:cNvPr>
+          <p:cNvSpPr txBox="1"/>
+          <p:nvPr/>
+        </p:nvSpPr>
+        <p:spPr>
+          <a:xfrm>
+            <a:off x="6942851" y="6411601"/>
+            <a:ext cx="1318246" cy="369332"/>
+          </a:xfrm>
+          <a:prstGeom prst="rect">
+            <a:avLst/>
+          </a:prstGeom>
+          <a:noFill/>
+        </p:spPr>
+        <p:txBody>
+          <a:bodyPr wrap="none" rtlCol="0">
+            <a:spAutoFit/>
+          </a:bodyPr>
+          <a:lstStyle/>
+          <a:p>
+            <a:r>
+              <a:rPr lang="en-US" altLang="ko-KR"/>
+              <a:t>Max_Lumi=</a:t>
+            </a:r>
+            <a:endParaRPr lang="ko-KR" altLang="en-US"/>
+          </a:p>
+        </p:txBody>
+      </p:sp>
+      <p:sp>
+        <p:nvSpPr>
+          <p:cNvPr id="20" name="TextBox 19">
+            <a:extLst>
+              <a:ext uri="{FF2B5EF4-FFF2-40B4-BE49-F238E27FC236}">
+                <a16:creationId xmlns:a16="http://schemas.microsoft.com/office/drawing/2014/main" id="{767E1FFB-F3F7-8945-6045-740F0314427B}"/>
+              </a:ext>
+            </a:extLst>
+          </p:cNvPr>
+          <p:cNvSpPr txBox="1"/>
+          <p:nvPr/>
+        </p:nvSpPr>
+        <p:spPr>
+          <a:xfrm>
+            <a:off x="7748426" y="7755227"/>
+            <a:ext cx="1059842" cy="369332"/>
+          </a:xfrm>
+          <a:prstGeom prst="rect">
+            <a:avLst/>
+          </a:prstGeom>
+          <a:noFill/>
+        </p:spPr>
+        <p:txBody>
+          <a:bodyPr wrap="none" rtlCol="0">
+            <a:spAutoFit/>
+          </a:bodyPr>
+          <a:lstStyle/>
+          <a:p>
+            <a:r>
+              <a:rPr lang="en-US" altLang="ko-KR"/>
+              <a:t>gamma=</a:t>
+            </a:r>
+            <a:endParaRPr lang="ko-KR" altLang="en-US"/>
+          </a:p>
+        </p:txBody>
+      </p:sp>
+    </p:spTree>
+    <p:extLst>
+      <p:ext uri="{BB962C8B-B14F-4D97-AF65-F5344CB8AC3E}">
+        <p14:creationId xmlns:p14="http://schemas.microsoft.com/office/powerpoint/2010/main" val="4016485313"/>
+      </p:ext>
+    </p:extLst>
+  </p:cSld>
+  <p:clrMapOvr>
+    <a:masterClrMapping/>
+  </p:clrMapOvr>
+</p:sld>
+</file>
+
+<file path=ppt/slides/slide14.xml><?xml version="1.0" encoding="utf-8"?>
+<p:sld xmlns:a="http://schemas.openxmlformats.org/drawingml/2006/main" xmlns:r="http://schemas.openxmlformats.org/officeDocument/2006/relationships" xmlns:p="http://schemas.openxmlformats.org/presentationml/2006/main">
+  <p:cSld>
+    <p:spTree>
+      <p:nvGrpSpPr>
+        <p:cNvPr id="1" name=""/>
+        <p:cNvGrpSpPr/>
+        <p:nvPr/>
+      </p:nvGrpSpPr>
+      <p:grpSpPr>
+        <a:xfrm>
+          <a:off x="0" y="0"/>
+          <a:ext cx="0" cy="0"/>
+          <a:chOff x="0" y="0"/>
+          <a:chExt cx="0" cy="0"/>
+        </a:xfrm>
+      </p:grpSpPr>
+      <p:sp>
+        <p:nvSpPr>
+          <p:cNvPr id="4" name="직사각형 3">
+            <a:extLst>
+              <a:ext uri="{FF2B5EF4-FFF2-40B4-BE49-F238E27FC236}">
+                <a16:creationId xmlns:a16="http://schemas.microsoft.com/office/drawing/2014/main" id="{EB1A4BC8-EC4C-AFEB-B9B6-537A65FE15F9}"/>
+              </a:ext>
+            </a:extLst>
+          </p:cNvPr>
+          <p:cNvSpPr/>
+          <p:nvPr/>
+        </p:nvSpPr>
+        <p:spPr>
+          <a:xfrm>
+            <a:off x="379828" y="1842868"/>
+            <a:ext cx="7315200" cy="5156556"/>
+          </a:xfrm>
+          <a:prstGeom prst="rect">
+            <a:avLst/>
+          </a:prstGeom>
+          <a:noFill/>
+        </p:spPr>
+        <p:style>
+          <a:lnRef idx="2">
+            <a:schemeClr val="accent1">
+              <a:shade val="15000"/>
+            </a:schemeClr>
+          </a:lnRef>
+          <a:fillRef idx="1">
+            <a:schemeClr val="accent1"/>
+          </a:fillRef>
+          <a:effectRef idx="0">
+            <a:schemeClr val="accent1"/>
+          </a:effectRef>
+          <a:fontRef idx="minor">
+            <a:schemeClr val="lt1"/>
+          </a:fontRef>
+        </p:style>
+        <p:txBody>
+          <a:bodyPr rtlCol="0" anchor="ctr"/>
+          <a:lstStyle/>
+          <a:p>
+            <a:pPr algn="ctr"/>
+            <a:r>
+              <a:rPr lang="ko-KR" altLang="en-US"/>
+              <a:t>데이터 테이블</a:t>
+            </a:r>
+          </a:p>
+        </p:txBody>
+      </p:sp>
+      <p:sp>
+        <p:nvSpPr>
+          <p:cNvPr id="5" name="직사각형 4">
+            <a:extLst>
+              <a:ext uri="{FF2B5EF4-FFF2-40B4-BE49-F238E27FC236}">
+                <a16:creationId xmlns:a16="http://schemas.microsoft.com/office/drawing/2014/main" id="{F38E1CC2-C01B-4A88-4614-EF92EF8ACCF8}"/>
+              </a:ext>
+            </a:extLst>
+          </p:cNvPr>
+          <p:cNvSpPr/>
+          <p:nvPr/>
+        </p:nvSpPr>
+        <p:spPr>
+          <a:xfrm>
+            <a:off x="504093" y="2504049"/>
+            <a:ext cx="2267242" cy="4495375"/>
+          </a:xfrm>
+          <a:prstGeom prst="rect">
+            <a:avLst/>
+          </a:prstGeom>
+          <a:noFill/>
+        </p:spPr>
+        <p:style>
+          <a:lnRef idx="2">
+            <a:schemeClr val="accent1">
+              <a:shade val="15000"/>
+            </a:schemeClr>
+          </a:lnRef>
+          <a:fillRef idx="1">
+            <a:schemeClr val="accent1"/>
+          </a:fillRef>
+          <a:effectRef idx="0">
+            <a:schemeClr val="accent1"/>
+          </a:effectRef>
+          <a:fontRef idx="minor">
+            <a:schemeClr val="lt1"/>
+          </a:fontRef>
+        </p:style>
+        <p:txBody>
+          <a:bodyPr rtlCol="0" anchor="ctr"/>
+          <a:lstStyle/>
+          <a:p>
+            <a:pPr algn="ctr"/>
+            <a:r>
+              <a:rPr lang="ko-KR" altLang="en-US"/>
+              <a:t>데이터 테이블</a:t>
+            </a:r>
+          </a:p>
+        </p:txBody>
+      </p:sp>
+      <p:sp>
+        <p:nvSpPr>
+          <p:cNvPr id="6" name="직사각형 5">
+            <a:extLst>
+              <a:ext uri="{FF2B5EF4-FFF2-40B4-BE49-F238E27FC236}">
+                <a16:creationId xmlns:a16="http://schemas.microsoft.com/office/drawing/2014/main" id="{C84998DB-8108-41F5-0A52-A8E3BAE221B7}"/>
+              </a:ext>
+            </a:extLst>
+          </p:cNvPr>
+          <p:cNvSpPr/>
+          <p:nvPr/>
+        </p:nvSpPr>
+        <p:spPr>
+          <a:xfrm>
+            <a:off x="2895600" y="2504049"/>
+            <a:ext cx="2267242" cy="4495375"/>
+          </a:xfrm>
+          <a:prstGeom prst="rect">
+            <a:avLst/>
+          </a:prstGeom>
+          <a:noFill/>
+        </p:spPr>
+        <p:style>
+          <a:lnRef idx="2">
+            <a:schemeClr val="accent1">
+              <a:shade val="15000"/>
+            </a:schemeClr>
+          </a:lnRef>
+          <a:fillRef idx="1">
+            <a:schemeClr val="accent1"/>
+          </a:fillRef>
+          <a:effectRef idx="0">
+            <a:schemeClr val="accent1"/>
+          </a:effectRef>
+          <a:fontRef idx="minor">
+            <a:schemeClr val="lt1"/>
+          </a:fontRef>
+        </p:style>
+        <p:txBody>
+          <a:bodyPr rtlCol="0" anchor="ctr"/>
+          <a:lstStyle/>
+          <a:p>
+            <a:pPr algn="ctr"/>
+            <a:r>
+              <a:rPr lang="ko-KR" altLang="en-US"/>
+              <a:t>데이터 테이블</a:t>
+            </a:r>
+          </a:p>
+        </p:txBody>
+      </p:sp>
+      <p:sp>
+        <p:nvSpPr>
+          <p:cNvPr id="7" name="직사각형 6">
+            <a:extLst>
+              <a:ext uri="{FF2B5EF4-FFF2-40B4-BE49-F238E27FC236}">
+                <a16:creationId xmlns:a16="http://schemas.microsoft.com/office/drawing/2014/main" id="{5C0D5F8A-33A4-CF72-6026-180BEF44684B}"/>
+              </a:ext>
+            </a:extLst>
+          </p:cNvPr>
+          <p:cNvSpPr/>
+          <p:nvPr/>
+        </p:nvSpPr>
+        <p:spPr>
+          <a:xfrm>
+            <a:off x="5287107" y="2504049"/>
+            <a:ext cx="2267242" cy="4495375"/>
+          </a:xfrm>
+          <a:prstGeom prst="rect">
+            <a:avLst/>
+          </a:prstGeom>
+          <a:noFill/>
+        </p:spPr>
+        <p:style>
+          <a:lnRef idx="2">
+            <a:schemeClr val="accent1">
+              <a:shade val="15000"/>
+            </a:schemeClr>
+          </a:lnRef>
+          <a:fillRef idx="1">
+            <a:schemeClr val="accent1"/>
+          </a:fillRef>
+          <a:effectRef idx="0">
+            <a:schemeClr val="accent1"/>
+          </a:effectRef>
+          <a:fontRef idx="minor">
+            <a:schemeClr val="lt1"/>
+          </a:fontRef>
+        </p:style>
+        <p:txBody>
+          <a:bodyPr rtlCol="0" anchor="ctr"/>
+          <a:lstStyle/>
+          <a:p>
+            <a:pPr algn="ctr"/>
+            <a:r>
+              <a:rPr lang="ko-KR" altLang="en-US"/>
+              <a:t>데이터 테이블</a:t>
+            </a:r>
+          </a:p>
+        </p:txBody>
+      </p:sp>
+      <p:sp>
+        <p:nvSpPr>
+          <p:cNvPr id="8" name="직사각형 7">
+            <a:extLst>
+              <a:ext uri="{FF2B5EF4-FFF2-40B4-BE49-F238E27FC236}">
+                <a16:creationId xmlns:a16="http://schemas.microsoft.com/office/drawing/2014/main" id="{336FB86A-3E30-2BBA-33F5-C7FB9102B24B}"/>
+              </a:ext>
+            </a:extLst>
+          </p:cNvPr>
+          <p:cNvSpPr/>
+          <p:nvPr/>
+        </p:nvSpPr>
+        <p:spPr>
+          <a:xfrm>
+            <a:off x="532229" y="2139154"/>
+            <a:ext cx="1114424" cy="364895"/>
+          </a:xfrm>
+          <a:prstGeom prst="rect">
+            <a:avLst/>
+          </a:prstGeom>
+        </p:spPr>
+        <p:style>
+          <a:lnRef idx="2">
+            <a:schemeClr val="accent1">
+              <a:shade val="15000"/>
+            </a:schemeClr>
+          </a:lnRef>
+          <a:fillRef idx="1">
+            <a:schemeClr val="accent1"/>
+          </a:fillRef>
+          <a:effectRef idx="0">
+            <a:schemeClr val="accent1"/>
+          </a:effectRef>
+          <a:fontRef idx="minor">
+            <a:schemeClr val="lt1"/>
+          </a:fontRef>
+        </p:style>
+        <p:txBody>
+          <a:bodyPr rtlCol="0" anchor="ctr"/>
+          <a:lstStyle/>
+          <a:p>
+            <a:pPr algn="ctr"/>
+            <a:r>
+              <a:rPr lang="en-US" altLang="ko-KR"/>
+              <a:t>Red</a:t>
+            </a:r>
+            <a:endParaRPr lang="ko-KR" altLang="en-US"/>
+          </a:p>
+        </p:txBody>
+      </p:sp>
+      <p:sp>
+        <p:nvSpPr>
+          <p:cNvPr id="9" name="직사각형 8">
+            <a:extLst>
+              <a:ext uri="{FF2B5EF4-FFF2-40B4-BE49-F238E27FC236}">
+                <a16:creationId xmlns:a16="http://schemas.microsoft.com/office/drawing/2014/main" id="{731A45B5-F9AC-F8EC-888A-9271DF165A38}"/>
+              </a:ext>
+            </a:extLst>
+          </p:cNvPr>
+          <p:cNvSpPr/>
+          <p:nvPr/>
+        </p:nvSpPr>
+        <p:spPr>
+          <a:xfrm>
+            <a:off x="2895600" y="2139153"/>
+            <a:ext cx="1114424" cy="364895"/>
+          </a:xfrm>
+          <a:prstGeom prst="rect">
+            <a:avLst/>
+          </a:prstGeom>
+        </p:spPr>
+        <p:style>
+          <a:lnRef idx="2">
+            <a:schemeClr val="accent1">
+              <a:shade val="15000"/>
+            </a:schemeClr>
+          </a:lnRef>
+          <a:fillRef idx="1">
+            <a:schemeClr val="accent1"/>
+          </a:fillRef>
+          <a:effectRef idx="0">
+            <a:schemeClr val="accent1"/>
+          </a:effectRef>
+          <a:fontRef idx="minor">
+            <a:schemeClr val="lt1"/>
+          </a:fontRef>
+        </p:style>
+        <p:txBody>
+          <a:bodyPr rtlCol="0" anchor="ctr"/>
+          <a:lstStyle/>
+          <a:p>
+            <a:pPr algn="ctr"/>
+            <a:r>
+              <a:rPr lang="en-US" altLang="ko-KR"/>
+              <a:t>Green</a:t>
+            </a:r>
+            <a:endParaRPr lang="ko-KR" altLang="en-US"/>
+          </a:p>
+        </p:txBody>
+      </p:sp>
+      <p:sp>
+        <p:nvSpPr>
+          <p:cNvPr id="10" name="직사각형 9">
+            <a:extLst>
+              <a:ext uri="{FF2B5EF4-FFF2-40B4-BE49-F238E27FC236}">
+                <a16:creationId xmlns:a16="http://schemas.microsoft.com/office/drawing/2014/main" id="{105A2C5A-B058-6794-586A-F21FFFE6AF3F}"/>
+              </a:ext>
+            </a:extLst>
+          </p:cNvPr>
+          <p:cNvSpPr/>
+          <p:nvPr/>
+        </p:nvSpPr>
+        <p:spPr>
+          <a:xfrm>
+            <a:off x="5287107" y="2139153"/>
+            <a:ext cx="1114424" cy="364895"/>
+          </a:xfrm>
+          <a:prstGeom prst="rect">
+            <a:avLst/>
+          </a:prstGeom>
+        </p:spPr>
+        <p:style>
+          <a:lnRef idx="2">
+            <a:schemeClr val="accent1">
+              <a:shade val="15000"/>
+            </a:schemeClr>
+          </a:lnRef>
+          <a:fillRef idx="1">
+            <a:schemeClr val="accent1"/>
+          </a:fillRef>
+          <a:effectRef idx="0">
+            <a:schemeClr val="accent1"/>
+          </a:effectRef>
+          <a:fontRef idx="minor">
+            <a:schemeClr val="lt1"/>
+          </a:fontRef>
+        </p:style>
+        <p:txBody>
+          <a:bodyPr rtlCol="0" anchor="ctr"/>
+          <a:lstStyle/>
+          <a:p>
+            <a:pPr algn="ctr"/>
+            <a:r>
+              <a:rPr lang="en-US" altLang="ko-KR"/>
+              <a:t>Blue</a:t>
+            </a:r>
+            <a:endParaRPr lang="ko-KR" altLang="en-US"/>
+          </a:p>
+        </p:txBody>
+      </p:sp>
+      <p:sp>
+        <p:nvSpPr>
+          <p:cNvPr id="11" name="직사각형 10">
+            <a:extLst>
+              <a:ext uri="{FF2B5EF4-FFF2-40B4-BE49-F238E27FC236}">
+                <a16:creationId xmlns:a16="http://schemas.microsoft.com/office/drawing/2014/main" id="{6D05A9F2-162C-A8A8-A877-38FF90F80BF1}"/>
+              </a:ext>
+            </a:extLst>
+          </p:cNvPr>
+          <p:cNvSpPr/>
+          <p:nvPr/>
+        </p:nvSpPr>
+        <p:spPr>
+          <a:xfrm>
+            <a:off x="656493" y="2656449"/>
+            <a:ext cx="1974165" cy="1985889"/>
+          </a:xfrm>
+          <a:prstGeom prst="rect">
+            <a:avLst/>
+          </a:prstGeom>
+          <a:noFill/>
+        </p:spPr>
+        <p:style>
+          <a:lnRef idx="2">
+            <a:schemeClr val="accent1">
+              <a:shade val="15000"/>
+            </a:schemeClr>
+          </a:lnRef>
+          <a:fillRef idx="1">
+            <a:schemeClr val="accent1"/>
+          </a:fillRef>
+          <a:effectRef idx="0">
+            <a:schemeClr val="accent1"/>
+          </a:effectRef>
+          <a:fontRef idx="minor">
+            <a:schemeClr val="lt1"/>
+          </a:fontRef>
+        </p:style>
+        <p:txBody>
+          <a:bodyPr rtlCol="0" anchor="ctr"/>
+          <a:lstStyle/>
+          <a:p>
+            <a:pPr algn="ctr"/>
+            <a:r>
+              <a:rPr lang="ko-KR" altLang="en-US">
+                <a:solidFill>
+                  <a:schemeClr val="tx1"/>
+                </a:solidFill>
+              </a:rPr>
+              <a:t>그래프 영역</a:t>
+            </a:r>
+          </a:p>
+        </p:txBody>
+      </p:sp>
+      <p:sp>
+        <p:nvSpPr>
+          <p:cNvPr id="12" name="직사각형 11">
+            <a:extLst>
+              <a:ext uri="{FF2B5EF4-FFF2-40B4-BE49-F238E27FC236}">
+                <a16:creationId xmlns:a16="http://schemas.microsoft.com/office/drawing/2014/main" id="{B115C1E9-D5E3-7D4D-A192-390396B2BE3E}"/>
+              </a:ext>
+            </a:extLst>
+          </p:cNvPr>
+          <p:cNvSpPr/>
+          <p:nvPr/>
+        </p:nvSpPr>
+        <p:spPr>
+          <a:xfrm>
+            <a:off x="3050345" y="2656448"/>
+            <a:ext cx="1974165" cy="1985889"/>
+          </a:xfrm>
+          <a:prstGeom prst="rect">
+            <a:avLst/>
+          </a:prstGeom>
+          <a:noFill/>
+        </p:spPr>
+        <p:style>
+          <a:lnRef idx="2">
+            <a:schemeClr val="accent1">
+              <a:shade val="15000"/>
+            </a:schemeClr>
+          </a:lnRef>
+          <a:fillRef idx="1">
+            <a:schemeClr val="accent1"/>
+          </a:fillRef>
+          <a:effectRef idx="0">
+            <a:schemeClr val="accent1"/>
+          </a:effectRef>
+          <a:fontRef idx="minor">
+            <a:schemeClr val="lt1"/>
+          </a:fontRef>
+        </p:style>
+        <p:txBody>
+          <a:bodyPr rtlCol="0" anchor="ctr"/>
+          <a:lstStyle/>
+          <a:p>
+            <a:pPr algn="ctr"/>
+            <a:r>
+              <a:rPr lang="ko-KR" altLang="en-US">
+                <a:solidFill>
+                  <a:schemeClr val="tx1"/>
+                </a:solidFill>
+              </a:rPr>
+              <a:t>그래프 영역</a:t>
+            </a:r>
+          </a:p>
+        </p:txBody>
+      </p:sp>
+      <p:sp>
+        <p:nvSpPr>
+          <p:cNvPr id="13" name="직사각형 12">
+            <a:extLst>
+              <a:ext uri="{FF2B5EF4-FFF2-40B4-BE49-F238E27FC236}">
+                <a16:creationId xmlns:a16="http://schemas.microsoft.com/office/drawing/2014/main" id="{A9BECB72-3512-10A9-07A4-EAABFFA1C3B1}"/>
+              </a:ext>
+            </a:extLst>
+          </p:cNvPr>
+          <p:cNvSpPr/>
+          <p:nvPr/>
+        </p:nvSpPr>
+        <p:spPr>
+          <a:xfrm>
+            <a:off x="5433645" y="2656448"/>
+            <a:ext cx="1974165" cy="1985889"/>
+          </a:xfrm>
+          <a:prstGeom prst="rect">
+            <a:avLst/>
+          </a:prstGeom>
+          <a:noFill/>
+        </p:spPr>
+        <p:style>
+          <a:lnRef idx="2">
+            <a:schemeClr val="accent1">
+              <a:shade val="15000"/>
+            </a:schemeClr>
+          </a:lnRef>
+          <a:fillRef idx="1">
+            <a:schemeClr val="accent1"/>
+          </a:fillRef>
+          <a:effectRef idx="0">
+            <a:schemeClr val="accent1"/>
+          </a:effectRef>
+          <a:fontRef idx="minor">
+            <a:schemeClr val="lt1"/>
+          </a:fontRef>
+        </p:style>
+        <p:txBody>
+          <a:bodyPr rtlCol="0" anchor="ctr"/>
+          <a:lstStyle/>
+          <a:p>
+            <a:pPr algn="ctr"/>
+            <a:r>
+              <a:rPr lang="ko-KR" altLang="en-US">
+                <a:solidFill>
+                  <a:schemeClr val="tx1"/>
+                </a:solidFill>
+              </a:rPr>
+              <a:t>그래프 영역</a:t>
+            </a:r>
+          </a:p>
+        </p:txBody>
+      </p:sp>
+      <p:sp>
+        <p:nvSpPr>
+          <p:cNvPr id="14" name="직사각형 13">
+            <a:extLst>
+              <a:ext uri="{FF2B5EF4-FFF2-40B4-BE49-F238E27FC236}">
+                <a16:creationId xmlns:a16="http://schemas.microsoft.com/office/drawing/2014/main" id="{D1CBD3C8-AD2C-FF45-081E-BEDB24E3D38E}"/>
+              </a:ext>
+            </a:extLst>
+          </p:cNvPr>
+          <p:cNvSpPr/>
+          <p:nvPr/>
+        </p:nvSpPr>
+        <p:spPr>
+          <a:xfrm>
+            <a:off x="659570" y="5190978"/>
+            <a:ext cx="1974165" cy="1808446"/>
+          </a:xfrm>
+          <a:prstGeom prst="rect">
+            <a:avLst/>
+          </a:prstGeom>
+          <a:noFill/>
+        </p:spPr>
+        <p:style>
+          <a:lnRef idx="2">
+            <a:schemeClr val="accent1">
+              <a:shade val="15000"/>
+            </a:schemeClr>
+          </a:lnRef>
+          <a:fillRef idx="1">
+            <a:schemeClr val="accent1"/>
+          </a:fillRef>
+          <a:effectRef idx="0">
+            <a:schemeClr val="accent1"/>
+          </a:effectRef>
+          <a:fontRef idx="minor">
+            <a:schemeClr val="lt1"/>
+          </a:fontRef>
+        </p:style>
+        <p:txBody>
+          <a:bodyPr rtlCol="0" anchor="ctr"/>
+          <a:lstStyle/>
+          <a:p>
+            <a:pPr algn="ctr"/>
+            <a:r>
+              <a:rPr lang="en-US" altLang="ko-KR">
+                <a:solidFill>
+                  <a:schemeClr val="tx1"/>
+                </a:solidFill>
+              </a:rPr>
+              <a:t>RED </a:t>
+            </a:r>
+            <a:r>
+              <a:rPr lang="ko-KR" altLang="en-US">
+                <a:solidFill>
+                  <a:schemeClr val="tx1"/>
+                </a:solidFill>
+              </a:rPr>
+              <a:t>텍스트 박스</a:t>
+            </a:r>
+            <a:endParaRPr lang="en-US" altLang="ko-KR">
+              <a:solidFill>
+                <a:schemeClr val="tx1"/>
+              </a:solidFill>
+            </a:endParaRPr>
+          </a:p>
+          <a:p>
+            <a:pPr algn="ctr"/>
+            <a:r>
+              <a:rPr lang="ko-KR" altLang="en-US">
+                <a:solidFill>
+                  <a:schemeClr val="tx1"/>
+                </a:solidFill>
+              </a:rPr>
+              <a:t>파라미터 값</a:t>
+            </a:r>
+            <a:endParaRPr lang="en-US" altLang="ko-KR">
+              <a:solidFill>
+                <a:schemeClr val="tx1"/>
+              </a:solidFill>
+            </a:endParaRPr>
+          </a:p>
+        </p:txBody>
+      </p:sp>
+      <p:sp>
+        <p:nvSpPr>
+          <p:cNvPr id="15" name="직사각형 14">
+            <a:extLst>
+              <a:ext uri="{FF2B5EF4-FFF2-40B4-BE49-F238E27FC236}">
+                <a16:creationId xmlns:a16="http://schemas.microsoft.com/office/drawing/2014/main" id="{69CBD95F-433D-A4FD-2E62-485AA84760CE}"/>
+              </a:ext>
+            </a:extLst>
+          </p:cNvPr>
+          <p:cNvSpPr/>
+          <p:nvPr/>
+        </p:nvSpPr>
+        <p:spPr>
+          <a:xfrm>
+            <a:off x="3050345" y="5190977"/>
+            <a:ext cx="1974165" cy="1808446"/>
+          </a:xfrm>
+          <a:prstGeom prst="rect">
+            <a:avLst/>
+          </a:prstGeom>
+          <a:noFill/>
+        </p:spPr>
+        <p:style>
+          <a:lnRef idx="2">
+            <a:schemeClr val="accent1">
+              <a:shade val="15000"/>
+            </a:schemeClr>
+          </a:lnRef>
+          <a:fillRef idx="1">
+            <a:schemeClr val="accent1"/>
+          </a:fillRef>
+          <a:effectRef idx="0">
+            <a:schemeClr val="accent1"/>
+          </a:effectRef>
+          <a:fontRef idx="minor">
+            <a:schemeClr val="lt1"/>
+          </a:fontRef>
+        </p:style>
+        <p:txBody>
+          <a:bodyPr rtlCol="0" anchor="ctr"/>
+          <a:lstStyle/>
+          <a:p>
+            <a:pPr algn="ctr"/>
+            <a:r>
+              <a:rPr lang="en-US" altLang="ko-KR">
+                <a:solidFill>
+                  <a:schemeClr val="tx1"/>
+                </a:solidFill>
+              </a:rPr>
+              <a:t>GREEN </a:t>
+            </a:r>
+            <a:r>
+              <a:rPr lang="ko-KR" altLang="en-US">
+                <a:solidFill>
+                  <a:schemeClr val="tx1"/>
+                </a:solidFill>
+              </a:rPr>
+              <a:t>텍스트 박스</a:t>
+            </a:r>
+            <a:endParaRPr lang="en-US" altLang="ko-KR">
+              <a:solidFill>
+                <a:schemeClr val="tx1"/>
+              </a:solidFill>
+            </a:endParaRPr>
+          </a:p>
+          <a:p>
+            <a:pPr algn="ctr"/>
+            <a:r>
+              <a:rPr lang="ko-KR" altLang="en-US">
+                <a:solidFill>
+                  <a:schemeClr val="tx1"/>
+                </a:solidFill>
+              </a:rPr>
+              <a:t>파라미터 값</a:t>
+            </a:r>
+            <a:endParaRPr lang="en-US" altLang="ko-KR">
+              <a:solidFill>
+                <a:schemeClr val="tx1"/>
+              </a:solidFill>
+            </a:endParaRPr>
+          </a:p>
+        </p:txBody>
+      </p:sp>
+      <p:sp>
+        <p:nvSpPr>
+          <p:cNvPr id="16" name="직사각형 15">
+            <a:extLst>
+              <a:ext uri="{FF2B5EF4-FFF2-40B4-BE49-F238E27FC236}">
+                <a16:creationId xmlns:a16="http://schemas.microsoft.com/office/drawing/2014/main" id="{C1AFEF6F-7EE0-AC4A-2959-F52417DBA3F5}"/>
+              </a:ext>
+            </a:extLst>
+          </p:cNvPr>
+          <p:cNvSpPr/>
+          <p:nvPr/>
+        </p:nvSpPr>
+        <p:spPr>
+          <a:xfrm>
+            <a:off x="5433645" y="5190977"/>
+            <a:ext cx="1974165" cy="1808446"/>
+          </a:xfrm>
+          <a:prstGeom prst="rect">
+            <a:avLst/>
+          </a:prstGeom>
+          <a:noFill/>
+        </p:spPr>
+        <p:style>
+          <a:lnRef idx="2">
+            <a:schemeClr val="accent1">
+              <a:shade val="15000"/>
+            </a:schemeClr>
+          </a:lnRef>
+          <a:fillRef idx="1">
+            <a:schemeClr val="accent1"/>
+          </a:fillRef>
+          <a:effectRef idx="0">
+            <a:schemeClr val="accent1"/>
+          </a:effectRef>
+          <a:fontRef idx="minor">
+            <a:schemeClr val="lt1"/>
+          </a:fontRef>
+        </p:style>
+        <p:txBody>
+          <a:bodyPr rtlCol="0" anchor="ctr"/>
+          <a:lstStyle/>
+          <a:p>
+            <a:pPr algn="ctr"/>
+            <a:r>
+              <a:rPr lang="en-US" altLang="ko-KR">
+                <a:solidFill>
+                  <a:schemeClr val="tx1"/>
+                </a:solidFill>
+              </a:rPr>
+              <a:t>BLUE </a:t>
+            </a:r>
+            <a:r>
+              <a:rPr lang="ko-KR" altLang="en-US">
+                <a:solidFill>
+                  <a:schemeClr val="tx1"/>
+                </a:solidFill>
+              </a:rPr>
+              <a:t>텍스트 박스</a:t>
+            </a:r>
+            <a:endParaRPr lang="en-US" altLang="ko-KR">
+              <a:solidFill>
+                <a:schemeClr val="tx1"/>
+              </a:solidFill>
+            </a:endParaRPr>
+          </a:p>
+          <a:p>
+            <a:pPr algn="ctr"/>
+            <a:r>
+              <a:rPr lang="ko-KR" altLang="en-US">
+                <a:solidFill>
+                  <a:schemeClr val="tx1"/>
+                </a:solidFill>
+              </a:rPr>
+              <a:t>파라미터 값</a:t>
+            </a:r>
+            <a:endParaRPr lang="en-US" altLang="ko-KR">
+              <a:solidFill>
+                <a:schemeClr val="tx1"/>
+              </a:solidFill>
+            </a:endParaRPr>
+          </a:p>
+        </p:txBody>
+      </p:sp>
+      <p:sp>
+        <p:nvSpPr>
+          <p:cNvPr id="17" name="직사각형 16">
+            <a:extLst>
+              <a:ext uri="{FF2B5EF4-FFF2-40B4-BE49-F238E27FC236}">
+                <a16:creationId xmlns:a16="http://schemas.microsoft.com/office/drawing/2014/main" id="{8238BA3B-EE05-2B87-906C-C93AB4249055}"/>
+              </a:ext>
+            </a:extLst>
+          </p:cNvPr>
+          <p:cNvSpPr/>
+          <p:nvPr/>
+        </p:nvSpPr>
+        <p:spPr>
+          <a:xfrm>
+            <a:off x="650631" y="4783954"/>
+            <a:ext cx="1974165" cy="265407"/>
+          </a:xfrm>
+          <a:prstGeom prst="rect">
+            <a:avLst/>
+          </a:prstGeom>
+          <a:noFill/>
+        </p:spPr>
+        <p:style>
+          <a:lnRef idx="2">
+            <a:schemeClr val="accent1">
+              <a:shade val="15000"/>
+            </a:schemeClr>
+          </a:lnRef>
+          <a:fillRef idx="1">
+            <a:schemeClr val="accent1"/>
+          </a:fillRef>
+          <a:effectRef idx="0">
+            <a:schemeClr val="accent1"/>
+          </a:effectRef>
+          <a:fontRef idx="minor">
+            <a:schemeClr val="lt1"/>
+          </a:fontRef>
+        </p:style>
+        <p:txBody>
+          <a:bodyPr rtlCol="0" anchor="ctr"/>
+          <a:lstStyle/>
+          <a:p>
+            <a:pPr algn="ctr"/>
+            <a:r>
+              <a:rPr lang="ko-KR" altLang="en-US">
+                <a:solidFill>
+                  <a:schemeClr val="tx1"/>
+                </a:solidFill>
+              </a:rPr>
+              <a:t>공식</a:t>
+            </a:r>
+            <a:endParaRPr lang="en-US" altLang="ko-KR">
+              <a:solidFill>
+                <a:schemeClr val="tx1"/>
+              </a:solidFill>
+            </a:endParaRPr>
+          </a:p>
+        </p:txBody>
+      </p:sp>
+      <p:sp>
+        <p:nvSpPr>
+          <p:cNvPr id="18" name="직사각형 17">
+            <a:extLst>
+              <a:ext uri="{FF2B5EF4-FFF2-40B4-BE49-F238E27FC236}">
+                <a16:creationId xmlns:a16="http://schemas.microsoft.com/office/drawing/2014/main" id="{EDC0BEC9-36AB-11F5-9557-7EAD8805B847}"/>
+              </a:ext>
+            </a:extLst>
+          </p:cNvPr>
+          <p:cNvSpPr/>
+          <p:nvPr/>
+        </p:nvSpPr>
+        <p:spPr>
+          <a:xfrm>
+            <a:off x="3050345" y="4794736"/>
+            <a:ext cx="1974165" cy="265407"/>
+          </a:xfrm>
+          <a:prstGeom prst="rect">
+            <a:avLst/>
+          </a:prstGeom>
+          <a:noFill/>
+        </p:spPr>
+        <p:style>
+          <a:lnRef idx="2">
+            <a:schemeClr val="accent1">
+              <a:shade val="15000"/>
+            </a:schemeClr>
+          </a:lnRef>
+          <a:fillRef idx="1">
+            <a:schemeClr val="accent1"/>
+          </a:fillRef>
+          <a:effectRef idx="0">
+            <a:schemeClr val="accent1"/>
+          </a:effectRef>
+          <a:fontRef idx="minor">
+            <a:schemeClr val="lt1"/>
+          </a:fontRef>
+        </p:style>
+        <p:txBody>
+          <a:bodyPr rtlCol="0" anchor="ctr"/>
+          <a:lstStyle/>
+          <a:p>
+            <a:pPr algn="ctr"/>
+            <a:r>
+              <a:rPr lang="ko-KR" altLang="en-US">
+                <a:solidFill>
+                  <a:schemeClr val="tx1"/>
+                </a:solidFill>
+              </a:rPr>
+              <a:t>공식</a:t>
+            </a:r>
+            <a:endParaRPr lang="en-US" altLang="ko-KR">
+              <a:solidFill>
+                <a:schemeClr val="tx1"/>
+              </a:solidFill>
+            </a:endParaRPr>
+          </a:p>
+        </p:txBody>
+      </p:sp>
+      <p:sp>
+        <p:nvSpPr>
+          <p:cNvPr id="19" name="직사각형 18">
+            <a:extLst>
+              <a:ext uri="{FF2B5EF4-FFF2-40B4-BE49-F238E27FC236}">
+                <a16:creationId xmlns:a16="http://schemas.microsoft.com/office/drawing/2014/main" id="{38741BA9-66D5-5949-52D6-47678EAE13C0}"/>
+              </a:ext>
+            </a:extLst>
+          </p:cNvPr>
+          <p:cNvSpPr/>
+          <p:nvPr/>
+        </p:nvSpPr>
+        <p:spPr>
+          <a:xfrm>
+            <a:off x="5414448" y="4792866"/>
+            <a:ext cx="1974165" cy="265407"/>
+          </a:xfrm>
+          <a:prstGeom prst="rect">
+            <a:avLst/>
+          </a:prstGeom>
+          <a:noFill/>
+        </p:spPr>
+        <p:style>
+          <a:lnRef idx="2">
+            <a:schemeClr val="accent1">
+              <a:shade val="15000"/>
+            </a:schemeClr>
+          </a:lnRef>
+          <a:fillRef idx="1">
+            <a:schemeClr val="accent1"/>
+          </a:fillRef>
+          <a:effectRef idx="0">
+            <a:schemeClr val="accent1"/>
+          </a:effectRef>
+          <a:fontRef idx="minor">
+            <a:schemeClr val="lt1"/>
+          </a:fontRef>
+        </p:style>
+        <p:txBody>
+          <a:bodyPr rtlCol="0" anchor="ctr"/>
+          <a:lstStyle/>
+          <a:p>
+            <a:pPr algn="ctr"/>
+            <a:r>
+              <a:rPr lang="ko-KR" altLang="en-US">
+                <a:solidFill>
+                  <a:schemeClr val="tx1"/>
+                </a:solidFill>
+              </a:rPr>
+              <a:t>공식</a:t>
+            </a:r>
+            <a:endParaRPr lang="en-US" altLang="ko-KR">
+              <a:solidFill>
+                <a:schemeClr val="tx1"/>
+              </a:solidFill>
+            </a:endParaRPr>
+          </a:p>
+        </p:txBody>
+      </p:sp>
+      <p:sp>
+        <p:nvSpPr>
+          <p:cNvPr id="20" name="직사각형 19">
+            <a:extLst>
+              <a:ext uri="{FF2B5EF4-FFF2-40B4-BE49-F238E27FC236}">
+                <a16:creationId xmlns:a16="http://schemas.microsoft.com/office/drawing/2014/main" id="{55D0FDE1-1C20-97C5-BB93-1A448490A13F}"/>
+              </a:ext>
+            </a:extLst>
+          </p:cNvPr>
+          <p:cNvSpPr/>
+          <p:nvPr/>
+        </p:nvSpPr>
+        <p:spPr>
+          <a:xfrm>
+            <a:off x="7956892" y="1842867"/>
+            <a:ext cx="3423870" cy="2461847"/>
+          </a:xfrm>
+          <a:prstGeom prst="rect">
+            <a:avLst/>
+          </a:prstGeom>
+          <a:noFill/>
+        </p:spPr>
+        <p:style>
+          <a:lnRef idx="2">
+            <a:schemeClr val="accent1">
+              <a:shade val="15000"/>
+            </a:schemeClr>
+          </a:lnRef>
+          <a:fillRef idx="1">
+            <a:schemeClr val="accent1"/>
+          </a:fillRef>
+          <a:effectRef idx="0">
+            <a:schemeClr val="accent1"/>
+          </a:effectRef>
+          <a:fontRef idx="minor">
+            <a:schemeClr val="lt1"/>
+          </a:fontRef>
+        </p:style>
+        <p:txBody>
+          <a:bodyPr rtlCol="0" anchor="ctr"/>
+          <a:lstStyle/>
+          <a:p>
+            <a:pPr algn="ctr"/>
+            <a:r>
+              <a:rPr lang="en-US" altLang="ko-KR">
+                <a:solidFill>
+                  <a:schemeClr val="tx1"/>
+                </a:solidFill>
+              </a:rPr>
+              <a:t>TOTAL </a:t>
+            </a:r>
+            <a:r>
+              <a:rPr lang="ko-KR" altLang="en-US">
+                <a:solidFill>
+                  <a:schemeClr val="tx1"/>
+                </a:solidFill>
+              </a:rPr>
+              <a:t>텍스트 박스</a:t>
+            </a:r>
+            <a:endParaRPr lang="en-US" altLang="ko-KR">
+              <a:solidFill>
+                <a:schemeClr val="tx1"/>
+              </a:solidFill>
+            </a:endParaRPr>
+          </a:p>
+          <a:p>
+            <a:pPr algn="ctr"/>
+            <a:r>
+              <a:rPr lang="ko-KR" altLang="en-US">
+                <a:solidFill>
+                  <a:schemeClr val="tx1"/>
+                </a:solidFill>
+              </a:rPr>
+              <a:t>파라미터 값</a:t>
+            </a:r>
+            <a:endParaRPr lang="en-US" altLang="ko-KR">
+              <a:solidFill>
+                <a:schemeClr val="tx1"/>
+              </a:solidFill>
+            </a:endParaRPr>
+          </a:p>
+        </p:txBody>
+      </p:sp>
+      <p:sp>
+        <p:nvSpPr>
+          <p:cNvPr id="21" name="직사각형 20">
+            <a:extLst>
+              <a:ext uri="{FF2B5EF4-FFF2-40B4-BE49-F238E27FC236}">
+                <a16:creationId xmlns:a16="http://schemas.microsoft.com/office/drawing/2014/main" id="{EF0EC90C-5ED5-3D29-679C-35AC16E03105}"/>
+              </a:ext>
+            </a:extLst>
+          </p:cNvPr>
+          <p:cNvSpPr/>
+          <p:nvPr/>
+        </p:nvSpPr>
+        <p:spPr>
+          <a:xfrm>
+            <a:off x="3495733" y="7814676"/>
+            <a:ext cx="752710" cy="364895"/>
+          </a:xfrm>
+          <a:prstGeom prst="rect">
+            <a:avLst/>
+          </a:prstGeom>
+        </p:spPr>
+        <p:style>
+          <a:lnRef idx="2">
+            <a:schemeClr val="accent1">
+              <a:shade val="15000"/>
+            </a:schemeClr>
+          </a:lnRef>
+          <a:fillRef idx="1">
+            <a:schemeClr val="accent1"/>
+          </a:fillRef>
+          <a:effectRef idx="0">
+            <a:schemeClr val="accent1"/>
+          </a:effectRef>
+          <a:fontRef idx="minor">
+            <a:schemeClr val="lt1"/>
+          </a:fontRef>
+        </p:style>
+        <p:txBody>
+          <a:bodyPr rtlCol="0" anchor="ctr"/>
+          <a:lstStyle/>
+          <a:p>
+            <a:pPr algn="ctr"/>
+            <a:r>
+              <a:rPr lang="en-US" altLang="ko-KR"/>
+              <a:t>R_V</a:t>
+            </a:r>
+            <a:endParaRPr lang="ko-KR" altLang="en-US"/>
+          </a:p>
+        </p:txBody>
+      </p:sp>
+      <p:sp>
+        <p:nvSpPr>
+          <p:cNvPr id="22" name="직사각형 21">
+            <a:extLst>
+              <a:ext uri="{FF2B5EF4-FFF2-40B4-BE49-F238E27FC236}">
+                <a16:creationId xmlns:a16="http://schemas.microsoft.com/office/drawing/2014/main" id="{D8A25DCA-EFEC-2669-5419-E7E229267C74}"/>
+              </a:ext>
+            </a:extLst>
+          </p:cNvPr>
+          <p:cNvSpPr/>
+          <p:nvPr/>
+        </p:nvSpPr>
+        <p:spPr>
+          <a:xfrm>
+            <a:off x="4828351" y="7814675"/>
+            <a:ext cx="2132086" cy="364895"/>
+          </a:xfrm>
+          <a:prstGeom prst="rect">
+            <a:avLst/>
+          </a:prstGeom>
+          <a:noFill/>
+        </p:spPr>
+        <p:style>
+          <a:lnRef idx="2">
+            <a:schemeClr val="accent1">
+              <a:shade val="15000"/>
+            </a:schemeClr>
+          </a:lnRef>
+          <a:fillRef idx="1">
+            <a:schemeClr val="accent1"/>
+          </a:fillRef>
+          <a:effectRef idx="0">
+            <a:schemeClr val="accent1"/>
+          </a:effectRef>
+          <a:fontRef idx="minor">
+            <a:schemeClr val="lt1"/>
+          </a:fontRef>
+        </p:style>
+        <p:txBody>
+          <a:bodyPr rtlCol="0" anchor="ctr"/>
+          <a:lstStyle/>
+          <a:p>
+            <a:pPr algn="ctr"/>
+            <a:endParaRPr lang="ko-KR" altLang="en-US"/>
+          </a:p>
+        </p:txBody>
+      </p:sp>
+      <p:sp>
+        <p:nvSpPr>
+          <p:cNvPr id="23" name="직사각형 22">
+            <a:extLst>
+              <a:ext uri="{FF2B5EF4-FFF2-40B4-BE49-F238E27FC236}">
+                <a16:creationId xmlns:a16="http://schemas.microsoft.com/office/drawing/2014/main" id="{0994BF32-1A81-60CB-B96E-511C945177F5}"/>
+              </a:ext>
+            </a:extLst>
+          </p:cNvPr>
+          <p:cNvSpPr/>
+          <p:nvPr/>
+        </p:nvSpPr>
+        <p:spPr>
+          <a:xfrm>
+            <a:off x="3495733" y="8392589"/>
+            <a:ext cx="1114424" cy="364895"/>
+          </a:xfrm>
+          <a:prstGeom prst="rect">
+            <a:avLst/>
+          </a:prstGeom>
+        </p:spPr>
+        <p:style>
+          <a:lnRef idx="2">
+            <a:schemeClr val="accent1">
+              <a:shade val="15000"/>
+            </a:schemeClr>
+          </a:lnRef>
+          <a:fillRef idx="1">
+            <a:schemeClr val="accent1"/>
+          </a:fillRef>
+          <a:effectRef idx="0">
+            <a:schemeClr val="accent1"/>
+          </a:effectRef>
+          <a:fontRef idx="minor">
+            <a:schemeClr val="lt1"/>
+          </a:fontRef>
+        </p:style>
+        <p:txBody>
+          <a:bodyPr rtlCol="0" anchor="ctr"/>
+          <a:lstStyle/>
+          <a:p>
+            <a:pPr algn="ctr"/>
+            <a:r>
+              <a:rPr lang="en-US" altLang="ko-KR"/>
+              <a:t>Pattern</a:t>
+            </a:r>
+            <a:endParaRPr lang="ko-KR" altLang="en-US"/>
+          </a:p>
+        </p:txBody>
+      </p:sp>
+      <p:sp>
+        <p:nvSpPr>
+          <p:cNvPr id="24" name="직사각형 23">
+            <a:extLst>
+              <a:ext uri="{FF2B5EF4-FFF2-40B4-BE49-F238E27FC236}">
+                <a16:creationId xmlns:a16="http://schemas.microsoft.com/office/drawing/2014/main" id="{71DE8158-0970-3211-9989-E96E30157A92}"/>
+              </a:ext>
+            </a:extLst>
+          </p:cNvPr>
+          <p:cNvSpPr/>
+          <p:nvPr/>
+        </p:nvSpPr>
+        <p:spPr>
+          <a:xfrm>
+            <a:off x="4828350" y="8392588"/>
+            <a:ext cx="2132087" cy="364895"/>
+          </a:xfrm>
+          <a:prstGeom prst="rect">
+            <a:avLst/>
+          </a:prstGeom>
+          <a:noFill/>
+        </p:spPr>
+        <p:style>
+          <a:lnRef idx="2">
+            <a:schemeClr val="accent1">
+              <a:shade val="15000"/>
+            </a:schemeClr>
+          </a:lnRef>
+          <a:fillRef idx="1">
+            <a:schemeClr val="accent1"/>
+          </a:fillRef>
+          <a:effectRef idx="0">
+            <a:schemeClr val="accent1"/>
+          </a:effectRef>
+          <a:fontRef idx="minor">
+            <a:schemeClr val="lt1"/>
+          </a:fontRef>
+        </p:style>
+        <p:txBody>
+          <a:bodyPr rtlCol="0" anchor="ctr"/>
+          <a:lstStyle/>
+          <a:p>
+            <a:pPr algn="ctr"/>
+            <a:endParaRPr lang="ko-KR" altLang="en-US"/>
+          </a:p>
+        </p:txBody>
+      </p:sp>
+      <p:cxnSp>
+        <p:nvCxnSpPr>
+          <p:cNvPr id="25" name="직선 연결선 24">
+            <a:extLst>
+              <a:ext uri="{FF2B5EF4-FFF2-40B4-BE49-F238E27FC236}">
+                <a16:creationId xmlns:a16="http://schemas.microsoft.com/office/drawing/2014/main" id="{932E2542-4810-BA75-C7AB-9B9EFF28D068}"/>
+              </a:ext>
+            </a:extLst>
+          </p:cNvPr>
+          <p:cNvCxnSpPr>
+            <a:cxnSpLocks/>
+          </p:cNvCxnSpPr>
+          <p:nvPr/>
+        </p:nvCxnSpPr>
+        <p:spPr>
+          <a:xfrm>
+            <a:off x="3930834" y="7473710"/>
+            <a:ext cx="4391252" cy="2"/>
+          </a:xfrm>
+          <a:prstGeom prst="line">
+            <a:avLst/>
+          </a:prstGeom>
+        </p:spPr>
+        <p:style>
+          <a:lnRef idx="2">
+            <a:schemeClr val="accent1"/>
+          </a:lnRef>
+          <a:fillRef idx="0">
+            <a:schemeClr val="accent1"/>
+          </a:fillRef>
+          <a:effectRef idx="1">
+            <a:schemeClr val="accent1"/>
+          </a:effectRef>
+          <a:fontRef idx="minor">
+            <a:schemeClr val="tx1"/>
+          </a:fontRef>
+        </p:style>
+      </p:cxnSp>
+      <p:sp>
+        <p:nvSpPr>
+          <p:cNvPr id="26" name="직사각형 25">
+            <a:extLst>
+              <a:ext uri="{FF2B5EF4-FFF2-40B4-BE49-F238E27FC236}">
+                <a16:creationId xmlns:a16="http://schemas.microsoft.com/office/drawing/2014/main" id="{3C72E8AF-18C5-ED7F-3A9C-76B2080DA560}"/>
+              </a:ext>
+            </a:extLst>
+          </p:cNvPr>
+          <p:cNvSpPr/>
+          <p:nvPr/>
+        </p:nvSpPr>
+        <p:spPr>
+          <a:xfrm>
+            <a:off x="7169586" y="7786670"/>
+            <a:ext cx="1114424" cy="364895"/>
+          </a:xfrm>
+          <a:prstGeom prst="rect">
+            <a:avLst/>
+          </a:prstGeom>
+        </p:spPr>
+        <p:style>
+          <a:lnRef idx="2">
+            <a:schemeClr val="accent1">
+              <a:shade val="15000"/>
+            </a:schemeClr>
+          </a:lnRef>
+          <a:fillRef idx="1">
+            <a:schemeClr val="accent1"/>
+          </a:fillRef>
+          <a:effectRef idx="0">
+            <a:schemeClr val="accent1"/>
+          </a:effectRef>
+          <a:fontRef idx="minor">
+            <a:schemeClr val="lt1"/>
+          </a:fontRef>
+        </p:style>
+        <p:txBody>
+          <a:bodyPr rtlCol="0" anchor="ctr"/>
+          <a:lstStyle/>
+          <a:p>
+            <a:pPr algn="ctr"/>
+            <a:r>
+              <a:rPr lang="en-US" altLang="ko-KR"/>
+              <a:t>connect</a:t>
+            </a:r>
+            <a:endParaRPr lang="ko-KR" altLang="en-US"/>
+          </a:p>
+        </p:txBody>
+      </p:sp>
+      <p:sp>
+        <p:nvSpPr>
+          <p:cNvPr id="27" name="직사각형 26">
+            <a:extLst>
+              <a:ext uri="{FF2B5EF4-FFF2-40B4-BE49-F238E27FC236}">
+                <a16:creationId xmlns:a16="http://schemas.microsoft.com/office/drawing/2014/main" id="{BAB28BB6-1733-6345-2319-BA43726A0325}"/>
+              </a:ext>
+            </a:extLst>
+          </p:cNvPr>
+          <p:cNvSpPr/>
+          <p:nvPr/>
+        </p:nvSpPr>
+        <p:spPr>
+          <a:xfrm>
+            <a:off x="3495733" y="8923347"/>
+            <a:ext cx="1114424" cy="364895"/>
+          </a:xfrm>
+          <a:prstGeom prst="rect">
+            <a:avLst/>
+          </a:prstGeom>
+        </p:spPr>
+        <p:style>
+          <a:lnRef idx="2">
+            <a:schemeClr val="accent1">
+              <a:shade val="15000"/>
+            </a:schemeClr>
+          </a:lnRef>
+          <a:fillRef idx="1">
+            <a:schemeClr val="accent1"/>
+          </a:fillRef>
+          <a:effectRef idx="0">
+            <a:schemeClr val="accent1"/>
+          </a:effectRef>
+          <a:fontRef idx="minor">
+            <a:schemeClr val="lt1"/>
+          </a:fontRef>
+        </p:style>
+        <p:txBody>
+          <a:bodyPr rtlCol="0" anchor="ctr"/>
+          <a:lstStyle/>
+          <a:p>
+            <a:pPr algn="ctr"/>
+            <a:r>
+              <a:rPr lang="en-US" altLang="ko-KR"/>
+              <a:t>Voltage</a:t>
+            </a:r>
+            <a:endParaRPr lang="ko-KR" altLang="en-US"/>
+          </a:p>
+        </p:txBody>
+      </p:sp>
+      <p:sp>
+        <p:nvSpPr>
+          <p:cNvPr id="28" name="직사각형 27">
+            <a:extLst>
+              <a:ext uri="{FF2B5EF4-FFF2-40B4-BE49-F238E27FC236}">
+                <a16:creationId xmlns:a16="http://schemas.microsoft.com/office/drawing/2014/main" id="{42321E52-CD71-17BB-A97D-F8B1F8ACCA0F}"/>
+              </a:ext>
+            </a:extLst>
+          </p:cNvPr>
+          <p:cNvSpPr/>
+          <p:nvPr/>
+        </p:nvSpPr>
+        <p:spPr>
+          <a:xfrm>
+            <a:off x="4828351" y="8939328"/>
+            <a:ext cx="603120" cy="364895"/>
+          </a:xfrm>
+          <a:prstGeom prst="rect">
+            <a:avLst/>
+          </a:prstGeom>
+          <a:noFill/>
+        </p:spPr>
+        <p:style>
+          <a:lnRef idx="2">
+            <a:schemeClr val="accent1">
+              <a:shade val="15000"/>
+            </a:schemeClr>
+          </a:lnRef>
+          <a:fillRef idx="1">
+            <a:schemeClr val="accent1"/>
+          </a:fillRef>
+          <a:effectRef idx="0">
+            <a:schemeClr val="accent1"/>
+          </a:effectRef>
+          <a:fontRef idx="minor">
+            <a:schemeClr val="lt1"/>
+          </a:fontRef>
+        </p:style>
+        <p:txBody>
+          <a:bodyPr rtlCol="0" anchor="ctr"/>
+          <a:lstStyle/>
+          <a:p>
+            <a:pPr algn="ctr"/>
+            <a:endParaRPr lang="ko-KR" altLang="en-US"/>
+          </a:p>
+        </p:txBody>
+      </p:sp>
+      <p:sp>
+        <p:nvSpPr>
+          <p:cNvPr id="29" name="직사각형 28">
+            <a:extLst>
+              <a:ext uri="{FF2B5EF4-FFF2-40B4-BE49-F238E27FC236}">
+                <a16:creationId xmlns:a16="http://schemas.microsoft.com/office/drawing/2014/main" id="{CFAAF399-48A6-03CE-C549-FA496C6B644B}"/>
+              </a:ext>
+            </a:extLst>
+          </p:cNvPr>
+          <p:cNvSpPr/>
+          <p:nvPr/>
+        </p:nvSpPr>
+        <p:spPr>
+          <a:xfrm>
+            <a:off x="5669545" y="8923346"/>
+            <a:ext cx="603120" cy="364895"/>
+          </a:xfrm>
+          <a:prstGeom prst="rect">
+            <a:avLst/>
+          </a:prstGeom>
+          <a:noFill/>
+        </p:spPr>
+        <p:style>
+          <a:lnRef idx="2">
+            <a:schemeClr val="accent1">
+              <a:shade val="15000"/>
+            </a:schemeClr>
+          </a:lnRef>
+          <a:fillRef idx="1">
+            <a:schemeClr val="accent1"/>
+          </a:fillRef>
+          <a:effectRef idx="0">
+            <a:schemeClr val="accent1"/>
+          </a:effectRef>
+          <a:fontRef idx="minor">
+            <a:schemeClr val="lt1"/>
+          </a:fontRef>
+        </p:style>
+        <p:txBody>
+          <a:bodyPr rtlCol="0" anchor="ctr"/>
+          <a:lstStyle/>
+          <a:p>
+            <a:pPr algn="ctr"/>
+            <a:endParaRPr lang="ko-KR" altLang="en-US"/>
+          </a:p>
+        </p:txBody>
+      </p:sp>
+      <p:sp>
+        <p:nvSpPr>
+          <p:cNvPr id="30" name="직사각형 29">
+            <a:extLst>
+              <a:ext uri="{FF2B5EF4-FFF2-40B4-BE49-F238E27FC236}">
+                <a16:creationId xmlns:a16="http://schemas.microsoft.com/office/drawing/2014/main" id="{6E49A07F-873A-D73B-5679-CF4391D59E11}"/>
+              </a:ext>
+            </a:extLst>
+          </p:cNvPr>
+          <p:cNvSpPr/>
+          <p:nvPr/>
+        </p:nvSpPr>
+        <p:spPr>
+          <a:xfrm>
+            <a:off x="6380724" y="8934698"/>
+            <a:ext cx="603120" cy="364895"/>
+          </a:xfrm>
+          <a:prstGeom prst="rect">
+            <a:avLst/>
+          </a:prstGeom>
+          <a:noFill/>
+        </p:spPr>
+        <p:style>
+          <a:lnRef idx="2">
+            <a:schemeClr val="accent1">
+              <a:shade val="15000"/>
+            </a:schemeClr>
+          </a:lnRef>
+          <a:fillRef idx="1">
+            <a:schemeClr val="accent1"/>
+          </a:fillRef>
+          <a:effectRef idx="0">
+            <a:schemeClr val="accent1"/>
+          </a:effectRef>
+          <a:fontRef idx="minor">
+            <a:schemeClr val="lt1"/>
+          </a:fontRef>
+        </p:style>
+        <p:txBody>
+          <a:bodyPr rtlCol="0" anchor="ctr"/>
+          <a:lstStyle/>
+          <a:p>
+            <a:pPr algn="ctr"/>
+            <a:endParaRPr lang="ko-KR" altLang="en-US"/>
+          </a:p>
+        </p:txBody>
+      </p:sp>
+      <p:sp>
+        <p:nvSpPr>
+          <p:cNvPr id="31" name="직사각형 30">
+            <a:extLst>
+              <a:ext uri="{FF2B5EF4-FFF2-40B4-BE49-F238E27FC236}">
+                <a16:creationId xmlns:a16="http://schemas.microsoft.com/office/drawing/2014/main" id="{0A3F2DD7-D64E-8417-39BF-84E2190F10C8}"/>
+              </a:ext>
+            </a:extLst>
+          </p:cNvPr>
+          <p:cNvSpPr/>
+          <p:nvPr/>
+        </p:nvSpPr>
+        <p:spPr>
+          <a:xfrm>
+            <a:off x="9111614" y="6320927"/>
+            <a:ext cx="1114424" cy="530756"/>
+          </a:xfrm>
+          <a:prstGeom prst="rect">
+            <a:avLst/>
+          </a:prstGeom>
+        </p:spPr>
+        <p:style>
+          <a:lnRef idx="2">
+            <a:schemeClr val="accent1">
+              <a:shade val="15000"/>
+            </a:schemeClr>
+          </a:lnRef>
+          <a:fillRef idx="1">
+            <a:schemeClr val="accent1"/>
+          </a:fillRef>
+          <a:effectRef idx="0">
+            <a:schemeClr val="accent1"/>
+          </a:effectRef>
+          <a:fontRef idx="minor">
+            <a:schemeClr val="lt1"/>
+          </a:fontRef>
+        </p:style>
+        <p:txBody>
+          <a:bodyPr rtlCol="0" anchor="ctr"/>
+          <a:lstStyle/>
+          <a:p>
+            <a:pPr algn="ctr"/>
+            <a:r>
+              <a:rPr lang="en-US" altLang="ko-KR"/>
+              <a:t>Test Start</a:t>
+            </a:r>
+            <a:endParaRPr lang="ko-KR" altLang="en-US"/>
+          </a:p>
+        </p:txBody>
+      </p:sp>
+      <p:cxnSp>
+        <p:nvCxnSpPr>
+          <p:cNvPr id="32" name="직선 연결선 31">
+            <a:extLst>
+              <a:ext uri="{FF2B5EF4-FFF2-40B4-BE49-F238E27FC236}">
+                <a16:creationId xmlns:a16="http://schemas.microsoft.com/office/drawing/2014/main" id="{12576658-C1C1-B8E9-14A7-8142BD916CD8}"/>
+              </a:ext>
+            </a:extLst>
+          </p:cNvPr>
+          <p:cNvCxnSpPr>
+            <a:cxnSpLocks/>
+          </p:cNvCxnSpPr>
+          <p:nvPr/>
+        </p:nvCxnSpPr>
+        <p:spPr>
+          <a:xfrm>
+            <a:off x="5244401" y="9815626"/>
+            <a:ext cx="3101092" cy="2"/>
+          </a:xfrm>
+          <a:prstGeom prst="line">
+            <a:avLst/>
+          </a:prstGeom>
+        </p:spPr>
+        <p:style>
+          <a:lnRef idx="2">
+            <a:schemeClr val="accent1"/>
+          </a:lnRef>
+          <a:fillRef idx="0">
+            <a:schemeClr val="accent1"/>
+          </a:fillRef>
+          <a:effectRef idx="1">
+            <a:schemeClr val="accent1"/>
+          </a:effectRef>
+          <a:fontRef idx="minor">
+            <a:schemeClr val="tx1"/>
+          </a:fontRef>
+        </p:style>
+      </p:cxnSp>
+      <p:sp>
+        <p:nvSpPr>
+          <p:cNvPr id="33" name="직사각형 32">
+            <a:extLst>
+              <a:ext uri="{FF2B5EF4-FFF2-40B4-BE49-F238E27FC236}">
+                <a16:creationId xmlns:a16="http://schemas.microsoft.com/office/drawing/2014/main" id="{7EB8B72D-A89E-CCBF-6ADC-517D97801C1B}"/>
+              </a:ext>
+            </a:extLst>
+          </p:cNvPr>
+          <p:cNvSpPr/>
+          <p:nvPr/>
+        </p:nvSpPr>
+        <p:spPr>
+          <a:xfrm>
+            <a:off x="7956891" y="4509854"/>
+            <a:ext cx="3423871" cy="2461847"/>
+          </a:xfrm>
+          <a:prstGeom prst="rect">
+            <a:avLst/>
+          </a:prstGeom>
+          <a:noFill/>
+        </p:spPr>
+        <p:style>
+          <a:lnRef idx="2">
+            <a:schemeClr val="accent1">
+              <a:shade val="15000"/>
+            </a:schemeClr>
+          </a:lnRef>
+          <a:fillRef idx="1">
+            <a:schemeClr val="accent1"/>
+          </a:fillRef>
+          <a:effectRef idx="0">
+            <a:schemeClr val="accent1"/>
+          </a:effectRef>
+          <a:fontRef idx="minor">
+            <a:schemeClr val="lt1"/>
+          </a:fontRef>
+        </p:style>
+        <p:txBody>
+          <a:bodyPr rtlCol="0" anchor="ctr"/>
+          <a:lstStyle/>
+          <a:p>
+            <a:pPr algn="ctr"/>
+            <a:endParaRPr lang="en-US" altLang="ko-KR">
+              <a:solidFill>
+                <a:schemeClr val="tx1"/>
+              </a:solidFill>
+            </a:endParaRPr>
+          </a:p>
+        </p:txBody>
+      </p:sp>
+      <p:sp>
+        <p:nvSpPr>
+          <p:cNvPr id="34" name="직사각형 33">
+            <a:extLst>
+              <a:ext uri="{FF2B5EF4-FFF2-40B4-BE49-F238E27FC236}">
+                <a16:creationId xmlns:a16="http://schemas.microsoft.com/office/drawing/2014/main" id="{C2216012-6428-37A4-6D0E-96F1E0F818B5}"/>
+              </a:ext>
+            </a:extLst>
+          </p:cNvPr>
+          <p:cNvSpPr/>
+          <p:nvPr/>
+        </p:nvSpPr>
+        <p:spPr>
+          <a:xfrm>
+            <a:off x="7970960" y="4734209"/>
+            <a:ext cx="708806" cy="364895"/>
+          </a:xfrm>
+          <a:prstGeom prst="rect">
+            <a:avLst/>
+          </a:prstGeom>
+        </p:spPr>
+        <p:style>
+          <a:lnRef idx="2">
+            <a:schemeClr val="accent1">
+              <a:shade val="15000"/>
+            </a:schemeClr>
+          </a:lnRef>
+          <a:fillRef idx="1">
+            <a:schemeClr val="accent1"/>
+          </a:fillRef>
+          <a:effectRef idx="0">
+            <a:schemeClr val="accent1"/>
+          </a:effectRef>
+          <a:fontRef idx="minor">
+            <a:schemeClr val="lt1"/>
+          </a:fontRef>
+        </p:style>
+        <p:txBody>
+          <a:bodyPr rtlCol="0" anchor="ctr"/>
+          <a:lstStyle/>
+          <a:p>
+            <a:pPr algn="ctr"/>
+            <a:r>
+              <a:rPr lang="en-US" altLang="ko-KR"/>
+              <a:t>R_V</a:t>
+            </a:r>
+            <a:endParaRPr lang="ko-KR" altLang="en-US"/>
+          </a:p>
+        </p:txBody>
+      </p:sp>
+      <p:sp>
+        <p:nvSpPr>
+          <p:cNvPr id="35" name="직사각형 34">
+            <a:extLst>
+              <a:ext uri="{FF2B5EF4-FFF2-40B4-BE49-F238E27FC236}">
+                <a16:creationId xmlns:a16="http://schemas.microsoft.com/office/drawing/2014/main" id="{AA72C7AA-E569-993B-B0E0-31E79CEA6BFA}"/>
+              </a:ext>
+            </a:extLst>
+          </p:cNvPr>
+          <p:cNvSpPr/>
+          <p:nvPr/>
+        </p:nvSpPr>
+        <p:spPr>
+          <a:xfrm>
+            <a:off x="7967683" y="5208495"/>
+            <a:ext cx="708806" cy="364895"/>
+          </a:xfrm>
+          <a:prstGeom prst="rect">
+            <a:avLst/>
+          </a:prstGeom>
+        </p:spPr>
+        <p:style>
+          <a:lnRef idx="2">
+            <a:schemeClr val="accent1">
+              <a:shade val="15000"/>
+            </a:schemeClr>
+          </a:lnRef>
+          <a:fillRef idx="1">
+            <a:schemeClr val="accent1"/>
+          </a:fillRef>
+          <a:effectRef idx="0">
+            <a:schemeClr val="accent1"/>
+          </a:effectRef>
+          <a:fontRef idx="minor">
+            <a:schemeClr val="lt1"/>
+          </a:fontRef>
+        </p:style>
+        <p:txBody>
+          <a:bodyPr rtlCol="0" anchor="ctr"/>
+          <a:lstStyle/>
+          <a:p>
+            <a:pPr algn="ctr"/>
+            <a:r>
+              <a:rPr lang="en-US" altLang="ko-KR"/>
+              <a:t>G_V</a:t>
+            </a:r>
+            <a:endParaRPr lang="ko-KR" altLang="en-US"/>
+          </a:p>
+        </p:txBody>
+      </p:sp>
+      <p:sp>
+        <p:nvSpPr>
+          <p:cNvPr id="36" name="직사각형 35">
+            <a:extLst>
+              <a:ext uri="{FF2B5EF4-FFF2-40B4-BE49-F238E27FC236}">
+                <a16:creationId xmlns:a16="http://schemas.microsoft.com/office/drawing/2014/main" id="{9429C3BE-60FC-4C87-F684-D4DBEF873D92}"/>
+              </a:ext>
+            </a:extLst>
+          </p:cNvPr>
+          <p:cNvSpPr/>
+          <p:nvPr/>
+        </p:nvSpPr>
+        <p:spPr>
+          <a:xfrm>
+            <a:off x="7953615" y="5684836"/>
+            <a:ext cx="708806" cy="364895"/>
+          </a:xfrm>
+          <a:prstGeom prst="rect">
+            <a:avLst/>
+          </a:prstGeom>
+        </p:spPr>
+        <p:style>
+          <a:lnRef idx="2">
+            <a:schemeClr val="accent1">
+              <a:shade val="15000"/>
+            </a:schemeClr>
+          </a:lnRef>
+          <a:fillRef idx="1">
+            <a:schemeClr val="accent1"/>
+          </a:fillRef>
+          <a:effectRef idx="0">
+            <a:schemeClr val="accent1"/>
+          </a:effectRef>
+          <a:fontRef idx="minor">
+            <a:schemeClr val="lt1"/>
+          </a:fontRef>
+        </p:style>
+        <p:txBody>
+          <a:bodyPr rtlCol="0" anchor="ctr"/>
+          <a:lstStyle/>
+          <a:p>
+            <a:pPr algn="ctr"/>
+            <a:r>
+              <a:rPr lang="en-US" altLang="ko-KR"/>
+              <a:t>B_V</a:t>
+            </a:r>
+            <a:endParaRPr lang="ko-KR" altLang="en-US"/>
+          </a:p>
+        </p:txBody>
+      </p:sp>
+      <p:sp>
+        <p:nvSpPr>
+          <p:cNvPr id="37" name="직사각형 36">
+            <a:extLst>
+              <a:ext uri="{FF2B5EF4-FFF2-40B4-BE49-F238E27FC236}">
+                <a16:creationId xmlns:a16="http://schemas.microsoft.com/office/drawing/2014/main" id="{39B19ABE-A7E2-B700-3A9B-F3C84F0CB1B3}"/>
+              </a:ext>
+            </a:extLst>
+          </p:cNvPr>
+          <p:cNvSpPr/>
+          <p:nvPr/>
+        </p:nvSpPr>
+        <p:spPr>
+          <a:xfrm>
+            <a:off x="8842163" y="4734208"/>
+            <a:ext cx="603120" cy="364895"/>
+          </a:xfrm>
+          <a:prstGeom prst="rect">
+            <a:avLst/>
+          </a:prstGeom>
+          <a:noFill/>
+        </p:spPr>
+        <p:style>
+          <a:lnRef idx="2">
+            <a:schemeClr val="accent1">
+              <a:shade val="15000"/>
+            </a:schemeClr>
+          </a:lnRef>
+          <a:fillRef idx="1">
+            <a:schemeClr val="accent1"/>
+          </a:fillRef>
+          <a:effectRef idx="0">
+            <a:schemeClr val="accent1"/>
+          </a:effectRef>
+          <a:fontRef idx="minor">
+            <a:schemeClr val="lt1"/>
+          </a:fontRef>
+        </p:style>
+        <p:txBody>
+          <a:bodyPr rtlCol="0" anchor="ctr"/>
+          <a:lstStyle/>
+          <a:p>
+            <a:pPr algn="ctr"/>
+            <a:endParaRPr lang="ko-KR" altLang="en-US"/>
+          </a:p>
+        </p:txBody>
+      </p:sp>
+      <p:sp>
+        <p:nvSpPr>
+          <p:cNvPr id="38" name="직사각형 37">
+            <a:extLst>
+              <a:ext uri="{FF2B5EF4-FFF2-40B4-BE49-F238E27FC236}">
+                <a16:creationId xmlns:a16="http://schemas.microsoft.com/office/drawing/2014/main" id="{94530049-7F74-900D-B02A-6E30B6D558E4}"/>
+              </a:ext>
+            </a:extLst>
+          </p:cNvPr>
+          <p:cNvSpPr/>
+          <p:nvPr/>
+        </p:nvSpPr>
+        <p:spPr>
+          <a:xfrm>
+            <a:off x="8840524" y="5232943"/>
+            <a:ext cx="603120" cy="364895"/>
+          </a:xfrm>
+          <a:prstGeom prst="rect">
+            <a:avLst/>
+          </a:prstGeom>
+          <a:noFill/>
+        </p:spPr>
+        <p:style>
+          <a:lnRef idx="2">
+            <a:schemeClr val="accent1">
+              <a:shade val="15000"/>
+            </a:schemeClr>
+          </a:lnRef>
+          <a:fillRef idx="1">
+            <a:schemeClr val="accent1"/>
+          </a:fillRef>
+          <a:effectRef idx="0">
+            <a:schemeClr val="accent1"/>
+          </a:effectRef>
+          <a:fontRef idx="minor">
+            <a:schemeClr val="lt1"/>
+          </a:fontRef>
+        </p:style>
+        <p:txBody>
+          <a:bodyPr rtlCol="0" anchor="ctr"/>
+          <a:lstStyle/>
+          <a:p>
+            <a:pPr algn="ctr"/>
+            <a:endParaRPr lang="ko-KR" altLang="en-US"/>
+          </a:p>
+        </p:txBody>
+      </p:sp>
+      <p:sp>
+        <p:nvSpPr>
+          <p:cNvPr id="39" name="직사각형 38">
+            <a:extLst>
+              <a:ext uri="{FF2B5EF4-FFF2-40B4-BE49-F238E27FC236}">
+                <a16:creationId xmlns:a16="http://schemas.microsoft.com/office/drawing/2014/main" id="{03974A2A-E3EC-1081-AF3A-D4591212FE3F}"/>
+              </a:ext>
+            </a:extLst>
+          </p:cNvPr>
+          <p:cNvSpPr/>
+          <p:nvPr/>
+        </p:nvSpPr>
+        <p:spPr>
+          <a:xfrm>
+            <a:off x="8840524" y="5728094"/>
+            <a:ext cx="603120" cy="364895"/>
+          </a:xfrm>
+          <a:prstGeom prst="rect">
+            <a:avLst/>
+          </a:prstGeom>
+          <a:noFill/>
+        </p:spPr>
+        <p:style>
+          <a:lnRef idx="2">
+            <a:schemeClr val="accent1">
+              <a:shade val="15000"/>
+            </a:schemeClr>
+          </a:lnRef>
+          <a:fillRef idx="1">
+            <a:schemeClr val="accent1"/>
+          </a:fillRef>
+          <a:effectRef idx="0">
+            <a:schemeClr val="accent1"/>
+          </a:effectRef>
+          <a:fontRef idx="minor">
+            <a:schemeClr val="lt1"/>
+          </a:fontRef>
+        </p:style>
+        <p:txBody>
+          <a:bodyPr rtlCol="0" anchor="ctr"/>
+          <a:lstStyle/>
+          <a:p>
+            <a:pPr algn="ctr"/>
+            <a:endParaRPr lang="ko-KR" altLang="en-US"/>
+          </a:p>
+        </p:txBody>
+      </p:sp>
+      <p:sp>
+        <p:nvSpPr>
+          <p:cNvPr id="40" name="직사각형 39">
+            <a:extLst>
+              <a:ext uri="{FF2B5EF4-FFF2-40B4-BE49-F238E27FC236}">
+                <a16:creationId xmlns:a16="http://schemas.microsoft.com/office/drawing/2014/main" id="{CE87226E-4D37-A01C-7D34-E72207E39EEB}"/>
+              </a:ext>
+            </a:extLst>
+          </p:cNvPr>
+          <p:cNvSpPr/>
+          <p:nvPr/>
+        </p:nvSpPr>
+        <p:spPr>
+          <a:xfrm>
+            <a:off x="9565036" y="4751736"/>
+            <a:ext cx="943529" cy="530756"/>
+          </a:xfrm>
+          <a:prstGeom prst="rect">
+            <a:avLst/>
+          </a:prstGeom>
+        </p:spPr>
+        <p:style>
+          <a:lnRef idx="2">
+            <a:schemeClr val="accent1">
+              <a:shade val="15000"/>
+            </a:schemeClr>
+          </a:lnRef>
+          <a:fillRef idx="1">
+            <a:schemeClr val="accent1"/>
+          </a:fillRef>
+          <a:effectRef idx="0">
+            <a:schemeClr val="accent1"/>
+          </a:effectRef>
+          <a:fontRef idx="minor">
+            <a:schemeClr val="lt1"/>
+          </a:fontRef>
+        </p:style>
+        <p:txBody>
+          <a:bodyPr rtlCol="0" anchor="ctr"/>
+          <a:lstStyle/>
+          <a:p>
+            <a:pPr algn="ctr"/>
+            <a:r>
+              <a:rPr lang="en-US" altLang="ko-KR"/>
+              <a:t>Interval</a:t>
+            </a:r>
+            <a:endParaRPr lang="ko-KR" altLang="en-US"/>
+          </a:p>
+        </p:txBody>
+      </p:sp>
+      <p:sp>
+        <p:nvSpPr>
+          <p:cNvPr id="41" name="직사각형 40">
+            <a:extLst>
+              <a:ext uri="{FF2B5EF4-FFF2-40B4-BE49-F238E27FC236}">
+                <a16:creationId xmlns:a16="http://schemas.microsoft.com/office/drawing/2014/main" id="{30C4F7CB-BC50-787E-8BA5-AF0C90F7CBFC}"/>
+              </a:ext>
+            </a:extLst>
+          </p:cNvPr>
+          <p:cNvSpPr/>
+          <p:nvPr/>
+        </p:nvSpPr>
+        <p:spPr>
+          <a:xfrm>
+            <a:off x="10643103" y="4772911"/>
+            <a:ext cx="603120" cy="509581"/>
+          </a:xfrm>
+          <a:prstGeom prst="rect">
+            <a:avLst/>
+          </a:prstGeom>
+          <a:noFill/>
+        </p:spPr>
+        <p:style>
+          <a:lnRef idx="2">
+            <a:schemeClr val="accent1">
+              <a:shade val="15000"/>
+            </a:schemeClr>
+          </a:lnRef>
+          <a:fillRef idx="1">
+            <a:schemeClr val="accent1"/>
+          </a:fillRef>
+          <a:effectRef idx="0">
+            <a:schemeClr val="accent1"/>
+          </a:effectRef>
+          <a:fontRef idx="minor">
+            <a:schemeClr val="lt1"/>
+          </a:fontRef>
+        </p:style>
+        <p:txBody>
+          <a:bodyPr rtlCol="0" anchor="ctr"/>
+          <a:lstStyle/>
+          <a:p>
+            <a:pPr algn="ctr"/>
+            <a:endParaRPr lang="ko-KR" altLang="en-US"/>
+          </a:p>
+        </p:txBody>
+      </p:sp>
+      <p:sp>
+        <p:nvSpPr>
+          <p:cNvPr id="42" name="직사각형 41">
+            <a:extLst>
+              <a:ext uri="{FF2B5EF4-FFF2-40B4-BE49-F238E27FC236}">
+                <a16:creationId xmlns:a16="http://schemas.microsoft.com/office/drawing/2014/main" id="{77B50410-9466-6074-F2CC-3A9C7D2ECC4F}"/>
+              </a:ext>
+            </a:extLst>
+          </p:cNvPr>
+          <p:cNvSpPr/>
+          <p:nvPr/>
+        </p:nvSpPr>
+        <p:spPr>
+          <a:xfrm>
+            <a:off x="9571609" y="5481449"/>
+            <a:ext cx="943529" cy="530756"/>
+          </a:xfrm>
+          <a:prstGeom prst="rect">
+            <a:avLst/>
+          </a:prstGeom>
+        </p:spPr>
+        <p:style>
+          <a:lnRef idx="2">
+            <a:schemeClr val="accent1">
+              <a:shade val="15000"/>
+            </a:schemeClr>
+          </a:lnRef>
+          <a:fillRef idx="1">
+            <a:schemeClr val="accent1"/>
+          </a:fillRef>
+          <a:effectRef idx="0">
+            <a:schemeClr val="accent1"/>
+          </a:effectRef>
+          <a:fontRef idx="minor">
+            <a:schemeClr val="lt1"/>
+          </a:fontRef>
+        </p:style>
+        <p:txBody>
+          <a:bodyPr rtlCol="0" anchor="ctr"/>
+          <a:lstStyle/>
+          <a:p>
+            <a:pPr algn="ctr"/>
+            <a:r>
+              <a:rPr lang="en-US" altLang="ko-KR"/>
+              <a:t>Count</a:t>
+            </a:r>
+            <a:endParaRPr lang="ko-KR" altLang="en-US"/>
+          </a:p>
+        </p:txBody>
+      </p:sp>
+      <p:sp>
+        <p:nvSpPr>
+          <p:cNvPr id="43" name="직사각형 42">
+            <a:extLst>
+              <a:ext uri="{FF2B5EF4-FFF2-40B4-BE49-F238E27FC236}">
+                <a16:creationId xmlns:a16="http://schemas.microsoft.com/office/drawing/2014/main" id="{E03CE0EE-E6CC-F414-C39F-583415FB0513}"/>
+              </a:ext>
+            </a:extLst>
+          </p:cNvPr>
+          <p:cNvSpPr/>
+          <p:nvPr/>
+        </p:nvSpPr>
+        <p:spPr>
+          <a:xfrm>
+            <a:off x="10649676" y="5502624"/>
+            <a:ext cx="603120" cy="509581"/>
+          </a:xfrm>
+          <a:prstGeom prst="rect">
+            <a:avLst/>
+          </a:prstGeom>
+          <a:noFill/>
+        </p:spPr>
+        <p:style>
+          <a:lnRef idx="2">
+            <a:schemeClr val="accent1">
+              <a:shade val="15000"/>
+            </a:schemeClr>
+          </a:lnRef>
+          <a:fillRef idx="1">
+            <a:schemeClr val="accent1"/>
+          </a:fillRef>
+          <a:effectRef idx="0">
+            <a:schemeClr val="accent1"/>
+          </a:effectRef>
+          <a:fontRef idx="minor">
+            <a:schemeClr val="lt1"/>
+          </a:fontRef>
+        </p:style>
+        <p:txBody>
+          <a:bodyPr rtlCol="0" anchor="ctr"/>
+          <a:lstStyle/>
+          <a:p>
+            <a:pPr algn="ctr"/>
+            <a:endParaRPr lang="ko-KR" altLang="en-US"/>
+          </a:p>
+        </p:txBody>
+      </p:sp>
+    </p:spTree>
+    <p:extLst>
+      <p:ext uri="{BB962C8B-B14F-4D97-AF65-F5344CB8AC3E}">
+        <p14:creationId xmlns:p14="http://schemas.microsoft.com/office/powerpoint/2010/main" val="150581686"/>
+      </p:ext>
+    </p:extLst>
+  </p:cSld>
+  <p:clrMapOvr>
+    <a:masterClrMapping/>
+  </p:clrMapOvr>
+</p:sld>
+</file>
+
 <file path=ppt/slides/slide2.xml><?xml version="1.0" encoding="utf-8"?>
 <p:sld xmlns:a="http://schemas.openxmlformats.org/drawingml/2006/main" xmlns:r="http://schemas.openxmlformats.org/officeDocument/2006/relationships" xmlns:p="http://schemas.openxmlformats.org/presentationml/2006/main">
   <p:cSld>
@@ -3884,7 +7187,7 @@
         </p:nvGraphicFramePr>
         <p:xfrm>
           <a:off x="353085" y="2283141"/>
-          <a:ext cx="11380206" cy="2966720"/>
+          <a:ext cx="11380206" cy="4709160"/>
         </p:xfrm>
         <a:graphic>
           <a:graphicData uri="http://schemas.openxmlformats.org/drawingml/2006/table">
@@ -9591,6 +12894,172 @@
           </p:txBody>
         </p:sp>
       </p:grpSp>
+      <mc:AlternateContent xmlns:mc="http://schemas.openxmlformats.org/markup-compatibility/2006">
+        <mc:Choice xmlns:a14="http://schemas.microsoft.com/office/drawing/2010/main" Requires="a14">
+          <p:sp>
+            <p:nvSpPr>
+              <p:cNvPr id="2" name="TextBox 1">
+                <a:extLst>
+                  <a:ext uri="{FF2B5EF4-FFF2-40B4-BE49-F238E27FC236}">
+                    <a16:creationId xmlns:a16="http://schemas.microsoft.com/office/drawing/2014/main" id="{7812108D-A140-89AF-419D-DEA91CE930EA}"/>
+                  </a:ext>
+                </a:extLst>
+              </p:cNvPr>
+              <p:cNvSpPr txBox="1"/>
+              <p:nvPr/>
+            </p:nvSpPr>
+            <p:spPr>
+              <a:xfrm>
+                <a:off x="3360438" y="1906172"/>
+                <a:ext cx="4296561" cy="850169"/>
+              </a:xfrm>
+              <a:prstGeom prst="rect">
+                <a:avLst/>
+              </a:prstGeom>
+              <a:noFill/>
+            </p:spPr>
+            <p:txBody>
+              <a:bodyPr wrap="none" lIns="0" tIns="0" rIns="0" bIns="0" rtlCol="0">
+                <a:spAutoFit/>
+              </a:bodyPr>
+              <a:lstStyle/>
+              <a:p>
+                <a14:m>
+                  <m:oMathPara xmlns:m="http://schemas.openxmlformats.org/officeDocument/2006/math">
+                    <m:oMathParaPr>
+                      <m:jc m:val="centerGroup"/>
+                    </m:oMathParaPr>
+                    <m:oMath xmlns:m="http://schemas.openxmlformats.org/officeDocument/2006/math">
+                      <m:r>
+                        <a:rPr lang="en-US" altLang="ko-KR" b="0" i="1" smtClean="0">
+                          <a:latin typeface="Cambria Math" panose="02040503050406030204" pitchFamily="18" charset="0"/>
+                        </a:rPr>
+                        <m:t>𝑌</m:t>
+                      </m:r>
+                      <m:r>
+                        <a:rPr lang="en-US" altLang="ko-KR" b="0" i="1" smtClean="0">
+                          <a:latin typeface="Cambria Math" panose="02040503050406030204" pitchFamily="18" charset="0"/>
+                        </a:rPr>
+                        <m:t>=</m:t>
+                      </m:r>
+                      <m:r>
+                        <a:rPr lang="en-US" altLang="ko-KR" b="0" i="1" smtClean="0">
+                          <a:latin typeface="Cambria Math" panose="02040503050406030204" pitchFamily="18" charset="0"/>
+                        </a:rPr>
+                        <m:t>𝑀𝐴𝑋𝐿𝑈𝑀𝐼</m:t>
+                      </m:r>
+                      <m:sSup>
+                        <m:sSupPr>
+                          <m:ctrlPr>
+                            <a:rPr lang="el-GR" altLang="ko-KR" b="0" i="1" smtClean="0">
+                              <a:latin typeface="Cambria Math" panose="02040503050406030204" pitchFamily="18" charset="0"/>
+                            </a:rPr>
+                          </m:ctrlPr>
+                        </m:sSupPr>
+                        <m:e>
+                          <m:f>
+                            <m:fPr>
+                              <m:ctrlPr>
+                                <a:rPr lang="el-GR" altLang="ko-KR" i="1">
+                                  <a:latin typeface="Cambria Math" panose="02040503050406030204" pitchFamily="18" charset="0"/>
+                                </a:rPr>
+                              </m:ctrlPr>
+                            </m:fPr>
+                            <m:num>
+                              <m:r>
+                                <a:rPr lang="en-US" altLang="ko-KR" i="1">
+                                  <a:latin typeface="Cambria Math" panose="02040503050406030204" pitchFamily="18" charset="0"/>
+                                </a:rPr>
+                                <m:t>𝑋</m:t>
+                              </m:r>
+                            </m:num>
+                            <m:den>
+                              <m:r>
+                                <a:rPr lang="en-US" altLang="ko-KR" i="1">
+                                  <a:latin typeface="Cambria Math" panose="02040503050406030204" pitchFamily="18" charset="0"/>
+                                </a:rPr>
+                                <m:t>𝑀𝐴𝑋𝐼𝑁𝐷𝐸𝑋</m:t>
+                              </m:r>
+                            </m:den>
+                          </m:f>
+                        </m:e>
+                        <m:sup>
+                          <m:r>
+                            <a:rPr lang="en-US" altLang="ko-KR" b="0" i="1" smtClean="0">
+                              <a:latin typeface="Cambria Math" panose="02040503050406030204" pitchFamily="18" charset="0"/>
+                            </a:rPr>
+                            <m:t>𝐺𝑎𝑚𝑚𝑎</m:t>
+                          </m:r>
+                        </m:sup>
+                      </m:sSup>
+                      <m:r>
+                        <a:rPr lang="en-US" altLang="ko-KR" b="0" i="1" smtClean="0">
+                          <a:latin typeface="Cambria Math" panose="02040503050406030204" pitchFamily="18" charset="0"/>
+                        </a:rPr>
+                        <m:t>+</m:t>
+                      </m:r>
+                      <m:r>
+                        <a:rPr lang="en-US" altLang="ko-KR" b="0" i="1" smtClean="0">
+                          <a:latin typeface="Cambria Math" panose="02040503050406030204" pitchFamily="18" charset="0"/>
+                        </a:rPr>
+                        <m:t>𝑏𝑙𝑎𝑐𝑘</m:t>
+                      </m:r>
+                    </m:oMath>
+                  </m:oMathPara>
+                </a14:m>
+                <a:endParaRPr lang="en-US" altLang="ko-KR"/>
+              </a:p>
+              <a:p>
+                <a:endParaRPr lang="ko-KR" altLang="en-US"/>
+              </a:p>
+            </p:txBody>
+          </p:sp>
+        </mc:Choice>
+        <mc:Fallback>
+          <p:sp>
+            <p:nvSpPr>
+              <p:cNvPr id="2" name="TextBox 1">
+                <a:extLst>
+                  <a:ext uri="{FF2B5EF4-FFF2-40B4-BE49-F238E27FC236}">
+                    <a16:creationId xmlns:a16="http://schemas.microsoft.com/office/drawing/2014/main" id="{7812108D-A140-89AF-419D-DEA91CE930EA}"/>
+                  </a:ext>
+                </a:extLst>
+              </p:cNvPr>
+              <p:cNvSpPr txBox="1">
+                <a:spLocks noRot="1" noChangeAspect="1" noMove="1" noResize="1" noEditPoints="1" noAdjustHandles="1" noChangeArrowheads="1" noChangeShapeType="1" noTextEdit="1"/>
+              </p:cNvSpPr>
+              <p:nvPr/>
+            </p:nvSpPr>
+            <p:spPr>
+              <a:xfrm>
+                <a:off x="3360438" y="1906172"/>
+                <a:ext cx="4296561" cy="850169"/>
+              </a:xfrm>
+              <a:prstGeom prst="rect">
+                <a:avLst/>
+              </a:prstGeom>
+              <a:blipFill>
+                <a:blip r:embed="rId3"/>
+                <a:stretch>
+                  <a:fillRect/>
+                </a:stretch>
+              </a:blipFill>
+            </p:spPr>
+            <p:txBody>
+              <a:bodyPr/>
+              <a:lstStyle/>
+              <a:p>
+                <a:r>
+                  <a:rPr lang="ko-KR" altLang="en-US">
+                    <a:noFill/>
+                  </a:rPr>
+                  <a:t> </a:t>
+                </a:r>
+              </a:p>
+            </p:txBody>
+          </p:sp>
+        </mc:Fallback>
+      </mc:AlternateContent>
     </p:spTree>
     <p:extLst>
       <p:ext uri="{BB962C8B-B14F-4D97-AF65-F5344CB8AC3E}">

</xml_diff>